<commit_message>
Atualiza apresentação notebook aula 7
</commit_message>
<xml_diff>
--- a/7 - splade/notebook/apresentacao_splade.pptx
+++ b/7 - splade/notebook/apresentacao_splade.pptx
@@ -5,10 +5,10 @@
     <p:sldMasterId id="2147483648" r:id="rId4"/>
   </p:sldMasterIdLst>
   <p:notesMasterIdLst>
-    <p:notesMasterId r:id="rId17"/>
+    <p:notesMasterId r:id="rId18"/>
   </p:notesMasterIdLst>
   <p:handoutMasterIdLst>
-    <p:handoutMasterId r:id="rId18"/>
+    <p:handoutMasterId r:id="rId19"/>
   </p:handoutMasterIdLst>
   <p:sldIdLst>
     <p:sldId id="256" r:id="rId5"/>
@@ -20,9 +20,10 @@
     <p:sldId id="314" r:id="rId11"/>
     <p:sldId id="312" r:id="rId12"/>
     <p:sldId id="313" r:id="rId13"/>
-    <p:sldId id="307" r:id="rId14"/>
-    <p:sldId id="308" r:id="rId15"/>
-    <p:sldId id="289" r:id="rId16"/>
+    <p:sldId id="315" r:id="rId14"/>
+    <p:sldId id="307" r:id="rId15"/>
+    <p:sldId id="308" r:id="rId16"/>
+    <p:sldId id="289" r:id="rId17"/>
   </p:sldIdLst>
   <p:sldSz cx="12192000" cy="6858000"/>
   <p:notesSz cx="6858000" cy="9144000"/>
@@ -852,7 +853,7 @@
     </p:spTree>
     <p:extLst>
       <p:ext uri="{BB962C8B-B14F-4D97-AF65-F5344CB8AC3E}">
-        <p14:creationId xmlns:p14="http://schemas.microsoft.com/office/powerpoint/2010/main" val="49146352"/>
+        <p14:creationId xmlns:p14="http://schemas.microsoft.com/office/powerpoint/2010/main" val="37904347"/>
       </p:ext>
     </p:extLst>
   </p:cSld>
@@ -937,7 +938,7 @@
     </p:spTree>
     <p:extLst>
       <p:ext uri="{BB962C8B-B14F-4D97-AF65-F5344CB8AC3E}">
-        <p14:creationId xmlns:p14="http://schemas.microsoft.com/office/powerpoint/2010/main" val="2301835449"/>
+        <p14:creationId xmlns:p14="http://schemas.microsoft.com/office/powerpoint/2010/main" val="49146352"/>
       </p:ext>
     </p:extLst>
   </p:cSld>
@@ -1014,6 +1015,91 @@
             <a:fld id="{35BAF473-2665-42A7-89E3-C7BA7EB58D12}" type="slidenum">
               <a:rPr lang="pt-BR" smtClean="0"/>
               <a:t>12</a:t>
+            </a:fld>
+            <a:endParaRPr lang="pt-BR"/>
+          </a:p>
+        </p:txBody>
+      </p:sp>
+    </p:spTree>
+    <p:extLst>
+      <p:ext uri="{BB962C8B-B14F-4D97-AF65-F5344CB8AC3E}">
+        <p14:creationId xmlns:p14="http://schemas.microsoft.com/office/powerpoint/2010/main" val="2301835449"/>
+      </p:ext>
+    </p:extLst>
+  </p:cSld>
+  <p:clrMapOvr>
+    <a:masterClrMapping/>
+  </p:clrMapOvr>
+</p:notes>
+</file>
+
+<file path=ppt/notesSlides/notesSlide13.xml><?xml version="1.0" encoding="utf-8"?>
+<p:notes xmlns:a="http://schemas.openxmlformats.org/drawingml/2006/main" xmlns:r="http://schemas.openxmlformats.org/officeDocument/2006/relationships" xmlns:p="http://schemas.openxmlformats.org/presentationml/2006/main">
+  <p:cSld>
+    <p:spTree>
+      <p:nvGrpSpPr>
+        <p:cNvPr id="1" name=""/>
+        <p:cNvGrpSpPr/>
+        <p:nvPr/>
+      </p:nvGrpSpPr>
+      <p:grpSpPr>
+        <a:xfrm>
+          <a:off x="0" y="0"/>
+          <a:ext cx="0" cy="0"/>
+          <a:chOff x="0" y="0"/>
+          <a:chExt cx="0" cy="0"/>
+        </a:xfrm>
+      </p:grpSpPr>
+      <p:sp>
+        <p:nvSpPr>
+          <p:cNvPr id="2" name="Espaço Reservado para Imagem de Slide 1"/>
+          <p:cNvSpPr>
+            <a:spLocks noGrp="1" noRot="1" noChangeAspect="1"/>
+          </p:cNvSpPr>
+          <p:nvPr>
+            <p:ph type="sldImg"/>
+          </p:nvPr>
+        </p:nvSpPr>
+        <p:spPr/>
+      </p:sp>
+      <p:sp>
+        <p:nvSpPr>
+          <p:cNvPr id="3" name="Espaço Reservado para Anotações 2"/>
+          <p:cNvSpPr>
+            <a:spLocks noGrp="1"/>
+          </p:cNvSpPr>
+          <p:nvPr>
+            <p:ph type="body" idx="1"/>
+          </p:nvPr>
+        </p:nvSpPr>
+        <p:spPr/>
+        <p:txBody>
+          <a:bodyPr/>
+          <a:lstStyle/>
+          <a:p>
+            <a:endParaRPr lang="pt-BR" noProof="0" dirty="0"/>
+          </a:p>
+        </p:txBody>
+      </p:sp>
+      <p:sp>
+        <p:nvSpPr>
+          <p:cNvPr id="4" name="Espaço Reservado para Número de Slide 3"/>
+          <p:cNvSpPr>
+            <a:spLocks noGrp="1"/>
+          </p:cNvSpPr>
+          <p:nvPr>
+            <p:ph type="sldNum" sz="quarter" idx="5"/>
+          </p:nvPr>
+        </p:nvSpPr>
+        <p:spPr/>
+        <p:txBody>
+          <a:bodyPr/>
+          <a:lstStyle/>
+          <a:p>
+            <a:pPr rtl="0"/>
+            <a:fld id="{35BAF473-2665-42A7-89E3-C7BA7EB58D12}" type="slidenum">
+              <a:rPr lang="pt-BR" smtClean="0"/>
+              <a:t>13</a:t>
             </a:fld>
             <a:endParaRPr lang="pt-BR"/>
           </a:p>
@@ -10047,6 +10133,562 @@
             <a:pPr algn="l" rtl="0"/>
             <a:r>
               <a:rPr lang="pt-BR" dirty="0"/>
+              <a:t>Resultados interessantes/inesperados</a:t>
+            </a:r>
+          </a:p>
+        </p:txBody>
+      </p:sp>
+      <p:sp>
+        <p:nvSpPr>
+          <p:cNvPr id="20" name="Espaço Reservado para Conteúdo 3">
+            <a:extLst>
+              <a:ext uri="{FF2B5EF4-FFF2-40B4-BE49-F238E27FC236}">
+                <a16:creationId xmlns:a16="http://schemas.microsoft.com/office/drawing/2014/main" id="{A26C9687-67C8-0FE8-0794-47272524905A}"/>
+              </a:ext>
+            </a:extLst>
+          </p:cNvPr>
+          <p:cNvSpPr txBox="1">
+            <a:spLocks/>
+          </p:cNvSpPr>
+          <p:nvPr/>
+        </p:nvSpPr>
+        <p:spPr>
+          <a:xfrm>
+            <a:off x="176168" y="1328468"/>
+            <a:ext cx="11694252" cy="3510951"/>
+          </a:xfrm>
+          <a:prstGeom prst="rect">
+            <a:avLst/>
+          </a:prstGeom>
+        </p:spPr>
+        <p:txBody>
+          <a:bodyPr rtlCol="0">
+            <a:normAutofit/>
+          </a:bodyPr>
+          <a:lstStyle>
+            <a:lvl1pPr marL="228600" indent="-228600" algn="l" defTabSz="914400" rtl="0" eaLnBrk="1" latinLnBrk="0" hangingPunct="1">
+              <a:lnSpc>
+                <a:spcPct val="90000"/>
+              </a:lnSpc>
+              <a:spcBef>
+                <a:spcPts val="1000"/>
+              </a:spcBef>
+              <a:buFont typeface="Arial" panose="020B0604020202020204" pitchFamily="34" charset="0"/>
+              <a:buChar char="•"/>
+              <a:defRPr sz="2800" kern="1200">
+                <a:solidFill>
+                  <a:schemeClr val="tx1"/>
+                </a:solidFill>
+                <a:latin typeface="+mn-lt"/>
+                <a:ea typeface="+mn-ea"/>
+                <a:cs typeface="+mn-cs"/>
+              </a:defRPr>
+            </a:lvl1pPr>
+            <a:lvl2pPr marL="685800" indent="-228600" algn="l" defTabSz="914400" rtl="0" eaLnBrk="1" latinLnBrk="0" hangingPunct="1">
+              <a:lnSpc>
+                <a:spcPct val="90000"/>
+              </a:lnSpc>
+              <a:spcBef>
+                <a:spcPts val="500"/>
+              </a:spcBef>
+              <a:buFont typeface="Arial" panose="020B0604020202020204" pitchFamily="34" charset="0"/>
+              <a:buChar char="•"/>
+              <a:defRPr sz="2400" kern="1200">
+                <a:solidFill>
+                  <a:schemeClr val="tx1"/>
+                </a:solidFill>
+                <a:latin typeface="+mn-lt"/>
+                <a:ea typeface="+mn-ea"/>
+                <a:cs typeface="+mn-cs"/>
+              </a:defRPr>
+            </a:lvl2pPr>
+            <a:lvl3pPr marL="1143000" indent="-228600" algn="l" defTabSz="914400" rtl="0" eaLnBrk="1" latinLnBrk="0" hangingPunct="1">
+              <a:lnSpc>
+                <a:spcPct val="90000"/>
+              </a:lnSpc>
+              <a:spcBef>
+                <a:spcPts val="500"/>
+              </a:spcBef>
+              <a:buFont typeface="Arial" panose="020B0604020202020204" pitchFamily="34" charset="0"/>
+              <a:buChar char="•"/>
+              <a:defRPr sz="2000" kern="1200">
+                <a:solidFill>
+                  <a:schemeClr val="tx1"/>
+                </a:solidFill>
+                <a:latin typeface="+mn-lt"/>
+                <a:ea typeface="+mn-ea"/>
+                <a:cs typeface="+mn-cs"/>
+              </a:defRPr>
+            </a:lvl3pPr>
+            <a:lvl4pPr marL="1600200" indent="-228600" algn="l" defTabSz="914400" rtl="0" eaLnBrk="1" latinLnBrk="0" hangingPunct="1">
+              <a:lnSpc>
+                <a:spcPct val="90000"/>
+              </a:lnSpc>
+              <a:spcBef>
+                <a:spcPts val="500"/>
+              </a:spcBef>
+              <a:buFont typeface="Arial" panose="020B0604020202020204" pitchFamily="34" charset="0"/>
+              <a:buChar char="•"/>
+              <a:defRPr sz="1800" kern="1200">
+                <a:solidFill>
+                  <a:schemeClr val="tx1"/>
+                </a:solidFill>
+                <a:latin typeface="+mn-lt"/>
+                <a:ea typeface="+mn-ea"/>
+                <a:cs typeface="+mn-cs"/>
+              </a:defRPr>
+            </a:lvl4pPr>
+            <a:lvl5pPr marL="2057400" indent="-228600" algn="l" defTabSz="914400" rtl="0" eaLnBrk="1" latinLnBrk="0" hangingPunct="1">
+              <a:lnSpc>
+                <a:spcPct val="90000"/>
+              </a:lnSpc>
+              <a:spcBef>
+                <a:spcPts val="500"/>
+              </a:spcBef>
+              <a:buFont typeface="Arial" panose="020B0604020202020204" pitchFamily="34" charset="0"/>
+              <a:buChar char="•"/>
+              <a:defRPr sz="1800" kern="1200">
+                <a:solidFill>
+                  <a:schemeClr val="tx1"/>
+                </a:solidFill>
+                <a:latin typeface="+mn-lt"/>
+                <a:ea typeface="+mn-ea"/>
+                <a:cs typeface="+mn-cs"/>
+              </a:defRPr>
+            </a:lvl5pPr>
+            <a:lvl6pPr marL="2514600" indent="-228600" algn="l" defTabSz="914400" rtl="0" eaLnBrk="1" latinLnBrk="0" hangingPunct="1">
+              <a:lnSpc>
+                <a:spcPct val="90000"/>
+              </a:lnSpc>
+              <a:spcBef>
+                <a:spcPts val="500"/>
+              </a:spcBef>
+              <a:buFont typeface="Arial" panose="020B0604020202020204" pitchFamily="34" charset="0"/>
+              <a:buChar char="•"/>
+              <a:defRPr sz="1800" kern="1200">
+                <a:solidFill>
+                  <a:schemeClr val="tx1"/>
+                </a:solidFill>
+                <a:latin typeface="+mn-lt"/>
+                <a:ea typeface="+mn-ea"/>
+                <a:cs typeface="+mn-cs"/>
+              </a:defRPr>
+            </a:lvl6pPr>
+            <a:lvl7pPr marL="2971800" indent="-228600" algn="l" defTabSz="914400" rtl="0" eaLnBrk="1" latinLnBrk="0" hangingPunct="1">
+              <a:lnSpc>
+                <a:spcPct val="90000"/>
+              </a:lnSpc>
+              <a:spcBef>
+                <a:spcPts val="500"/>
+              </a:spcBef>
+              <a:buFont typeface="Arial" panose="020B0604020202020204" pitchFamily="34" charset="0"/>
+              <a:buChar char="•"/>
+              <a:defRPr sz="1800" kern="1200">
+                <a:solidFill>
+                  <a:schemeClr val="tx1"/>
+                </a:solidFill>
+                <a:latin typeface="+mn-lt"/>
+                <a:ea typeface="+mn-ea"/>
+                <a:cs typeface="+mn-cs"/>
+              </a:defRPr>
+            </a:lvl7pPr>
+            <a:lvl8pPr marL="3429000" indent="-228600" algn="l" defTabSz="914400" rtl="0" eaLnBrk="1" latinLnBrk="0" hangingPunct="1">
+              <a:lnSpc>
+                <a:spcPct val="90000"/>
+              </a:lnSpc>
+              <a:spcBef>
+                <a:spcPts val="500"/>
+              </a:spcBef>
+              <a:buFont typeface="Arial" panose="020B0604020202020204" pitchFamily="34" charset="0"/>
+              <a:buChar char="•"/>
+              <a:defRPr sz="1800" kern="1200">
+                <a:solidFill>
+                  <a:schemeClr val="tx1"/>
+                </a:solidFill>
+                <a:latin typeface="+mn-lt"/>
+                <a:ea typeface="+mn-ea"/>
+                <a:cs typeface="+mn-cs"/>
+              </a:defRPr>
+            </a:lvl8pPr>
+            <a:lvl9pPr marL="3886200" indent="-228600" algn="l" defTabSz="914400" rtl="0" eaLnBrk="1" latinLnBrk="0" hangingPunct="1">
+              <a:lnSpc>
+                <a:spcPct val="90000"/>
+              </a:lnSpc>
+              <a:spcBef>
+                <a:spcPts val="500"/>
+              </a:spcBef>
+              <a:buFont typeface="Arial" panose="020B0604020202020204" pitchFamily="34" charset="0"/>
+              <a:buChar char="•"/>
+              <a:defRPr sz="1800" kern="1200">
+                <a:solidFill>
+                  <a:schemeClr val="tx1"/>
+                </a:solidFill>
+                <a:latin typeface="+mn-lt"/>
+                <a:ea typeface="+mn-ea"/>
+                <a:cs typeface="+mn-cs"/>
+              </a:defRPr>
+            </a:lvl9pPr>
+          </a:lstStyle>
+          <a:p>
+            <a:pPr marL="0" indent="0" algn="ctr">
+              <a:buNone/>
+            </a:pPr>
+            <a:r>
+              <a:rPr lang="pt-BR" sz="2400" dirty="0">
+                <a:solidFill>
+                  <a:schemeClr val="accent1"/>
+                </a:solidFill>
+                <a:latin typeface="Arial" panose="020B0604020202020204" pitchFamily="34" charset="0"/>
+                <a:cs typeface="Arial" panose="020B0604020202020204" pitchFamily="34" charset="0"/>
+              </a:rPr>
+              <a:t>Mas os tokens extraídos do CLS/SEP parece não ser muito relevantes</a:t>
+            </a:r>
+          </a:p>
+          <a:p>
+            <a:pPr marL="0" indent="0">
+              <a:buNone/>
+            </a:pPr>
+            <a:endParaRPr lang="en-US" sz="2400" dirty="0">
+              <a:solidFill>
+                <a:schemeClr val="accent1"/>
+              </a:solidFill>
+              <a:latin typeface="Arial" panose="020B0604020202020204" pitchFamily="34" charset="0"/>
+              <a:cs typeface="Arial" panose="020B0604020202020204" pitchFamily="34" charset="0"/>
+            </a:endParaRPr>
+          </a:p>
+          <a:p>
+            <a:pPr marL="0" indent="0">
+              <a:buNone/>
+            </a:pPr>
+            <a:endParaRPr lang="en-US" sz="2400" dirty="0">
+              <a:solidFill>
+                <a:schemeClr val="accent1"/>
+              </a:solidFill>
+              <a:latin typeface="Arial" panose="020B0604020202020204" pitchFamily="34" charset="0"/>
+              <a:cs typeface="Arial" panose="020B0604020202020204" pitchFamily="34" charset="0"/>
+            </a:endParaRPr>
+          </a:p>
+          <a:p>
+            <a:pPr marL="0" indent="0">
+              <a:buNone/>
+            </a:pPr>
+            <a:endParaRPr lang="en-US" sz="2400" dirty="0">
+              <a:solidFill>
+                <a:schemeClr val="accent1"/>
+              </a:solidFill>
+              <a:latin typeface="Arial" panose="020B0604020202020204" pitchFamily="34" charset="0"/>
+              <a:cs typeface="Arial" panose="020B0604020202020204" pitchFamily="34" charset="0"/>
+            </a:endParaRPr>
+          </a:p>
+          <a:p>
+            <a:pPr marL="0" indent="0">
+              <a:buNone/>
+            </a:pPr>
+            <a:endParaRPr lang="en-US" sz="2400" dirty="0">
+              <a:solidFill>
+                <a:schemeClr val="accent1"/>
+              </a:solidFill>
+              <a:latin typeface="Arial" panose="020B0604020202020204" pitchFamily="34" charset="0"/>
+              <a:cs typeface="Arial" panose="020B0604020202020204" pitchFamily="34" charset="0"/>
+            </a:endParaRPr>
+          </a:p>
+          <a:p>
+            <a:pPr marL="0" indent="0">
+              <a:buNone/>
+            </a:pPr>
+            <a:endParaRPr lang="en-US" sz="2400" dirty="0">
+              <a:solidFill>
+                <a:schemeClr val="accent1"/>
+              </a:solidFill>
+              <a:latin typeface="Arial" panose="020B0604020202020204" pitchFamily="34" charset="0"/>
+              <a:cs typeface="Arial" panose="020B0604020202020204" pitchFamily="34" charset="0"/>
+            </a:endParaRPr>
+          </a:p>
+          <a:p>
+            <a:pPr marL="0" indent="0">
+              <a:buNone/>
+            </a:pPr>
+            <a:r>
+              <a:rPr lang="pt-BR" sz="2400" i="1" dirty="0">
+                <a:solidFill>
+                  <a:schemeClr val="accent1"/>
+                </a:solidFill>
+                <a:latin typeface="Arial" panose="020B0604020202020204" pitchFamily="34" charset="0"/>
+                <a:cs typeface="Arial" panose="020B0604020202020204" pitchFamily="34" charset="0"/>
+              </a:rPr>
+              <a:t>	=&gt; Apesar de reduzir o tamanho do índice, é uma redução singela (de 242,1 MB para 235,6 MB). Espera-se uma redução na latência.</a:t>
+            </a:r>
+          </a:p>
+        </p:txBody>
+      </p:sp>
+      <p:graphicFrame>
+        <p:nvGraphicFramePr>
+          <p:cNvPr id="3" name="Tabela 6">
+            <a:extLst>
+              <a:ext uri="{FF2B5EF4-FFF2-40B4-BE49-F238E27FC236}">
+                <a16:creationId xmlns:a16="http://schemas.microsoft.com/office/drawing/2014/main" id="{71FEA2F7-B77B-B835-259F-76CB6F85965E}"/>
+              </a:ext>
+            </a:extLst>
+          </p:cNvPr>
+          <p:cNvGraphicFramePr>
+            <a:graphicFrameLocks noGrp="1"/>
+          </p:cNvGraphicFramePr>
+          <p:nvPr>
+            <p:extLst>
+              <p:ext uri="{D42A27DB-BD31-4B8C-83A1-F6EECF244321}">
+                <p14:modId xmlns:p14="http://schemas.microsoft.com/office/powerpoint/2010/main" val="2080299605"/>
+              </p:ext>
+            </p:extLst>
+          </p:nvPr>
+        </p:nvGraphicFramePr>
+        <p:xfrm>
+          <a:off x="2414258" y="2410219"/>
+          <a:ext cx="7035201" cy="1097280"/>
+        </p:xfrm>
+        <a:graphic>
+          <a:graphicData uri="http://schemas.openxmlformats.org/drawingml/2006/table">
+            <a:tbl>
+              <a:tblPr firstRow="1" bandRow="1">
+                <a:tableStyleId>{5C22544A-7EE6-4342-B048-85BDC9FD1C3A}</a:tableStyleId>
+              </a:tblPr>
+              <a:tblGrid>
+                <a:gridCol w="4305719">
+                  <a:extLst>
+                    <a:ext uri="{9D8B030D-6E8A-4147-A177-3AD203B41FA5}">
+                      <a16:colId xmlns:a16="http://schemas.microsoft.com/office/drawing/2014/main" val="2911717806"/>
+                    </a:ext>
+                  </a:extLst>
+                </a:gridCol>
+                <a:gridCol w="2729482">
+                  <a:extLst>
+                    <a:ext uri="{9D8B030D-6E8A-4147-A177-3AD203B41FA5}">
+                      <a16:colId xmlns:a16="http://schemas.microsoft.com/office/drawing/2014/main" val="2148391779"/>
+                    </a:ext>
+                  </a:extLst>
+                </a:gridCol>
+              </a:tblGrid>
+              <a:tr h="217814">
+                <a:tc>
+                  <a:txBody>
+                    <a:bodyPr/>
+                    <a:lstStyle/>
+                    <a:p>
+                      <a:pPr marL="0" marR="0" lvl="0" indent="0" algn="l" defTabSz="914400" rtl="0" eaLnBrk="1" fontAlgn="auto" latinLnBrk="0" hangingPunct="1">
+                        <a:lnSpc>
+                          <a:spcPct val="100000"/>
+                        </a:lnSpc>
+                        <a:spcBef>
+                          <a:spcPts val="0"/>
+                        </a:spcBef>
+                        <a:spcAft>
+                          <a:spcPts val="0"/>
+                        </a:spcAft>
+                        <a:buClrTx/>
+                        <a:buSzTx/>
+                        <a:buFontTx/>
+                        <a:buNone/>
+                        <a:tabLst/>
+                        <a:defRPr/>
+                      </a:pPr>
+                      <a:r>
+                        <a:rPr lang="pt-BR" sz="1800" b="0" kern="1200" dirty="0" err="1">
+                          <a:solidFill>
+                            <a:schemeClr val="lt1"/>
+                          </a:solidFill>
+                          <a:effectLst/>
+                          <a:latin typeface="+mn-lt"/>
+                          <a:ea typeface="+mn-ea"/>
+                          <a:cs typeface="+mn-cs"/>
+                        </a:rPr>
+                        <a:t>naver</a:t>
+                      </a:r>
+                      <a:r>
+                        <a:rPr lang="pt-BR" sz="1800" b="0" kern="1200" dirty="0">
+                          <a:solidFill>
+                            <a:schemeClr val="lt1"/>
+                          </a:solidFill>
+                          <a:effectLst/>
+                          <a:latin typeface="+mn-lt"/>
+                          <a:ea typeface="+mn-ea"/>
+                          <a:cs typeface="+mn-cs"/>
+                        </a:rPr>
+                        <a:t>/</a:t>
+                      </a:r>
+                      <a:r>
+                        <a:rPr lang="pt-BR" sz="1800" b="0" kern="1200" dirty="0" err="1">
+                          <a:solidFill>
+                            <a:schemeClr val="lt1"/>
+                          </a:solidFill>
+                          <a:effectLst/>
+                          <a:latin typeface="+mn-lt"/>
+                          <a:ea typeface="+mn-ea"/>
+                          <a:cs typeface="+mn-cs"/>
+                        </a:rPr>
+                        <a:t>splade-cocondenser-ensembledistil</a:t>
+                      </a:r>
+                      <a:endParaRPr lang="pt-BR" sz="1800" b="0" kern="1200" dirty="0">
+                        <a:solidFill>
+                          <a:schemeClr val="lt1"/>
+                        </a:solidFill>
+                        <a:effectLst/>
+                        <a:latin typeface="+mn-lt"/>
+                        <a:ea typeface="+mn-ea"/>
+                        <a:cs typeface="+mn-cs"/>
+                      </a:endParaRPr>
+                    </a:p>
+                  </a:txBody>
+                  <a:tcPr/>
+                </a:tc>
+                <a:tc>
+                  <a:txBody>
+                    <a:bodyPr/>
+                    <a:lstStyle/>
+                    <a:p>
+                      <a:r>
+                        <a:rPr lang="pt-BR" dirty="0"/>
+                        <a:t>nDCG@10</a:t>
+                      </a:r>
+                    </a:p>
+                  </a:txBody>
+                  <a:tcPr/>
+                </a:tc>
+                <a:extLst>
+                  <a:ext uri="{0D108BD9-81ED-4DB2-BD59-A6C34878D82A}">
+                    <a16:rowId xmlns:a16="http://schemas.microsoft.com/office/drawing/2014/main" val="3941183346"/>
+                  </a:ext>
+                </a:extLst>
+              </a:tr>
+              <a:tr h="217814">
+                <a:tc>
+                  <a:txBody>
+                    <a:bodyPr/>
+                    <a:lstStyle/>
+                    <a:p>
+                      <a:r>
+                        <a:rPr lang="pt-BR" dirty="0"/>
+                        <a:t>Multiplicação matricial, fp32</a:t>
+                      </a:r>
+                    </a:p>
+                  </a:txBody>
+                  <a:tcPr/>
+                </a:tc>
+                <a:tc>
+                  <a:txBody>
+                    <a:bodyPr/>
+                    <a:lstStyle/>
+                    <a:p>
+                      <a:r>
+                        <a:rPr lang="pt-BR" dirty="0"/>
+                        <a:t>De 0,7290 para 0,7276</a:t>
+                      </a:r>
+                    </a:p>
+                  </a:txBody>
+                  <a:tcPr/>
+                </a:tc>
+                <a:extLst>
+                  <a:ext uri="{0D108BD9-81ED-4DB2-BD59-A6C34878D82A}">
+                    <a16:rowId xmlns:a16="http://schemas.microsoft.com/office/drawing/2014/main" val="1112334602"/>
+                  </a:ext>
+                </a:extLst>
+              </a:tr>
+              <a:tr h="217814">
+                <a:tc>
+                  <a:txBody>
+                    <a:bodyPr/>
+                    <a:lstStyle/>
+                    <a:p>
+                      <a:r>
+                        <a:rPr lang="pt-BR" dirty="0"/>
+                        <a:t>Índice, fp16</a:t>
+                      </a:r>
+                    </a:p>
+                  </a:txBody>
+                  <a:tcPr/>
+                </a:tc>
+                <a:tc>
+                  <a:txBody>
+                    <a:bodyPr/>
+                    <a:lstStyle/>
+                    <a:p>
+                      <a:r>
+                        <a:rPr lang="pt-BR" dirty="0"/>
+                        <a:t>De 0,7269 para 0,7242</a:t>
+                      </a:r>
+                    </a:p>
+                  </a:txBody>
+                  <a:tcPr/>
+                </a:tc>
+                <a:extLst>
+                  <a:ext uri="{0D108BD9-81ED-4DB2-BD59-A6C34878D82A}">
+                    <a16:rowId xmlns:a16="http://schemas.microsoft.com/office/drawing/2014/main" val="1081399665"/>
+                  </a:ext>
+                </a:extLst>
+              </a:tr>
+            </a:tbl>
+          </a:graphicData>
+        </a:graphic>
+      </p:graphicFrame>
+    </p:spTree>
+    <p:extLst>
+      <p:ext uri="{BB962C8B-B14F-4D97-AF65-F5344CB8AC3E}">
+        <p14:creationId xmlns:p14="http://schemas.microsoft.com/office/powerpoint/2010/main" val="453893561"/>
+      </p:ext>
+    </p:extLst>
+  </p:cSld>
+  <p:clrMapOvr>
+    <a:masterClrMapping/>
+  </p:clrMapOvr>
+</p:sld>
+</file>
+
+<file path=ppt/slides/slide11.xml><?xml version="1.0" encoding="utf-8"?>
+<p:sld xmlns:a="http://schemas.openxmlformats.org/drawingml/2006/main" xmlns:r="http://schemas.openxmlformats.org/officeDocument/2006/relationships" xmlns:p="http://schemas.openxmlformats.org/presentationml/2006/main">
+  <p:cSld>
+    <p:spTree>
+      <p:nvGrpSpPr>
+        <p:cNvPr id="1" name=""/>
+        <p:cNvGrpSpPr/>
+        <p:nvPr/>
+      </p:nvGrpSpPr>
+      <p:grpSpPr>
+        <a:xfrm>
+          <a:off x="0" y="0"/>
+          <a:ext cx="0" cy="0"/>
+          <a:chOff x="0" y="0"/>
+          <a:chExt cx="0" cy="0"/>
+        </a:xfrm>
+      </p:grpSpPr>
+      <p:sp>
+        <p:nvSpPr>
+          <p:cNvPr id="2" name="Título 1">
+            <a:extLst>
+              <a:ext uri="{FF2B5EF4-FFF2-40B4-BE49-F238E27FC236}">
+                <a16:creationId xmlns:a16="http://schemas.microsoft.com/office/drawing/2014/main" id="{6719F29B-F233-48AF-8261-F33A4E079E3E}"/>
+              </a:ext>
+            </a:extLst>
+          </p:cNvPr>
+          <p:cNvSpPr>
+            <a:spLocks noGrp="1"/>
+          </p:cNvSpPr>
+          <p:nvPr>
+            <p:ph type="title"/>
+          </p:nvPr>
+        </p:nvSpPr>
+        <p:spPr>
+          <a:xfrm>
+            <a:off x="176168" y="402672"/>
+            <a:ext cx="11325137" cy="729788"/>
+          </a:xfrm>
+        </p:spPr>
+        <p:txBody>
+          <a:bodyPr rtlCol="0">
+            <a:normAutofit/>
+          </a:bodyPr>
+          <a:lstStyle/>
+          <a:p>
+            <a:pPr algn="l" rtl="0"/>
+            <a:r>
+              <a:rPr lang="pt-BR" dirty="0"/>
               <a:t>Resultados</a:t>
             </a:r>
           </a:p>
@@ -10082,7 +10724,7 @@
             <a:fld id="{19B51A1E-902D-48AF-9020-955120F399B6}" type="slidenum">
               <a:rPr lang="pt-BR" smtClean="0"/>
               <a:pPr rtl="0"/>
-              <a:t>10</a:t>
+              <a:t>11</a:t>
             </a:fld>
             <a:endParaRPr lang="pt-BR"/>
           </a:p>
@@ -10103,14 +10745,14 @@
           <p:nvPr>
             <p:extLst>
               <p:ext uri="{D42A27DB-BD31-4B8C-83A1-F6EECF244321}">
-                <p14:modId xmlns:p14="http://schemas.microsoft.com/office/powerpoint/2010/main" val="2165634115"/>
+                <p14:modId xmlns:p14="http://schemas.microsoft.com/office/powerpoint/2010/main" val="3210875770"/>
               </p:ext>
             </p:extLst>
           </p:nvPr>
         </p:nvGraphicFramePr>
         <p:xfrm>
           <a:off x="450430" y="1519365"/>
-          <a:ext cx="10903370" cy="4450080"/>
+          <a:ext cx="10903370" cy="4079240"/>
         </p:xfrm>
         <a:graphic>
           <a:graphicData uri="http://schemas.openxmlformats.org/drawingml/2006/table">
@@ -10379,6 +11021,9 @@
                             <a:schemeClr val="dk1"/>
                           </a:solidFill>
                           <a:effectLst/>
+                          <a:highlight>
+                            <a:srgbClr val="FFFF00"/>
+                          </a:highlight>
                           <a:latin typeface="+mn-lt"/>
                           <a:ea typeface="+mn-ea"/>
                           <a:cs typeface="+mn-cs"/>
@@ -10391,35 +11036,91 @@
                             <a:schemeClr val="dk1"/>
                           </a:solidFill>
                           <a:effectLst/>
+                          <a:highlight>
+                            <a:srgbClr val="FFFF00"/>
+                          </a:highlight>
                           <a:latin typeface="+mn-lt"/>
                           <a:ea typeface="+mn-ea"/>
                           <a:cs typeface="+mn-cs"/>
                         </a:rPr>
-                        <a:t>, sem </a:t>
+                        <a:t>, f16, índice</a:t>
                       </a:r>
+                      <a:endParaRPr lang="sv-SE" sz="1800" b="0" kern="1200" dirty="0">
+                        <a:solidFill>
+                          <a:schemeClr val="dk1"/>
+                        </a:solidFill>
+                        <a:effectLst/>
+                        <a:highlight>
+                          <a:srgbClr val="FFFF00"/>
+                        </a:highlight>
+                        <a:latin typeface="+mn-lt"/>
+                        <a:ea typeface="+mn-ea"/>
+                        <a:cs typeface="+mn-cs"/>
+                      </a:endParaRPr>
+                    </a:p>
+                  </a:txBody>
+                  <a:tcPr/>
+                </a:tc>
+                <a:tc>
+                  <a:txBody>
+                    <a:bodyPr/>
+                    <a:lstStyle/>
+                    <a:p>
                       <a:r>
-                        <a:rPr lang="pt-BR" sz="1800" b="0" kern="1200" dirty="0" err="1">
+                        <a:rPr lang="pt-BR" dirty="0">
+                          <a:highlight>
+                            <a:srgbClr val="FFFF00"/>
+                          </a:highlight>
+                        </a:rPr>
+                        <a:t>0,7269</a:t>
+                      </a:r>
+                    </a:p>
+                  </a:txBody>
+                  <a:tcPr/>
+                </a:tc>
+                <a:extLst>
+                  <a:ext uri="{0D108BD9-81ED-4DB2-BD59-A6C34878D82A}">
+                    <a16:rowId xmlns:a16="http://schemas.microsoft.com/office/drawing/2014/main" val="3711301742"/>
+                  </a:ext>
+                </a:extLst>
+              </a:tr>
+              <a:tr h="370840">
+                <a:tc>
+                  <a:txBody>
+                    <a:bodyPr/>
+                    <a:lstStyle/>
+                    <a:p>
+                      <a:pPr marL="0" marR="0" lvl="0" indent="0" algn="l" defTabSz="914400" rtl="0" eaLnBrk="1" fontAlgn="auto" latinLnBrk="0" hangingPunct="1">
+                        <a:lnSpc>
+                          <a:spcPct val="100000"/>
+                        </a:lnSpc>
+                        <a:spcBef>
+                          <a:spcPts val="0"/>
+                        </a:spcBef>
+                        <a:spcAft>
+                          <a:spcPts val="0"/>
+                        </a:spcAft>
+                        <a:buClrTx/>
+                        <a:buSzTx/>
+                        <a:buFontTx/>
+                        <a:buNone/>
+                        <a:tabLst/>
+                        <a:defRPr/>
+                      </a:pPr>
+                      <a:r>
+                        <a:rPr lang="sv-SE" sz="1800" b="0" kern="1200" dirty="0">
                           <a:solidFill>
                             <a:schemeClr val="dk1"/>
                           </a:solidFill>
                           <a:effectLst/>
+                          <a:highlight>
+                            <a:srgbClr val="FFFF00"/>
+                          </a:highlight>
                           <a:latin typeface="+mn-lt"/>
                           <a:ea typeface="+mn-ea"/>
                           <a:cs typeface="+mn-cs"/>
                         </a:rPr>
-                        <a:t>contrib</a:t>
-                      </a:r>
-                      <a:r>
-                        <a:rPr lang="pt-BR" sz="1800" b="0" kern="1200" dirty="0">
-                          <a:solidFill>
-                            <a:schemeClr val="dk1"/>
-                          </a:solidFill>
-                          <a:effectLst/>
-                          <a:latin typeface="+mn-lt"/>
-                          <a:ea typeface="+mn-ea"/>
-                          <a:cs typeface="+mn-cs"/>
-                        </a:rPr>
-                        <a:t>. SEP e CLS, f32, matriz</a:t>
+                        <a:t>max, f16, índice, sem contrib. SEP e CLS</a:t>
                       </a:r>
                     </a:p>
                   </a:txBody>
@@ -10431,17 +11132,20 @@
                     <a:lstStyle/>
                     <a:p>
                       <a:r>
-                        <a:rPr lang="pt-BR"/>
-                        <a:t>0,7276</a:t>
+                        <a:rPr lang="pt-BR" dirty="0">
+                          <a:highlight>
+                            <a:srgbClr val="FFFF00"/>
+                          </a:highlight>
+                        </a:rPr>
+                        <a:t>0,7242</a:t>
                       </a:r>
-                      <a:endParaRPr lang="pt-BR" dirty="0"/>
                     </a:p>
                   </a:txBody>
                   <a:tcPr/>
                 </a:tc>
                 <a:extLst>
                   <a:ext uri="{0D108BD9-81ED-4DB2-BD59-A6C34878D82A}">
-                    <a16:rowId xmlns:a16="http://schemas.microsoft.com/office/drawing/2014/main" val="257634599"/>
+                    <a16:rowId xmlns:a16="http://schemas.microsoft.com/office/drawing/2014/main" val="2853404518"/>
                   </a:ext>
                 </a:extLst>
               </a:tr>
@@ -10474,6 +11178,9 @@
                             <a:schemeClr val="dk1"/>
                           </a:solidFill>
                           <a:effectLst/>
+                          <a:highlight>
+                            <a:srgbClr val="00FF00"/>
+                          </a:highlight>
                           <a:latin typeface="+mn-lt"/>
                           <a:ea typeface="+mn-ea"/>
                           <a:cs typeface="+mn-cs"/>
@@ -10486,6 +11193,9 @@
                             <a:schemeClr val="dk1"/>
                           </a:solidFill>
                           <a:effectLst/>
+                          <a:highlight>
+                            <a:srgbClr val="00FF00"/>
+                          </a:highlight>
                           <a:latin typeface="+mn-lt"/>
                           <a:ea typeface="+mn-ea"/>
                           <a:cs typeface="+mn-cs"/>
@@ -10502,7 +11212,11 @@
                     <a:lstStyle/>
                     <a:p>
                       <a:r>
-                        <a:rPr lang="pt-BR" dirty="0"/>
+                        <a:rPr lang="pt-BR" dirty="0">
+                          <a:highlight>
+                            <a:srgbClr val="00FF00"/>
+                          </a:highlight>
+                        </a:rPr>
                         <a:t>0,7290</a:t>
                       </a:r>
                     </a:p>
@@ -10511,7 +11225,7 @@
                 </a:tc>
                 <a:extLst>
                   <a:ext uri="{0D108BD9-81ED-4DB2-BD59-A6C34878D82A}">
-                    <a16:rowId xmlns:a16="http://schemas.microsoft.com/office/drawing/2014/main" val="558884008"/>
+                    <a16:rowId xmlns:a16="http://schemas.microsoft.com/office/drawing/2014/main" val="2104915781"/>
                   </a:ext>
                 </a:extLst>
               </a:tr>
@@ -10544,6 +11258,9 @@
                             <a:schemeClr val="dk1"/>
                           </a:solidFill>
                           <a:effectLst/>
+                          <a:highlight>
+                            <a:srgbClr val="00FF00"/>
+                          </a:highlight>
                           <a:latin typeface="+mn-lt"/>
                           <a:ea typeface="+mn-ea"/>
                           <a:cs typeface="+mn-cs"/>
@@ -10556,6 +11273,9 @@
                             <a:schemeClr val="dk1"/>
                           </a:solidFill>
                           <a:effectLst/>
+                          <a:highlight>
+                            <a:srgbClr val="00FF00"/>
+                          </a:highlight>
                           <a:latin typeface="+mn-lt"/>
                           <a:ea typeface="+mn-ea"/>
                           <a:cs typeface="+mn-cs"/>
@@ -10567,6 +11287,9 @@
                           <a:schemeClr val="dk1"/>
                         </a:solidFill>
                         <a:effectLst/>
+                        <a:highlight>
+                          <a:srgbClr val="00FF00"/>
+                        </a:highlight>
                         <a:latin typeface="+mn-lt"/>
                         <a:ea typeface="+mn-ea"/>
                         <a:cs typeface="+mn-cs"/>
@@ -10581,7 +11304,11 @@
                     <a:lstStyle/>
                     <a:p>
                       <a:r>
-                        <a:rPr lang="pt-BR" dirty="0"/>
+                        <a:rPr lang="pt-BR" dirty="0">
+                          <a:highlight>
+                            <a:srgbClr val="00FF00"/>
+                          </a:highlight>
+                        </a:rPr>
                         <a:t>0,7282</a:t>
                       </a:r>
                     </a:p>
@@ -10590,86 +11317,7 @@
                 </a:tc>
                 <a:extLst>
                   <a:ext uri="{0D108BD9-81ED-4DB2-BD59-A6C34878D82A}">
-                    <a16:rowId xmlns:a16="http://schemas.microsoft.com/office/drawing/2014/main" val="1955744297"/>
-                  </a:ext>
-                </a:extLst>
-              </a:tr>
-              <a:tr h="370840">
-                <a:tc>
-                  <a:txBody>
-                    <a:bodyPr/>
-                    <a:lstStyle/>
-                    <a:p>
-                      <a:pPr marL="0" marR="0" lvl="0" indent="0" algn="l" defTabSz="914400" rtl="0" eaLnBrk="1" fontAlgn="auto" latinLnBrk="0" hangingPunct="1">
-                        <a:lnSpc>
-                          <a:spcPct val="100000"/>
-                        </a:lnSpc>
-                        <a:spcBef>
-                          <a:spcPts val="0"/>
-                        </a:spcBef>
-                        <a:spcAft>
-                          <a:spcPts val="0"/>
-                        </a:spcAft>
-                        <a:buClrTx/>
-                        <a:buSzTx/>
-                        <a:buFontTx/>
-                        <a:buNone/>
-                        <a:tabLst/>
-                        <a:defRPr/>
-                      </a:pPr>
-                      <a:r>
-                        <a:rPr lang="pt-BR" sz="1800" b="0" kern="1200" dirty="0" err="1">
-                          <a:solidFill>
-                            <a:schemeClr val="dk1"/>
-                          </a:solidFill>
-                          <a:effectLst/>
-                          <a:latin typeface="+mn-lt"/>
-                          <a:ea typeface="+mn-ea"/>
-                          <a:cs typeface="+mn-cs"/>
-                        </a:rPr>
-                        <a:t>max</a:t>
-                      </a:r>
-                      <a:r>
-                        <a:rPr lang="pt-BR" sz="1800" b="0" kern="1200" dirty="0">
-                          <a:solidFill>
-                            <a:schemeClr val="dk1"/>
-                          </a:solidFill>
-                          <a:effectLst/>
-                          <a:latin typeface="+mn-lt"/>
-                          <a:ea typeface="+mn-ea"/>
-                          <a:cs typeface="+mn-cs"/>
-                        </a:rPr>
-                        <a:t>, f16, índice</a:t>
-                      </a:r>
-                      <a:endParaRPr lang="sv-SE" sz="1800" b="0" kern="1200" dirty="0">
-                        <a:solidFill>
-                          <a:schemeClr val="dk1"/>
-                        </a:solidFill>
-                        <a:effectLst/>
-                        <a:latin typeface="+mn-lt"/>
-                        <a:ea typeface="+mn-ea"/>
-                        <a:cs typeface="+mn-cs"/>
-                      </a:endParaRPr>
-                    </a:p>
-                  </a:txBody>
-                  <a:tcPr/>
-                </a:tc>
-                <a:tc>
-                  <a:txBody>
-                    <a:bodyPr/>
-                    <a:lstStyle/>
-                    <a:p>
-                      <a:r>
-                        <a:rPr lang="pt-BR" dirty="0"/>
-                        <a:t>0,7269</a:t>
-                      </a:r>
-                    </a:p>
-                  </a:txBody>
-                  <a:tcPr/>
-                </a:tc>
-                <a:extLst>
-                  <a:ext uri="{0D108BD9-81ED-4DB2-BD59-A6C34878D82A}">
-                    <a16:rowId xmlns:a16="http://schemas.microsoft.com/office/drawing/2014/main" val="2090769235"/>
+                    <a16:rowId xmlns:a16="http://schemas.microsoft.com/office/drawing/2014/main" val="2539599419"/>
                   </a:ext>
                 </a:extLst>
               </a:tr>
@@ -10702,11 +11350,14 @@
                             <a:schemeClr val="dk1"/>
                           </a:solidFill>
                           <a:effectLst/>
+                          <a:highlight>
+                            <a:srgbClr val="00FFFF"/>
+                          </a:highlight>
                           <a:latin typeface="+mn-lt"/>
                           <a:ea typeface="+mn-ea"/>
                           <a:cs typeface="+mn-cs"/>
                         </a:rPr>
-                        <a:t>max, sem contrib. SEP e CLS, f16, índice</a:t>
+                        <a:t>sum, f32, matriz</a:t>
                       </a:r>
                     </a:p>
                   </a:txBody>
@@ -10717,9 +11368,30 @@
                     <a:bodyPr/>
                     <a:lstStyle/>
                     <a:p>
+                      <a:pPr marL="0" marR="0" lvl="0" indent="0" algn="l" defTabSz="914400" rtl="0" eaLnBrk="1" fontAlgn="auto" latinLnBrk="0" hangingPunct="1">
+                        <a:lnSpc>
+                          <a:spcPct val="100000"/>
+                        </a:lnSpc>
+                        <a:spcBef>
+                          <a:spcPts val="0"/>
+                        </a:spcBef>
+                        <a:spcAft>
+                          <a:spcPts val="0"/>
+                        </a:spcAft>
+                        <a:buClrTx/>
+                        <a:buSzTx/>
+                        <a:buFontTx/>
+                        <a:buNone/>
+                        <a:tabLst/>
+                        <a:defRPr/>
+                      </a:pPr>
                       <a:r>
-                        <a:rPr lang="pt-BR" dirty="0"/>
-                        <a:t>TODO</a:t>
+                        <a:rPr lang="pt-BR" dirty="0">
+                          <a:highlight>
+                            <a:srgbClr val="00FFFF"/>
+                          </a:highlight>
+                        </a:rPr>
+                        <a:t>0,1921</a:t>
                       </a:r>
                     </a:p>
                   </a:txBody>
@@ -10727,7 +11399,7 @@
                 </a:tc>
                 <a:extLst>
                   <a:ext uri="{0D108BD9-81ED-4DB2-BD59-A6C34878D82A}">
-                    <a16:rowId xmlns:a16="http://schemas.microsoft.com/office/drawing/2014/main" val="410354087"/>
+                    <a16:rowId xmlns:a16="http://schemas.microsoft.com/office/drawing/2014/main" val="3582418239"/>
                   </a:ext>
                 </a:extLst>
               </a:tr>
@@ -10760,6 +11432,9 @@
                             <a:schemeClr val="dk1"/>
                           </a:solidFill>
                           <a:effectLst/>
+                          <a:highlight>
+                            <a:srgbClr val="00FFFF"/>
+                          </a:highlight>
                           <a:latin typeface="+mn-lt"/>
                           <a:ea typeface="+mn-ea"/>
                           <a:cs typeface="+mn-cs"/>
@@ -10776,65 +11451,11 @@
                     <a:lstStyle/>
                     <a:p>
                       <a:r>
-                        <a:rPr lang="pt-BR" dirty="0"/>
-                        <a:t>TODO</a:t>
-                      </a:r>
-                    </a:p>
-                  </a:txBody>
-                  <a:tcPr/>
-                </a:tc>
-                <a:extLst>
-                  <a:ext uri="{0D108BD9-81ED-4DB2-BD59-A6C34878D82A}">
-                    <a16:rowId xmlns:a16="http://schemas.microsoft.com/office/drawing/2014/main" val="151009829"/>
-                  </a:ext>
-                </a:extLst>
-              </a:tr>
-              <a:tr h="370840">
-                <a:tc>
-                  <a:txBody>
-                    <a:bodyPr/>
-                    <a:lstStyle/>
-                    <a:p>
-                      <a:pPr marL="0" marR="0" lvl="0" indent="0" algn="l" defTabSz="914400" rtl="0" eaLnBrk="1" fontAlgn="auto" latinLnBrk="0" hangingPunct="1">
-                        <a:lnSpc>
-                          <a:spcPct val="100000"/>
-                        </a:lnSpc>
-                        <a:spcBef>
-                          <a:spcPts val="0"/>
-                        </a:spcBef>
-                        <a:spcAft>
-                          <a:spcPts val="0"/>
-                        </a:spcAft>
-                        <a:buClrTx/>
-                        <a:buSzTx/>
-                        <a:buFontTx/>
-                        <a:buNone/>
-                        <a:tabLst/>
-                        <a:defRPr/>
-                      </a:pPr>
-                      <a:r>
-                        <a:rPr lang="sv-SE" sz="1800" b="0" kern="1200" dirty="0">
-                          <a:solidFill>
-                            <a:schemeClr val="dk1"/>
-                          </a:solidFill>
-                          <a:effectLst/>
-                          <a:latin typeface="+mn-lt"/>
-                          <a:ea typeface="+mn-ea"/>
-                          <a:cs typeface="+mn-cs"/>
+                        <a:rPr lang="pt-BR" dirty="0">
+                          <a:highlight>
+                            <a:srgbClr val="00FFFF"/>
+                          </a:highlight>
                         </a:rPr>
-                        <a:t>sum, f32, matriz</a:t>
-                      </a:r>
-                    </a:p>
-                  </a:txBody>
-                  <a:tcPr/>
-                </a:tc>
-                <a:tc>
-                  <a:txBody>
-                    <a:bodyPr/>
-                    <a:lstStyle/>
-                    <a:p>
-                      <a:r>
-                        <a:rPr lang="pt-BR" dirty="0"/>
                         <a:t>0,1931</a:t>
                       </a:r>
                     </a:p>
@@ -10843,7 +11464,7 @@
                 </a:tc>
                 <a:extLst>
                   <a:ext uri="{0D108BD9-81ED-4DB2-BD59-A6C34878D82A}">
-                    <a16:rowId xmlns:a16="http://schemas.microsoft.com/office/drawing/2014/main" val="3984110931"/>
+                    <a16:rowId xmlns:a16="http://schemas.microsoft.com/office/drawing/2014/main" val="3924607584"/>
                   </a:ext>
                 </a:extLst>
               </a:tr>
@@ -10855,409 +11476,6 @@
     <p:extLst>
       <p:ext uri="{BB962C8B-B14F-4D97-AF65-F5344CB8AC3E}">
         <p14:creationId xmlns:p14="http://schemas.microsoft.com/office/powerpoint/2010/main" val="2890854256"/>
-      </p:ext>
-    </p:extLst>
-  </p:cSld>
-  <p:clrMapOvr>
-    <a:masterClrMapping/>
-  </p:clrMapOvr>
-</p:sld>
-</file>
-
-<file path=ppt/slides/slide11.xml><?xml version="1.0" encoding="utf-8"?>
-<p:sld xmlns:a="http://schemas.openxmlformats.org/drawingml/2006/main" xmlns:r="http://schemas.openxmlformats.org/officeDocument/2006/relationships" xmlns:p="http://schemas.openxmlformats.org/presentationml/2006/main">
-  <p:cSld>
-    <p:spTree>
-      <p:nvGrpSpPr>
-        <p:cNvPr id="1" name=""/>
-        <p:cNvGrpSpPr/>
-        <p:nvPr/>
-      </p:nvGrpSpPr>
-      <p:grpSpPr>
-        <a:xfrm>
-          <a:off x="0" y="0"/>
-          <a:ext cx="0" cy="0"/>
-          <a:chOff x="0" y="0"/>
-          <a:chExt cx="0" cy="0"/>
-        </a:xfrm>
-      </p:grpSpPr>
-      <p:sp>
-        <p:nvSpPr>
-          <p:cNvPr id="2" name="Título 1">
-            <a:extLst>
-              <a:ext uri="{FF2B5EF4-FFF2-40B4-BE49-F238E27FC236}">
-                <a16:creationId xmlns:a16="http://schemas.microsoft.com/office/drawing/2014/main" id="{6719F29B-F233-48AF-8261-F33A4E079E3E}"/>
-              </a:ext>
-            </a:extLst>
-          </p:cNvPr>
-          <p:cNvSpPr>
-            <a:spLocks noGrp="1"/>
-          </p:cNvSpPr>
-          <p:nvPr>
-            <p:ph type="title"/>
-          </p:nvPr>
-        </p:nvSpPr>
-        <p:spPr>
-          <a:xfrm>
-            <a:off x="176168" y="402672"/>
-            <a:ext cx="11325137" cy="729788"/>
-          </a:xfrm>
-        </p:spPr>
-        <p:txBody>
-          <a:bodyPr rtlCol="0">
-            <a:normAutofit/>
-          </a:bodyPr>
-          <a:lstStyle/>
-          <a:p>
-            <a:pPr algn="l" rtl="0"/>
-            <a:r>
-              <a:rPr lang="pt-BR" dirty="0"/>
-              <a:t>Tópico para discussão</a:t>
-            </a:r>
-          </a:p>
-        </p:txBody>
-      </p:sp>
-      <p:sp>
-        <p:nvSpPr>
-          <p:cNvPr id="4" name="Espaço Reservado para o Número do Slide 3">
-            <a:extLst>
-              <a:ext uri="{FF2B5EF4-FFF2-40B4-BE49-F238E27FC236}">
-                <a16:creationId xmlns:a16="http://schemas.microsoft.com/office/drawing/2014/main" id="{328F602C-7F98-4C02-99D4-ED65E00D66A4}"/>
-              </a:ext>
-            </a:extLst>
-          </p:cNvPr>
-          <p:cNvSpPr>
-            <a:spLocks noGrp="1"/>
-          </p:cNvSpPr>
-          <p:nvPr>
-            <p:ph type="sldNum" sz="quarter" idx="12"/>
-          </p:nvPr>
-        </p:nvSpPr>
-        <p:spPr>
-          <a:xfrm>
-            <a:off x="8610600" y="6356350"/>
-            <a:ext cx="2743200" cy="365125"/>
-          </a:xfrm>
-        </p:spPr>
-        <p:txBody>
-          <a:bodyPr rtlCol="0"/>
-          <a:lstStyle/>
-          <a:p>
-            <a:pPr rtl="0"/>
-            <a:fld id="{19B51A1E-902D-48AF-9020-955120F399B6}" type="slidenum">
-              <a:rPr lang="pt-BR" smtClean="0"/>
-              <a:pPr rtl="0"/>
-              <a:t>11</a:t>
-            </a:fld>
-            <a:endParaRPr lang="pt-BR"/>
-          </a:p>
-        </p:txBody>
-      </p:sp>
-      <p:sp>
-        <p:nvSpPr>
-          <p:cNvPr id="20" name="Espaço Reservado para Conteúdo 3">
-            <a:extLst>
-              <a:ext uri="{FF2B5EF4-FFF2-40B4-BE49-F238E27FC236}">
-                <a16:creationId xmlns:a16="http://schemas.microsoft.com/office/drawing/2014/main" id="{A26C9687-67C8-0FE8-0794-47272524905A}"/>
-              </a:ext>
-            </a:extLst>
-          </p:cNvPr>
-          <p:cNvSpPr txBox="1">
-            <a:spLocks/>
-          </p:cNvSpPr>
-          <p:nvPr/>
-        </p:nvSpPr>
-        <p:spPr>
-          <a:xfrm>
-            <a:off x="176168" y="1643152"/>
-            <a:ext cx="11694252" cy="4812176"/>
-          </a:xfrm>
-          <a:prstGeom prst="rect">
-            <a:avLst/>
-          </a:prstGeom>
-        </p:spPr>
-        <p:txBody>
-          <a:bodyPr rtlCol="0">
-            <a:normAutofit/>
-          </a:bodyPr>
-          <a:lstStyle>
-            <a:lvl1pPr marL="228600" indent="-228600" algn="l" defTabSz="914400" rtl="0" eaLnBrk="1" latinLnBrk="0" hangingPunct="1">
-              <a:lnSpc>
-                <a:spcPct val="90000"/>
-              </a:lnSpc>
-              <a:spcBef>
-                <a:spcPts val="1000"/>
-              </a:spcBef>
-              <a:buFont typeface="Arial" panose="020B0604020202020204" pitchFamily="34" charset="0"/>
-              <a:buChar char="•"/>
-              <a:defRPr sz="2800" kern="1200">
-                <a:solidFill>
-                  <a:schemeClr val="tx1"/>
-                </a:solidFill>
-                <a:latin typeface="+mn-lt"/>
-                <a:ea typeface="+mn-ea"/>
-                <a:cs typeface="+mn-cs"/>
-              </a:defRPr>
-            </a:lvl1pPr>
-            <a:lvl2pPr marL="685800" indent="-228600" algn="l" defTabSz="914400" rtl="0" eaLnBrk="1" latinLnBrk="0" hangingPunct="1">
-              <a:lnSpc>
-                <a:spcPct val="90000"/>
-              </a:lnSpc>
-              <a:spcBef>
-                <a:spcPts val="500"/>
-              </a:spcBef>
-              <a:buFont typeface="Arial" panose="020B0604020202020204" pitchFamily="34" charset="0"/>
-              <a:buChar char="•"/>
-              <a:defRPr sz="2400" kern="1200">
-                <a:solidFill>
-                  <a:schemeClr val="tx1"/>
-                </a:solidFill>
-                <a:latin typeface="+mn-lt"/>
-                <a:ea typeface="+mn-ea"/>
-                <a:cs typeface="+mn-cs"/>
-              </a:defRPr>
-            </a:lvl2pPr>
-            <a:lvl3pPr marL="1143000" indent="-228600" algn="l" defTabSz="914400" rtl="0" eaLnBrk="1" latinLnBrk="0" hangingPunct="1">
-              <a:lnSpc>
-                <a:spcPct val="90000"/>
-              </a:lnSpc>
-              <a:spcBef>
-                <a:spcPts val="500"/>
-              </a:spcBef>
-              <a:buFont typeface="Arial" panose="020B0604020202020204" pitchFamily="34" charset="0"/>
-              <a:buChar char="•"/>
-              <a:defRPr sz="2000" kern="1200">
-                <a:solidFill>
-                  <a:schemeClr val="tx1"/>
-                </a:solidFill>
-                <a:latin typeface="+mn-lt"/>
-                <a:ea typeface="+mn-ea"/>
-                <a:cs typeface="+mn-cs"/>
-              </a:defRPr>
-            </a:lvl3pPr>
-            <a:lvl4pPr marL="1600200" indent="-228600" algn="l" defTabSz="914400" rtl="0" eaLnBrk="1" latinLnBrk="0" hangingPunct="1">
-              <a:lnSpc>
-                <a:spcPct val="90000"/>
-              </a:lnSpc>
-              <a:spcBef>
-                <a:spcPts val="500"/>
-              </a:spcBef>
-              <a:buFont typeface="Arial" panose="020B0604020202020204" pitchFamily="34" charset="0"/>
-              <a:buChar char="•"/>
-              <a:defRPr sz="1800" kern="1200">
-                <a:solidFill>
-                  <a:schemeClr val="tx1"/>
-                </a:solidFill>
-                <a:latin typeface="+mn-lt"/>
-                <a:ea typeface="+mn-ea"/>
-                <a:cs typeface="+mn-cs"/>
-              </a:defRPr>
-            </a:lvl4pPr>
-            <a:lvl5pPr marL="2057400" indent="-228600" algn="l" defTabSz="914400" rtl="0" eaLnBrk="1" latinLnBrk="0" hangingPunct="1">
-              <a:lnSpc>
-                <a:spcPct val="90000"/>
-              </a:lnSpc>
-              <a:spcBef>
-                <a:spcPts val="500"/>
-              </a:spcBef>
-              <a:buFont typeface="Arial" panose="020B0604020202020204" pitchFamily="34" charset="0"/>
-              <a:buChar char="•"/>
-              <a:defRPr sz="1800" kern="1200">
-                <a:solidFill>
-                  <a:schemeClr val="tx1"/>
-                </a:solidFill>
-                <a:latin typeface="+mn-lt"/>
-                <a:ea typeface="+mn-ea"/>
-                <a:cs typeface="+mn-cs"/>
-              </a:defRPr>
-            </a:lvl5pPr>
-            <a:lvl6pPr marL="2514600" indent="-228600" algn="l" defTabSz="914400" rtl="0" eaLnBrk="1" latinLnBrk="0" hangingPunct="1">
-              <a:lnSpc>
-                <a:spcPct val="90000"/>
-              </a:lnSpc>
-              <a:spcBef>
-                <a:spcPts val="500"/>
-              </a:spcBef>
-              <a:buFont typeface="Arial" panose="020B0604020202020204" pitchFamily="34" charset="0"/>
-              <a:buChar char="•"/>
-              <a:defRPr sz="1800" kern="1200">
-                <a:solidFill>
-                  <a:schemeClr val="tx1"/>
-                </a:solidFill>
-                <a:latin typeface="+mn-lt"/>
-                <a:ea typeface="+mn-ea"/>
-                <a:cs typeface="+mn-cs"/>
-              </a:defRPr>
-            </a:lvl6pPr>
-            <a:lvl7pPr marL="2971800" indent="-228600" algn="l" defTabSz="914400" rtl="0" eaLnBrk="1" latinLnBrk="0" hangingPunct="1">
-              <a:lnSpc>
-                <a:spcPct val="90000"/>
-              </a:lnSpc>
-              <a:spcBef>
-                <a:spcPts val="500"/>
-              </a:spcBef>
-              <a:buFont typeface="Arial" panose="020B0604020202020204" pitchFamily="34" charset="0"/>
-              <a:buChar char="•"/>
-              <a:defRPr sz="1800" kern="1200">
-                <a:solidFill>
-                  <a:schemeClr val="tx1"/>
-                </a:solidFill>
-                <a:latin typeface="+mn-lt"/>
-                <a:ea typeface="+mn-ea"/>
-                <a:cs typeface="+mn-cs"/>
-              </a:defRPr>
-            </a:lvl7pPr>
-            <a:lvl8pPr marL="3429000" indent="-228600" algn="l" defTabSz="914400" rtl="0" eaLnBrk="1" latinLnBrk="0" hangingPunct="1">
-              <a:lnSpc>
-                <a:spcPct val="90000"/>
-              </a:lnSpc>
-              <a:spcBef>
-                <a:spcPts val="500"/>
-              </a:spcBef>
-              <a:buFont typeface="Arial" panose="020B0604020202020204" pitchFamily="34" charset="0"/>
-              <a:buChar char="•"/>
-              <a:defRPr sz="1800" kern="1200">
-                <a:solidFill>
-                  <a:schemeClr val="tx1"/>
-                </a:solidFill>
-                <a:latin typeface="+mn-lt"/>
-                <a:ea typeface="+mn-ea"/>
-                <a:cs typeface="+mn-cs"/>
-              </a:defRPr>
-            </a:lvl8pPr>
-            <a:lvl9pPr marL="3886200" indent="-228600" algn="l" defTabSz="914400" rtl="0" eaLnBrk="1" latinLnBrk="0" hangingPunct="1">
-              <a:lnSpc>
-                <a:spcPct val="90000"/>
-              </a:lnSpc>
-              <a:spcBef>
-                <a:spcPts val="500"/>
-              </a:spcBef>
-              <a:buFont typeface="Arial" panose="020B0604020202020204" pitchFamily="34" charset="0"/>
-              <a:buChar char="•"/>
-              <a:defRPr sz="1800" kern="1200">
-                <a:solidFill>
-                  <a:schemeClr val="tx1"/>
-                </a:solidFill>
-                <a:latin typeface="+mn-lt"/>
-                <a:ea typeface="+mn-ea"/>
-                <a:cs typeface="+mn-cs"/>
-              </a:defRPr>
-            </a:lvl9pPr>
-          </a:lstStyle>
-          <a:p>
-            <a:pPr marL="457200" indent="-457200">
-              <a:buAutoNum type="arabicPeriod"/>
-            </a:pPr>
-            <a:r>
-              <a:rPr lang="pt-BR" sz="2400" dirty="0">
-                <a:solidFill>
-                  <a:schemeClr val="accent1"/>
-                </a:solidFill>
-                <a:latin typeface="Arial" panose="020B0604020202020204" pitchFamily="34" charset="0"/>
-                <a:cs typeface="Arial" panose="020B0604020202020204" pitchFamily="34" charset="0"/>
-              </a:rPr>
-              <a:t>A implementação usando a função SUM como agregação deu um resultado muito ruim.</a:t>
-            </a:r>
-          </a:p>
-          <a:p>
-            <a:pPr marL="457200" indent="-457200">
-              <a:buAutoNum type="arabicPeriod"/>
-            </a:pPr>
-            <a:endParaRPr lang="pt-BR" sz="2400" dirty="0">
-              <a:solidFill>
-                <a:schemeClr val="accent1"/>
-              </a:solidFill>
-              <a:latin typeface="Arial" panose="020B0604020202020204" pitchFamily="34" charset="0"/>
-              <a:cs typeface="Arial" panose="020B0604020202020204" pitchFamily="34" charset="0"/>
-            </a:endParaRPr>
-          </a:p>
-          <a:p>
-            <a:pPr marL="457200" indent="-457200">
-              <a:buAutoNum type="arabicPeriod"/>
-            </a:pPr>
-            <a:r>
-              <a:rPr lang="pt-BR" sz="2400" dirty="0">
-                <a:solidFill>
-                  <a:schemeClr val="accent1"/>
-                </a:solidFill>
-                <a:latin typeface="Arial" panose="020B0604020202020204" pitchFamily="34" charset="0"/>
-                <a:cs typeface="Arial" panose="020B0604020202020204" pitchFamily="34" charset="0"/>
-              </a:rPr>
-              <a:t>Calcular o score conforme proposto no SPLADEv2 piorou os resultados.</a:t>
-            </a:r>
-          </a:p>
-          <a:p>
-            <a:pPr marL="457200" indent="-457200">
-              <a:buAutoNum type="arabicPeriod"/>
-            </a:pPr>
-            <a:endParaRPr lang="pt-BR" sz="2400" dirty="0">
-              <a:solidFill>
-                <a:schemeClr val="accent1"/>
-              </a:solidFill>
-              <a:latin typeface="Arial" panose="020B0604020202020204" pitchFamily="34" charset="0"/>
-              <a:cs typeface="Arial" panose="020B0604020202020204" pitchFamily="34" charset="0"/>
-            </a:endParaRPr>
-          </a:p>
-          <a:p>
-            <a:pPr marL="457200" indent="-457200">
-              <a:buAutoNum type="arabicPeriod"/>
-            </a:pPr>
-            <a:r>
-              <a:rPr lang="pt-BR" sz="2400" dirty="0">
-                <a:solidFill>
-                  <a:schemeClr val="accent1"/>
-                </a:solidFill>
-                <a:latin typeface="Arial" panose="020B0604020202020204" pitchFamily="34" charset="0"/>
-                <a:cs typeface="Arial" panose="020B0604020202020204" pitchFamily="34" charset="0"/>
-              </a:rPr>
-              <a:t>Parece que a melhor combinação foi a função agregação MAX (SPLADEv2) com o score calculado conforme SPLADEv1.</a:t>
-            </a:r>
-          </a:p>
-          <a:p>
-            <a:pPr marL="457200" indent="-457200">
-              <a:buAutoNum type="arabicPeriod"/>
-            </a:pPr>
-            <a:endParaRPr lang="pt-BR" sz="2400" dirty="0">
-              <a:solidFill>
-                <a:schemeClr val="accent1"/>
-              </a:solidFill>
-              <a:latin typeface="Arial" panose="020B0604020202020204" pitchFamily="34" charset="0"/>
-              <a:cs typeface="Arial" panose="020B0604020202020204" pitchFamily="34" charset="0"/>
-            </a:endParaRPr>
-          </a:p>
-          <a:p>
-            <a:pPr marL="457200" indent="-457200">
-              <a:buAutoNum type="arabicPeriod"/>
-            </a:pPr>
-            <a:endParaRPr lang="pt-BR" sz="2400" dirty="0">
-              <a:solidFill>
-                <a:schemeClr val="accent1"/>
-              </a:solidFill>
-              <a:latin typeface="Arial" panose="020B0604020202020204" pitchFamily="34" charset="0"/>
-              <a:cs typeface="Arial" panose="020B0604020202020204" pitchFamily="34" charset="0"/>
-            </a:endParaRPr>
-          </a:p>
-          <a:p>
-            <a:pPr marL="0" indent="0" algn="ctr">
-              <a:buNone/>
-            </a:pPr>
-            <a:r>
-              <a:rPr lang="pt-BR" sz="2400" dirty="0">
-                <a:solidFill>
-                  <a:schemeClr val="accent1"/>
-                </a:solidFill>
-                <a:latin typeface="Arial" panose="020B0604020202020204" pitchFamily="34" charset="0"/>
-                <a:cs typeface="Arial" panose="020B0604020202020204" pitchFamily="34" charset="0"/>
-              </a:rPr>
-              <a:t>Faz sentido isso? Ou foi algum bug no desenvolvimento?</a:t>
-            </a:r>
-          </a:p>
-        </p:txBody>
-      </p:sp>
-    </p:spTree>
-    <p:extLst>
-      <p:ext uri="{BB962C8B-B14F-4D97-AF65-F5344CB8AC3E}">
-        <p14:creationId xmlns:p14="http://schemas.microsoft.com/office/powerpoint/2010/main" val="227318804"/>
       </p:ext>
     </p:extLst>
   </p:cSld>
@@ -11289,6 +11507,409 @@
           <p:cNvPr id="2" name="Título 1">
             <a:extLst>
               <a:ext uri="{FF2B5EF4-FFF2-40B4-BE49-F238E27FC236}">
+                <a16:creationId xmlns:a16="http://schemas.microsoft.com/office/drawing/2014/main" id="{6719F29B-F233-48AF-8261-F33A4E079E3E}"/>
+              </a:ext>
+            </a:extLst>
+          </p:cNvPr>
+          <p:cNvSpPr>
+            <a:spLocks noGrp="1"/>
+          </p:cNvSpPr>
+          <p:nvPr>
+            <p:ph type="title"/>
+          </p:nvPr>
+        </p:nvSpPr>
+        <p:spPr>
+          <a:xfrm>
+            <a:off x="176168" y="402672"/>
+            <a:ext cx="11325137" cy="729788"/>
+          </a:xfrm>
+        </p:spPr>
+        <p:txBody>
+          <a:bodyPr rtlCol="0">
+            <a:normAutofit/>
+          </a:bodyPr>
+          <a:lstStyle/>
+          <a:p>
+            <a:pPr algn="l" rtl="0"/>
+            <a:r>
+              <a:rPr lang="pt-BR" dirty="0"/>
+              <a:t>Tópico para discussão</a:t>
+            </a:r>
+          </a:p>
+        </p:txBody>
+      </p:sp>
+      <p:sp>
+        <p:nvSpPr>
+          <p:cNvPr id="4" name="Espaço Reservado para o Número do Slide 3">
+            <a:extLst>
+              <a:ext uri="{FF2B5EF4-FFF2-40B4-BE49-F238E27FC236}">
+                <a16:creationId xmlns:a16="http://schemas.microsoft.com/office/drawing/2014/main" id="{328F602C-7F98-4C02-99D4-ED65E00D66A4}"/>
+              </a:ext>
+            </a:extLst>
+          </p:cNvPr>
+          <p:cNvSpPr>
+            <a:spLocks noGrp="1"/>
+          </p:cNvSpPr>
+          <p:nvPr>
+            <p:ph type="sldNum" sz="quarter" idx="12"/>
+          </p:nvPr>
+        </p:nvSpPr>
+        <p:spPr>
+          <a:xfrm>
+            <a:off x="8610600" y="6356350"/>
+            <a:ext cx="2743200" cy="365125"/>
+          </a:xfrm>
+        </p:spPr>
+        <p:txBody>
+          <a:bodyPr rtlCol="0"/>
+          <a:lstStyle/>
+          <a:p>
+            <a:pPr rtl="0"/>
+            <a:fld id="{19B51A1E-902D-48AF-9020-955120F399B6}" type="slidenum">
+              <a:rPr lang="pt-BR" smtClean="0"/>
+              <a:pPr rtl="0"/>
+              <a:t>12</a:t>
+            </a:fld>
+            <a:endParaRPr lang="pt-BR"/>
+          </a:p>
+        </p:txBody>
+      </p:sp>
+      <p:sp>
+        <p:nvSpPr>
+          <p:cNvPr id="20" name="Espaço Reservado para Conteúdo 3">
+            <a:extLst>
+              <a:ext uri="{FF2B5EF4-FFF2-40B4-BE49-F238E27FC236}">
+                <a16:creationId xmlns:a16="http://schemas.microsoft.com/office/drawing/2014/main" id="{A26C9687-67C8-0FE8-0794-47272524905A}"/>
+              </a:ext>
+            </a:extLst>
+          </p:cNvPr>
+          <p:cNvSpPr txBox="1">
+            <a:spLocks/>
+          </p:cNvSpPr>
+          <p:nvPr/>
+        </p:nvSpPr>
+        <p:spPr>
+          <a:xfrm>
+            <a:off x="176168" y="1643152"/>
+            <a:ext cx="11694252" cy="4812176"/>
+          </a:xfrm>
+          <a:prstGeom prst="rect">
+            <a:avLst/>
+          </a:prstGeom>
+        </p:spPr>
+        <p:txBody>
+          <a:bodyPr rtlCol="0">
+            <a:normAutofit/>
+          </a:bodyPr>
+          <a:lstStyle>
+            <a:lvl1pPr marL="228600" indent="-228600" algn="l" defTabSz="914400" rtl="0" eaLnBrk="1" latinLnBrk="0" hangingPunct="1">
+              <a:lnSpc>
+                <a:spcPct val="90000"/>
+              </a:lnSpc>
+              <a:spcBef>
+                <a:spcPts val="1000"/>
+              </a:spcBef>
+              <a:buFont typeface="Arial" panose="020B0604020202020204" pitchFamily="34" charset="0"/>
+              <a:buChar char="•"/>
+              <a:defRPr sz="2800" kern="1200">
+                <a:solidFill>
+                  <a:schemeClr val="tx1"/>
+                </a:solidFill>
+                <a:latin typeface="+mn-lt"/>
+                <a:ea typeface="+mn-ea"/>
+                <a:cs typeface="+mn-cs"/>
+              </a:defRPr>
+            </a:lvl1pPr>
+            <a:lvl2pPr marL="685800" indent="-228600" algn="l" defTabSz="914400" rtl="0" eaLnBrk="1" latinLnBrk="0" hangingPunct="1">
+              <a:lnSpc>
+                <a:spcPct val="90000"/>
+              </a:lnSpc>
+              <a:spcBef>
+                <a:spcPts val="500"/>
+              </a:spcBef>
+              <a:buFont typeface="Arial" panose="020B0604020202020204" pitchFamily="34" charset="0"/>
+              <a:buChar char="•"/>
+              <a:defRPr sz="2400" kern="1200">
+                <a:solidFill>
+                  <a:schemeClr val="tx1"/>
+                </a:solidFill>
+                <a:latin typeface="+mn-lt"/>
+                <a:ea typeface="+mn-ea"/>
+                <a:cs typeface="+mn-cs"/>
+              </a:defRPr>
+            </a:lvl2pPr>
+            <a:lvl3pPr marL="1143000" indent="-228600" algn="l" defTabSz="914400" rtl="0" eaLnBrk="1" latinLnBrk="0" hangingPunct="1">
+              <a:lnSpc>
+                <a:spcPct val="90000"/>
+              </a:lnSpc>
+              <a:spcBef>
+                <a:spcPts val="500"/>
+              </a:spcBef>
+              <a:buFont typeface="Arial" panose="020B0604020202020204" pitchFamily="34" charset="0"/>
+              <a:buChar char="•"/>
+              <a:defRPr sz="2000" kern="1200">
+                <a:solidFill>
+                  <a:schemeClr val="tx1"/>
+                </a:solidFill>
+                <a:latin typeface="+mn-lt"/>
+                <a:ea typeface="+mn-ea"/>
+                <a:cs typeface="+mn-cs"/>
+              </a:defRPr>
+            </a:lvl3pPr>
+            <a:lvl4pPr marL="1600200" indent="-228600" algn="l" defTabSz="914400" rtl="0" eaLnBrk="1" latinLnBrk="0" hangingPunct="1">
+              <a:lnSpc>
+                <a:spcPct val="90000"/>
+              </a:lnSpc>
+              <a:spcBef>
+                <a:spcPts val="500"/>
+              </a:spcBef>
+              <a:buFont typeface="Arial" panose="020B0604020202020204" pitchFamily="34" charset="0"/>
+              <a:buChar char="•"/>
+              <a:defRPr sz="1800" kern="1200">
+                <a:solidFill>
+                  <a:schemeClr val="tx1"/>
+                </a:solidFill>
+                <a:latin typeface="+mn-lt"/>
+                <a:ea typeface="+mn-ea"/>
+                <a:cs typeface="+mn-cs"/>
+              </a:defRPr>
+            </a:lvl4pPr>
+            <a:lvl5pPr marL="2057400" indent="-228600" algn="l" defTabSz="914400" rtl="0" eaLnBrk="1" latinLnBrk="0" hangingPunct="1">
+              <a:lnSpc>
+                <a:spcPct val="90000"/>
+              </a:lnSpc>
+              <a:spcBef>
+                <a:spcPts val="500"/>
+              </a:spcBef>
+              <a:buFont typeface="Arial" panose="020B0604020202020204" pitchFamily="34" charset="0"/>
+              <a:buChar char="•"/>
+              <a:defRPr sz="1800" kern="1200">
+                <a:solidFill>
+                  <a:schemeClr val="tx1"/>
+                </a:solidFill>
+                <a:latin typeface="+mn-lt"/>
+                <a:ea typeface="+mn-ea"/>
+                <a:cs typeface="+mn-cs"/>
+              </a:defRPr>
+            </a:lvl5pPr>
+            <a:lvl6pPr marL="2514600" indent="-228600" algn="l" defTabSz="914400" rtl="0" eaLnBrk="1" latinLnBrk="0" hangingPunct="1">
+              <a:lnSpc>
+                <a:spcPct val="90000"/>
+              </a:lnSpc>
+              <a:spcBef>
+                <a:spcPts val="500"/>
+              </a:spcBef>
+              <a:buFont typeface="Arial" panose="020B0604020202020204" pitchFamily="34" charset="0"/>
+              <a:buChar char="•"/>
+              <a:defRPr sz="1800" kern="1200">
+                <a:solidFill>
+                  <a:schemeClr val="tx1"/>
+                </a:solidFill>
+                <a:latin typeface="+mn-lt"/>
+                <a:ea typeface="+mn-ea"/>
+                <a:cs typeface="+mn-cs"/>
+              </a:defRPr>
+            </a:lvl6pPr>
+            <a:lvl7pPr marL="2971800" indent="-228600" algn="l" defTabSz="914400" rtl="0" eaLnBrk="1" latinLnBrk="0" hangingPunct="1">
+              <a:lnSpc>
+                <a:spcPct val="90000"/>
+              </a:lnSpc>
+              <a:spcBef>
+                <a:spcPts val="500"/>
+              </a:spcBef>
+              <a:buFont typeface="Arial" panose="020B0604020202020204" pitchFamily="34" charset="0"/>
+              <a:buChar char="•"/>
+              <a:defRPr sz="1800" kern="1200">
+                <a:solidFill>
+                  <a:schemeClr val="tx1"/>
+                </a:solidFill>
+                <a:latin typeface="+mn-lt"/>
+                <a:ea typeface="+mn-ea"/>
+                <a:cs typeface="+mn-cs"/>
+              </a:defRPr>
+            </a:lvl7pPr>
+            <a:lvl8pPr marL="3429000" indent="-228600" algn="l" defTabSz="914400" rtl="0" eaLnBrk="1" latinLnBrk="0" hangingPunct="1">
+              <a:lnSpc>
+                <a:spcPct val="90000"/>
+              </a:lnSpc>
+              <a:spcBef>
+                <a:spcPts val="500"/>
+              </a:spcBef>
+              <a:buFont typeface="Arial" panose="020B0604020202020204" pitchFamily="34" charset="0"/>
+              <a:buChar char="•"/>
+              <a:defRPr sz="1800" kern="1200">
+                <a:solidFill>
+                  <a:schemeClr val="tx1"/>
+                </a:solidFill>
+                <a:latin typeface="+mn-lt"/>
+                <a:ea typeface="+mn-ea"/>
+                <a:cs typeface="+mn-cs"/>
+              </a:defRPr>
+            </a:lvl8pPr>
+            <a:lvl9pPr marL="3886200" indent="-228600" algn="l" defTabSz="914400" rtl="0" eaLnBrk="1" latinLnBrk="0" hangingPunct="1">
+              <a:lnSpc>
+                <a:spcPct val="90000"/>
+              </a:lnSpc>
+              <a:spcBef>
+                <a:spcPts val="500"/>
+              </a:spcBef>
+              <a:buFont typeface="Arial" panose="020B0604020202020204" pitchFamily="34" charset="0"/>
+              <a:buChar char="•"/>
+              <a:defRPr sz="1800" kern="1200">
+                <a:solidFill>
+                  <a:schemeClr val="tx1"/>
+                </a:solidFill>
+                <a:latin typeface="+mn-lt"/>
+                <a:ea typeface="+mn-ea"/>
+                <a:cs typeface="+mn-cs"/>
+              </a:defRPr>
+            </a:lvl9pPr>
+          </a:lstStyle>
+          <a:p>
+            <a:pPr marL="457200" indent="-457200">
+              <a:buAutoNum type="arabicPeriod"/>
+            </a:pPr>
+            <a:r>
+              <a:rPr lang="pt-BR" sz="2400" dirty="0">
+                <a:solidFill>
+                  <a:schemeClr val="accent1"/>
+                </a:solidFill>
+                <a:latin typeface="Arial" panose="020B0604020202020204" pitchFamily="34" charset="0"/>
+                <a:cs typeface="Arial" panose="020B0604020202020204" pitchFamily="34" charset="0"/>
+              </a:rPr>
+              <a:t>A implementação usando a função SUM como agregação deu um resultado muito ruim.</a:t>
+            </a:r>
+          </a:p>
+          <a:p>
+            <a:pPr marL="457200" indent="-457200">
+              <a:buAutoNum type="arabicPeriod"/>
+            </a:pPr>
+            <a:endParaRPr lang="pt-BR" sz="2400" dirty="0">
+              <a:solidFill>
+                <a:schemeClr val="accent1"/>
+              </a:solidFill>
+              <a:latin typeface="Arial" panose="020B0604020202020204" pitchFamily="34" charset="0"/>
+              <a:cs typeface="Arial" panose="020B0604020202020204" pitchFamily="34" charset="0"/>
+            </a:endParaRPr>
+          </a:p>
+          <a:p>
+            <a:pPr marL="457200" indent="-457200">
+              <a:buAutoNum type="arabicPeriod"/>
+            </a:pPr>
+            <a:r>
+              <a:rPr lang="pt-BR" sz="2400" dirty="0">
+                <a:solidFill>
+                  <a:schemeClr val="accent1"/>
+                </a:solidFill>
+                <a:latin typeface="Arial" panose="020B0604020202020204" pitchFamily="34" charset="0"/>
+                <a:cs typeface="Arial" panose="020B0604020202020204" pitchFamily="34" charset="0"/>
+              </a:rPr>
+              <a:t>Calcular o score conforme proposto no SPLADEv2 piorou os resultados.</a:t>
+            </a:r>
+          </a:p>
+          <a:p>
+            <a:pPr marL="457200" indent="-457200">
+              <a:buAutoNum type="arabicPeriod"/>
+            </a:pPr>
+            <a:endParaRPr lang="pt-BR" sz="2400" dirty="0">
+              <a:solidFill>
+                <a:schemeClr val="accent1"/>
+              </a:solidFill>
+              <a:latin typeface="Arial" panose="020B0604020202020204" pitchFamily="34" charset="0"/>
+              <a:cs typeface="Arial" panose="020B0604020202020204" pitchFamily="34" charset="0"/>
+            </a:endParaRPr>
+          </a:p>
+          <a:p>
+            <a:pPr marL="457200" indent="-457200">
+              <a:buAutoNum type="arabicPeriod"/>
+            </a:pPr>
+            <a:r>
+              <a:rPr lang="pt-BR" sz="2400" dirty="0">
+                <a:solidFill>
+                  <a:schemeClr val="accent1"/>
+                </a:solidFill>
+                <a:latin typeface="Arial" panose="020B0604020202020204" pitchFamily="34" charset="0"/>
+                <a:cs typeface="Arial" panose="020B0604020202020204" pitchFamily="34" charset="0"/>
+              </a:rPr>
+              <a:t>Parece que a melhor combinação foi a função agregação MAX (SPLADEv2) com o score calculado conforme SPLADEv1.</a:t>
+            </a:r>
+          </a:p>
+          <a:p>
+            <a:pPr marL="457200" indent="-457200">
+              <a:buAutoNum type="arabicPeriod"/>
+            </a:pPr>
+            <a:endParaRPr lang="pt-BR" sz="2400" dirty="0">
+              <a:solidFill>
+                <a:schemeClr val="accent1"/>
+              </a:solidFill>
+              <a:latin typeface="Arial" panose="020B0604020202020204" pitchFamily="34" charset="0"/>
+              <a:cs typeface="Arial" panose="020B0604020202020204" pitchFamily="34" charset="0"/>
+            </a:endParaRPr>
+          </a:p>
+          <a:p>
+            <a:pPr marL="457200" indent="-457200">
+              <a:buAutoNum type="arabicPeriod"/>
+            </a:pPr>
+            <a:endParaRPr lang="pt-BR" sz="2400" dirty="0">
+              <a:solidFill>
+                <a:schemeClr val="accent1"/>
+              </a:solidFill>
+              <a:latin typeface="Arial" panose="020B0604020202020204" pitchFamily="34" charset="0"/>
+              <a:cs typeface="Arial" panose="020B0604020202020204" pitchFamily="34" charset="0"/>
+            </a:endParaRPr>
+          </a:p>
+          <a:p>
+            <a:pPr marL="0" indent="0" algn="ctr">
+              <a:buNone/>
+            </a:pPr>
+            <a:r>
+              <a:rPr lang="pt-BR" sz="2400" dirty="0">
+                <a:solidFill>
+                  <a:schemeClr val="accent1"/>
+                </a:solidFill>
+                <a:latin typeface="Arial" panose="020B0604020202020204" pitchFamily="34" charset="0"/>
+                <a:cs typeface="Arial" panose="020B0604020202020204" pitchFamily="34" charset="0"/>
+              </a:rPr>
+              <a:t>Faz sentido isso? Ou foi algum bug no desenvolvimento?</a:t>
+            </a:r>
+          </a:p>
+        </p:txBody>
+      </p:sp>
+    </p:spTree>
+    <p:extLst>
+      <p:ext uri="{BB962C8B-B14F-4D97-AF65-F5344CB8AC3E}">
+        <p14:creationId xmlns:p14="http://schemas.microsoft.com/office/powerpoint/2010/main" val="227318804"/>
+      </p:ext>
+    </p:extLst>
+  </p:cSld>
+  <p:clrMapOvr>
+    <a:masterClrMapping/>
+  </p:clrMapOvr>
+</p:sld>
+</file>
+
+<file path=ppt/slides/slide13.xml><?xml version="1.0" encoding="utf-8"?>
+<p:sld xmlns:a="http://schemas.openxmlformats.org/drawingml/2006/main" xmlns:r="http://schemas.openxmlformats.org/officeDocument/2006/relationships" xmlns:p="http://schemas.openxmlformats.org/presentationml/2006/main">
+  <p:cSld>
+    <p:spTree>
+      <p:nvGrpSpPr>
+        <p:cNvPr id="1" name=""/>
+        <p:cNvGrpSpPr/>
+        <p:nvPr/>
+      </p:nvGrpSpPr>
+      <p:grpSpPr>
+        <a:xfrm>
+          <a:off x="0" y="0"/>
+          <a:ext cx="0" cy="0"/>
+          <a:chOff x="0" y="0"/>
+          <a:chExt cx="0" cy="0"/>
+        </a:xfrm>
+      </p:grpSpPr>
+      <p:sp>
+        <p:nvSpPr>
+          <p:cNvPr id="2" name="Título 1">
+            <a:extLst>
+              <a:ext uri="{FF2B5EF4-FFF2-40B4-BE49-F238E27FC236}">
                 <a16:creationId xmlns:a16="http://schemas.microsoft.com/office/drawing/2014/main" id="{BCCAEE93-8585-46D4-A7EC-F184E317CB2E}"/>
               </a:ext>
             </a:extLst>
@@ -11391,7 +12012,7 @@
             <a:fld id="{B5CEABB6-07DC-46E8-9B57-56EC44A396E5}" type="slidenum">
               <a:rPr lang="pt-BR" smtClean="0"/>
               <a:pPr rtl="0"/>
-              <a:t>12</a:t>
+              <a:t>13</a:t>
             </a:fld>
             <a:endParaRPr lang="pt-BR"/>
           </a:p>
@@ -17746,8 +18367,8 @@
         </p:nvSpPr>
         <p:spPr>
           <a:xfrm>
-            <a:off x="6462445" y="5157627"/>
-            <a:ext cx="5198724" cy="923330"/>
+            <a:off x="6471072" y="4918022"/>
+            <a:ext cx="5198724" cy="1477328"/>
           </a:xfrm>
           <a:prstGeom prst="rect">
             <a:avLst/>
@@ -17761,133 +18382,10 @@
           <a:lstStyle/>
           <a:p>
             <a:r>
-              <a:rPr lang="pt-BR" dirty="0" err="1"/>
-              <a:t>to</a:t>
-            </a:r>
-            <a:r>
-              <a:rPr lang="pt-BR" dirty="0"/>
-              <a:t>, </a:t>
-            </a:r>
-            <a:r>
-              <a:rPr lang="pt-BR" dirty="0" err="1"/>
-              <a:t>where</a:t>
-            </a:r>
-            <a:r>
-              <a:rPr lang="pt-BR" dirty="0"/>
-              <a:t>, later, food, </a:t>
-            </a:r>
-            <a:r>
-              <a:rPr lang="pt-BR" dirty="0" err="1"/>
-              <a:t>guy</a:t>
-            </a:r>
-            <a:r>
-              <a:rPr lang="pt-BR" dirty="0"/>
-              <a:t>, </a:t>
-            </a:r>
-            <a:r>
-              <a:rPr lang="pt-BR" dirty="0" err="1"/>
-              <a:t>places</a:t>
-            </a:r>
-            <a:r>
-              <a:rPr lang="pt-BR" dirty="0"/>
-              <a:t>, box, </a:t>
-            </a:r>
-            <a:r>
-              <a:rPr lang="pt-BR" dirty="0" err="1"/>
-              <a:t>mike</a:t>
-            </a:r>
-            <a:r>
-              <a:rPr lang="pt-BR" dirty="0"/>
-              <a:t>, </a:t>
-            </a:r>
-            <a:r>
-              <a:rPr lang="pt-BR" dirty="0" err="1"/>
-              <a:t>joe</a:t>
-            </a:r>
-            <a:r>
-              <a:rPr lang="pt-BR" dirty="0"/>
-              <a:t>, </a:t>
-            </a:r>
-            <a:r>
-              <a:rPr lang="pt-BR" dirty="0" err="1"/>
-              <a:t>tony</a:t>
-            </a:r>
-            <a:r>
-              <a:rPr lang="pt-BR" dirty="0"/>
-              <a:t>, </a:t>
-            </a:r>
-            <a:r>
-              <a:rPr lang="pt-BR" dirty="0" err="1"/>
-              <a:t>eat</a:t>
-            </a:r>
-            <a:r>
-              <a:rPr lang="pt-BR" dirty="0"/>
-              <a:t>, </a:t>
-            </a:r>
-            <a:r>
-              <a:rPr lang="pt-BR" dirty="0" err="1"/>
-              <a:t>restaurant</a:t>
-            </a:r>
-            <a:r>
-              <a:rPr lang="pt-BR" dirty="0"/>
-              <a:t>, </a:t>
-            </a:r>
-            <a:r>
-              <a:rPr lang="pt-BR" dirty="0" err="1"/>
-              <a:t>alan</a:t>
-            </a:r>
-            <a:r>
-              <a:rPr lang="pt-BR" dirty="0"/>
-              <a:t>, cole, </a:t>
-            </a:r>
-            <a:r>
-              <a:rPr lang="pt-BR" dirty="0" err="1"/>
-              <a:t>dick</a:t>
-            </a:r>
-            <a:r>
-              <a:rPr lang="pt-BR" dirty="0"/>
-              <a:t>, </a:t>
-            </a:r>
-            <a:r>
-              <a:rPr lang="pt-BR" dirty="0" err="1"/>
-              <a:t>bite</a:t>
-            </a:r>
-            <a:r>
-              <a:rPr lang="pt-BR" dirty="0"/>
-              <a:t>, </a:t>
-            </a:r>
-            <a:r>
-              <a:rPr lang="pt-BR" dirty="0" err="1"/>
-              <a:t>pat</a:t>
-            </a:r>
-            <a:r>
-              <a:rPr lang="pt-BR" dirty="0"/>
-              <a:t>, </a:t>
-            </a:r>
-            <a:r>
-              <a:rPr lang="pt-BR" dirty="0" err="1"/>
-              <a:t>package</a:t>
-            </a:r>
-            <a:r>
-              <a:rPr lang="pt-BR" dirty="0"/>
-              <a:t>, </a:t>
-            </a:r>
-            <a:r>
-              <a:rPr lang="pt-BR" dirty="0" err="1"/>
-              <a:t>cab</a:t>
-            </a:r>
-            <a:r>
-              <a:rPr lang="pt-BR" dirty="0"/>
-              <a:t>, pizza, </a:t>
-            </a:r>
-            <a:r>
-              <a:rPr lang="pt-BR" dirty="0" err="1"/>
-              <a:t>toby</a:t>
-            </a:r>
-            <a:r>
-              <a:rPr lang="pt-BR" dirty="0"/>
-              <a:t>, domino</a:t>
-            </a:r>
+              <a:rPr lang="en-US" dirty="0"/>
+              <a:t>anywhere best cafe country culture eat eating famous farm favorite food habitat headquarters hotel location locations murphy pie pizza place places restaurant restaurants shop that venue visit where</a:t>
+            </a:r>
+            <a:endParaRPr lang="pt-BR" dirty="0"/>
           </a:p>
         </p:txBody>
       </p:sp>
@@ -17906,7 +18404,7 @@
         <p:spPr>
           <a:xfrm>
             <a:off x="6386165" y="3684625"/>
-            <a:ext cx="5198724" cy="369332"/>
+            <a:ext cx="5198724" cy="646331"/>
           </a:xfrm>
           <a:prstGeom prst="rect">
             <a:avLst/>
@@ -17920,49 +18418,34 @@
           <a:lstStyle/>
           <a:p>
             <a:r>
-              <a:rPr lang="pt-BR" dirty="0"/>
-              <a:t>are, </a:t>
-            </a:r>
-            <a:r>
-              <a:rPr lang="pt-BR" dirty="0" err="1"/>
-              <a:t>him</a:t>
-            </a:r>
-            <a:r>
-              <a:rPr lang="pt-BR" dirty="0"/>
-              <a:t>, </a:t>
-            </a:r>
-            <a:r>
-              <a:rPr lang="pt-BR" dirty="0" err="1"/>
-              <a:t>where</a:t>
-            </a:r>
-            <a:r>
-              <a:rPr lang="pt-BR" dirty="0"/>
-              <a:t>, food, </a:t>
-            </a:r>
-            <a:r>
-              <a:rPr lang="pt-BR" dirty="0" err="1"/>
-              <a:t>phone</a:t>
-            </a:r>
-            <a:r>
-              <a:rPr lang="pt-BR" dirty="0"/>
-              <a:t>, </a:t>
-            </a:r>
-            <a:r>
-              <a:rPr lang="pt-BR" dirty="0" err="1"/>
-              <a:t>movie</a:t>
-            </a:r>
-            <a:r>
-              <a:rPr lang="pt-BR" dirty="0"/>
-              <a:t>, store, </a:t>
-            </a:r>
-            <a:r>
-              <a:rPr lang="pt-BR" dirty="0" err="1"/>
-              <a:t>eat</a:t>
-            </a:r>
-            <a:r>
-              <a:rPr lang="pt-BR" dirty="0"/>
-              <a:t>, pizza</a:t>
-            </a:r>
+              <a:rPr lang="en-US" dirty="0"/>
+              <a:t>' , - . / a cheese </a:t>
+            </a:r>
+            <a:r>
+              <a:rPr lang="en-US" dirty="0" err="1"/>
+              <a:t>dave</a:t>
+            </a:r>
+            <a:r>
+              <a:rPr lang="en-US" dirty="0"/>
+              <a:t> </a:t>
+            </a:r>
+            <a:r>
+              <a:rPr lang="en-US" dirty="0" err="1"/>
+              <a:t>dom</a:t>
+            </a:r>
+            <a:r>
+              <a:rPr lang="en-US" dirty="0"/>
+              <a:t> food </a:t>
+            </a:r>
+            <a:r>
+              <a:rPr lang="en-US" dirty="0" err="1"/>
+              <a:t>fred</a:t>
+            </a:r>
+            <a:r>
+              <a:rPr lang="en-US" dirty="0"/>
+              <a:t> is meat pie pizza restaurant smith the</a:t>
+            </a:r>
+            <a:endParaRPr lang="pt-BR" dirty="0"/>
           </a:p>
         </p:txBody>
       </p:sp>
@@ -19868,7 +20351,7 @@
         </p:spPr>
         <p:txBody>
           <a:bodyPr rtlCol="0">
-            <a:normAutofit fontScale="92500" lnSpcReduction="10000"/>
+            <a:normAutofit/>
           </a:bodyPr>
           <a:lstStyle>
             <a:lvl1pPr marL="228600" indent="-228600" algn="l" defTabSz="914400" rtl="0" eaLnBrk="1" latinLnBrk="0" hangingPunct="1">
@@ -21163,258 +21646,6 @@
               <a:latin typeface="Arial" panose="020B0604020202020204" pitchFamily="34" charset="0"/>
               <a:cs typeface="Arial" panose="020B0604020202020204" pitchFamily="34" charset="0"/>
             </a:endParaRPr>
-          </a:p>
-          <a:p>
-            <a:pPr marL="0" indent="0">
-              <a:buNone/>
-            </a:pPr>
-            <a:r>
-              <a:rPr lang="en-US" sz="2400" dirty="0" err="1">
-                <a:solidFill>
-                  <a:schemeClr val="accent1"/>
-                </a:solidFill>
-                <a:latin typeface="Arial" panose="020B0604020202020204" pitchFamily="34" charset="0"/>
-                <a:cs typeface="Arial" panose="020B0604020202020204" pitchFamily="34" charset="0"/>
-              </a:rPr>
-              <a:t>Apesar</a:t>
-            </a:r>
-            <a:r>
-              <a:rPr lang="en-US" sz="2400" dirty="0">
-                <a:solidFill>
-                  <a:schemeClr val="accent1"/>
-                </a:solidFill>
-                <a:latin typeface="Arial" panose="020B0604020202020204" pitchFamily="34" charset="0"/>
-                <a:cs typeface="Arial" panose="020B0604020202020204" pitchFamily="34" charset="0"/>
-              </a:rPr>
-              <a:t> </a:t>
-            </a:r>
-            <a:r>
-              <a:rPr lang="en-US" sz="2400" dirty="0" err="1">
-                <a:solidFill>
-                  <a:schemeClr val="accent1"/>
-                </a:solidFill>
-                <a:latin typeface="Arial" panose="020B0604020202020204" pitchFamily="34" charset="0"/>
-                <a:cs typeface="Arial" panose="020B0604020202020204" pitchFamily="34" charset="0"/>
-              </a:rPr>
-              <a:t>disso</a:t>
-            </a:r>
-            <a:r>
-              <a:rPr lang="en-US" sz="2400" dirty="0">
-                <a:solidFill>
-                  <a:schemeClr val="accent1"/>
-                </a:solidFill>
-                <a:latin typeface="Arial" panose="020B0604020202020204" pitchFamily="34" charset="0"/>
-                <a:cs typeface="Arial" panose="020B0604020202020204" pitchFamily="34" charset="0"/>
-              </a:rPr>
-              <a:t>, </a:t>
-            </a:r>
-            <a:r>
-              <a:rPr lang="en-US" sz="2400" dirty="0" err="1">
-                <a:solidFill>
-                  <a:schemeClr val="accent1"/>
-                </a:solidFill>
-                <a:latin typeface="Arial" panose="020B0604020202020204" pitchFamily="34" charset="0"/>
-                <a:cs typeface="Arial" panose="020B0604020202020204" pitchFamily="34" charset="0"/>
-              </a:rPr>
-              <a:t>parece</a:t>
-            </a:r>
-            <a:r>
-              <a:rPr lang="en-US" sz="2400" dirty="0">
-                <a:solidFill>
-                  <a:schemeClr val="accent1"/>
-                </a:solidFill>
-                <a:latin typeface="Arial" panose="020B0604020202020204" pitchFamily="34" charset="0"/>
-                <a:cs typeface="Arial" panose="020B0604020202020204" pitchFamily="34" charset="0"/>
-              </a:rPr>
-              <a:t> que o </a:t>
-            </a:r>
-            <a:r>
-              <a:rPr lang="en-US" sz="2400" dirty="0" err="1">
-                <a:solidFill>
-                  <a:schemeClr val="accent1"/>
-                </a:solidFill>
-                <a:latin typeface="Arial" panose="020B0604020202020204" pitchFamily="34" charset="0"/>
-                <a:cs typeface="Arial" panose="020B0604020202020204" pitchFamily="34" charset="0"/>
-              </a:rPr>
-              <a:t>resultado</a:t>
-            </a:r>
-            <a:r>
-              <a:rPr lang="en-US" sz="2400" dirty="0">
-                <a:solidFill>
-                  <a:schemeClr val="accent1"/>
-                </a:solidFill>
-                <a:latin typeface="Arial" panose="020B0604020202020204" pitchFamily="34" charset="0"/>
-                <a:cs typeface="Arial" panose="020B0604020202020204" pitchFamily="34" charset="0"/>
-              </a:rPr>
-              <a:t> final </a:t>
-            </a:r>
-            <a:r>
-              <a:rPr lang="en-US" sz="2400" dirty="0" err="1">
-                <a:solidFill>
-                  <a:schemeClr val="accent1"/>
-                </a:solidFill>
-                <a:latin typeface="Arial" panose="020B0604020202020204" pitchFamily="34" charset="0"/>
-                <a:cs typeface="Arial" panose="020B0604020202020204" pitchFamily="34" charset="0"/>
-              </a:rPr>
-              <a:t>não</a:t>
-            </a:r>
-            <a:r>
-              <a:rPr lang="en-US" sz="2400" dirty="0">
-                <a:solidFill>
-                  <a:schemeClr val="accent1"/>
-                </a:solidFill>
-                <a:latin typeface="Arial" panose="020B0604020202020204" pitchFamily="34" charset="0"/>
-                <a:cs typeface="Arial" panose="020B0604020202020204" pitchFamily="34" charset="0"/>
-              </a:rPr>
-              <a:t> </a:t>
-            </a:r>
-            <a:r>
-              <a:rPr lang="en-US" sz="2400" dirty="0" err="1">
-                <a:solidFill>
-                  <a:schemeClr val="accent1"/>
-                </a:solidFill>
-                <a:latin typeface="Arial" panose="020B0604020202020204" pitchFamily="34" charset="0"/>
-                <a:cs typeface="Arial" panose="020B0604020202020204" pitchFamily="34" charset="0"/>
-              </a:rPr>
-              <a:t>impacta</a:t>
-            </a:r>
-            <a:r>
-              <a:rPr lang="en-US" sz="2400" dirty="0">
-                <a:solidFill>
-                  <a:schemeClr val="accent1"/>
-                </a:solidFill>
-                <a:latin typeface="Arial" panose="020B0604020202020204" pitchFamily="34" charset="0"/>
-                <a:cs typeface="Arial" panose="020B0604020202020204" pitchFamily="34" charset="0"/>
-              </a:rPr>
-              <a:t> </a:t>
-            </a:r>
-            <a:r>
-              <a:rPr lang="en-US" sz="2400" dirty="0" err="1">
-                <a:solidFill>
-                  <a:schemeClr val="accent1"/>
-                </a:solidFill>
-                <a:latin typeface="Arial" panose="020B0604020202020204" pitchFamily="34" charset="0"/>
-                <a:cs typeface="Arial" panose="020B0604020202020204" pitchFamily="34" charset="0"/>
-              </a:rPr>
-              <a:t>muito</a:t>
-            </a:r>
-            <a:r>
-              <a:rPr lang="en-US" sz="2400" dirty="0">
-                <a:solidFill>
-                  <a:schemeClr val="accent1"/>
-                </a:solidFill>
-                <a:latin typeface="Arial" panose="020B0604020202020204" pitchFamily="34" charset="0"/>
-                <a:cs typeface="Arial" panose="020B0604020202020204" pitchFamily="34" charset="0"/>
-              </a:rPr>
-              <a:t>. </a:t>
-            </a:r>
-            <a:r>
-              <a:rPr lang="en-US" sz="2400" dirty="0" err="1">
-                <a:solidFill>
-                  <a:schemeClr val="accent1"/>
-                </a:solidFill>
-                <a:latin typeface="Arial" panose="020B0604020202020204" pitchFamily="34" charset="0"/>
-                <a:cs typeface="Arial" panose="020B0604020202020204" pitchFamily="34" charset="0"/>
-              </a:rPr>
-              <a:t>Em</a:t>
-            </a:r>
-            <a:r>
-              <a:rPr lang="en-US" sz="2400" dirty="0">
-                <a:solidFill>
-                  <a:schemeClr val="accent1"/>
-                </a:solidFill>
-                <a:latin typeface="Arial" panose="020B0604020202020204" pitchFamily="34" charset="0"/>
-                <a:cs typeface="Arial" panose="020B0604020202020204" pitchFamily="34" charset="0"/>
-              </a:rPr>
-              <a:t> um dos testes, nDCG@10 de 0.7276 (</a:t>
-            </a:r>
-            <a:r>
-              <a:rPr lang="en-US" sz="2400" dirty="0" err="1">
-                <a:solidFill>
-                  <a:schemeClr val="accent1"/>
-                </a:solidFill>
-                <a:latin typeface="Arial" panose="020B0604020202020204" pitchFamily="34" charset="0"/>
-                <a:cs typeface="Arial" panose="020B0604020202020204" pitchFamily="34" charset="0"/>
-              </a:rPr>
-              <a:t>removendo</a:t>
-            </a:r>
-            <a:r>
-              <a:rPr lang="en-US" sz="2400" dirty="0">
-                <a:solidFill>
-                  <a:schemeClr val="accent1"/>
-                </a:solidFill>
-                <a:latin typeface="Arial" panose="020B0604020202020204" pitchFamily="34" charset="0"/>
-                <a:cs typeface="Arial" panose="020B0604020202020204" pitchFamily="34" charset="0"/>
-              </a:rPr>
-              <a:t>) versus 0.7290 (</a:t>
-            </a:r>
-            <a:r>
-              <a:rPr lang="en-US" sz="2400" dirty="0" err="1">
-                <a:solidFill>
-                  <a:schemeClr val="accent1"/>
-                </a:solidFill>
-                <a:latin typeface="Arial" panose="020B0604020202020204" pitchFamily="34" charset="0"/>
-                <a:cs typeface="Arial" panose="020B0604020202020204" pitchFamily="34" charset="0"/>
-              </a:rPr>
-              <a:t>não</a:t>
-            </a:r>
-            <a:r>
-              <a:rPr lang="en-US" sz="2400" dirty="0">
-                <a:solidFill>
-                  <a:schemeClr val="accent1"/>
-                </a:solidFill>
-                <a:latin typeface="Arial" panose="020B0604020202020204" pitchFamily="34" charset="0"/>
-                <a:cs typeface="Arial" panose="020B0604020202020204" pitchFamily="34" charset="0"/>
-              </a:rPr>
-              <a:t> </a:t>
-            </a:r>
-            <a:r>
-              <a:rPr lang="en-US" sz="2400" dirty="0" err="1">
-                <a:solidFill>
-                  <a:schemeClr val="accent1"/>
-                </a:solidFill>
-                <a:latin typeface="Arial" panose="020B0604020202020204" pitchFamily="34" charset="0"/>
-                <a:cs typeface="Arial" panose="020B0604020202020204" pitchFamily="34" charset="0"/>
-              </a:rPr>
-              <a:t>removendo</a:t>
-            </a:r>
-            <a:r>
-              <a:rPr lang="en-US" sz="2400" dirty="0">
-                <a:solidFill>
-                  <a:schemeClr val="accent1"/>
-                </a:solidFill>
-                <a:latin typeface="Arial" panose="020B0604020202020204" pitchFamily="34" charset="0"/>
-                <a:cs typeface="Arial" panose="020B0604020202020204" pitchFamily="34" charset="0"/>
-              </a:rPr>
-              <a:t>).</a:t>
-            </a:r>
-          </a:p>
-          <a:p>
-            <a:pPr marL="0" indent="0">
-              <a:buNone/>
-            </a:pPr>
-            <a:endParaRPr lang="en-US" sz="2400" dirty="0">
-              <a:solidFill>
-                <a:schemeClr val="accent1"/>
-              </a:solidFill>
-              <a:latin typeface="Arial" panose="020B0604020202020204" pitchFamily="34" charset="0"/>
-              <a:cs typeface="Arial" panose="020B0604020202020204" pitchFamily="34" charset="0"/>
-            </a:endParaRPr>
-          </a:p>
-          <a:p>
-            <a:pPr marL="0" indent="0">
-              <a:buNone/>
-            </a:pPr>
-            <a:r>
-              <a:rPr lang="pt-BR" sz="2400" i="1" dirty="0">
-                <a:solidFill>
-                  <a:schemeClr val="accent1"/>
-                </a:solidFill>
-                <a:latin typeface="Arial" panose="020B0604020202020204" pitchFamily="34" charset="0"/>
-                <a:cs typeface="Arial" panose="020B0604020202020204" pitchFamily="34" charset="0"/>
-              </a:rPr>
-              <a:t>	=&gt; Isso reduz o tamanho do índice sem muita perda de qualidade</a:t>
-            </a:r>
           </a:p>
         </p:txBody>
       </p:sp>
@@ -22564,18 +22795,18 @@
 <file path=customXml/itemProps3.xml><?xml version="1.0" encoding="utf-8"?>
 <ds:datastoreItem xmlns:ds="http://schemas.openxmlformats.org/officeDocument/2006/customXml" ds:itemID="{CA4F7154-AFAC-4BE7-8A74-7F4B6FC2743C}">
   <ds:schemaRefs>
-    <ds:schemaRef ds:uri="http://purl.org/dc/dcmitype/"/>
-    <ds:schemaRef ds:uri="http://purl.org/dc/elements/1.1/"/>
+    <ds:schemaRef ds:uri="http://www.w3.org/XML/1998/namespace"/>
     <ds:schemaRef ds:uri="http://schemas.microsoft.com/office/2006/documentManagement/types"/>
     <ds:schemaRef ds:uri="http://schemas.microsoft.com/office/infopath/2007/PartnerControls"/>
+    <ds:schemaRef ds:uri="http://purl.org/dc/dcmitype/"/>
+    <ds:schemaRef ds:uri="71af3243-3dd4-4a8d-8c0d-dd76da1f02a5"/>
     <ds:schemaRef ds:uri="http://schemas.openxmlformats.org/package/2006/metadata/core-properties"/>
     <ds:schemaRef ds:uri="http://purl.org/dc/terms/"/>
+    <ds:schemaRef ds:uri="230e9df3-be65-4c73-a93b-d1236ebd677e"/>
     <ds:schemaRef ds:uri="http://schemas.microsoft.com/office/2006/metadata/properties"/>
+    <ds:schemaRef ds:uri="16c05727-aa75-4e4a-9b5f-8a80a1165891"/>
     <ds:schemaRef ds:uri="http://schemas.microsoft.com/sharepoint/v3"/>
-    <ds:schemaRef ds:uri="230e9df3-be65-4c73-a93b-d1236ebd677e"/>
-    <ds:schemaRef ds:uri="16c05727-aa75-4e4a-9b5f-8a80a1165891"/>
-    <ds:schemaRef ds:uri="71af3243-3dd4-4a8d-8c0d-dd76da1f02a5"/>
-    <ds:schemaRef ds:uri="http://www.w3.org/XML/1998/namespace"/>
+    <ds:schemaRef ds:uri="http://purl.org/dc/elements/1.1/"/>
   </ds:schemaRefs>
 </ds:datastoreItem>
 </file>

</xml_diff>

<commit_message>
Adiciona dados da aula 7
</commit_message>
<xml_diff>
--- a/7 - splade/notebook/apresentacao_splade.pptx
+++ b/7 - splade/notebook/apresentacao_splade.pptx
@@ -10163,7 +10163,7 @@
         </p:spPr>
         <p:txBody>
           <a:bodyPr rtlCol="0">
-            <a:normAutofit/>
+            <a:normAutofit lnSpcReduction="10000"/>
           </a:bodyPr>
           <a:lstStyle>
             <a:lvl1pPr marL="228600" indent="-228600" algn="l" defTabSz="914400" rtl="0" eaLnBrk="1" latinLnBrk="0" hangingPunct="1">
@@ -10331,6 +10331,9 @@
           </a:lstStyle>
           <a:p>
             <a:pPr marL="0" indent="0" algn="ctr">
+              <a:lnSpc>
+                <a:spcPct val="100000"/>
+              </a:lnSpc>
               <a:buNone/>
             </a:pPr>
             <a:r>
@@ -10341,11 +10344,14 @@
                 <a:latin typeface="Arial" panose="020B0604020202020204" pitchFamily="34" charset="0"/>
                 <a:cs typeface="Arial" panose="020B0604020202020204" pitchFamily="34" charset="0"/>
               </a:rPr>
-              <a:t>Mas os tokens extraídos do CLS/SEP parece não ser muito relevantes</a:t>
+              <a:t>Parece que os tokens extraídos do CLS/SEP não são muito relevantes</a:t>
             </a:r>
           </a:p>
           <a:p>
             <a:pPr marL="0" indent="0">
+              <a:lnSpc>
+                <a:spcPct val="100000"/>
+              </a:lnSpc>
               <a:buNone/>
             </a:pPr>
             <a:endParaRPr lang="en-US" sz="2400" dirty="0">
@@ -10358,6 +10364,9 @@
           </a:p>
           <a:p>
             <a:pPr marL="0" indent="0">
+              <a:lnSpc>
+                <a:spcPct val="100000"/>
+              </a:lnSpc>
               <a:buNone/>
             </a:pPr>
             <a:endParaRPr lang="en-US" sz="2400" dirty="0">
@@ -10370,6 +10379,9 @@
           </a:p>
           <a:p>
             <a:pPr marL="0" indent="0">
+              <a:lnSpc>
+                <a:spcPct val="100000"/>
+              </a:lnSpc>
               <a:buNone/>
             </a:pPr>
             <a:endParaRPr lang="en-US" sz="2400" dirty="0">
@@ -10382,6 +10394,9 @@
           </a:p>
           <a:p>
             <a:pPr marL="0" indent="0">
+              <a:lnSpc>
+                <a:spcPct val="100000"/>
+              </a:lnSpc>
               <a:buNone/>
             </a:pPr>
             <a:endParaRPr lang="en-US" sz="2400" dirty="0">
@@ -10394,6 +10409,9 @@
           </a:p>
           <a:p>
             <a:pPr marL="0" indent="0">
+              <a:lnSpc>
+                <a:spcPct val="100000"/>
+              </a:lnSpc>
               <a:buNone/>
             </a:pPr>
             <a:endParaRPr lang="en-US" sz="2400" dirty="0">
@@ -10406,6 +10424,9 @@
           </a:p>
           <a:p>
             <a:pPr marL="0" indent="0">
+              <a:lnSpc>
+                <a:spcPct val="100000"/>
+              </a:lnSpc>
               <a:buNone/>
             </a:pPr>
             <a:r>
@@ -11767,6 +11788,9 @@
           </a:lstStyle>
           <a:p>
             <a:pPr marL="457200" indent="-457200">
+              <a:lnSpc>
+                <a:spcPct val="100000"/>
+              </a:lnSpc>
               <a:buAutoNum type="arabicPeriod"/>
             </a:pPr>
             <a:r>
@@ -11782,6 +11806,9 @@
           </a:p>
           <a:p>
             <a:pPr marL="457200" indent="-457200">
+              <a:lnSpc>
+                <a:spcPct val="100000"/>
+              </a:lnSpc>
               <a:buAutoNum type="arabicPeriod"/>
             </a:pPr>
             <a:endParaRPr lang="pt-BR" sz="2400" dirty="0">
@@ -11794,6 +11821,9 @@
           </a:p>
           <a:p>
             <a:pPr marL="457200" indent="-457200">
+              <a:lnSpc>
+                <a:spcPct val="100000"/>
+              </a:lnSpc>
               <a:buAutoNum type="arabicPeriod"/>
             </a:pPr>
             <a:r>
@@ -11809,6 +11839,9 @@
           </a:p>
           <a:p>
             <a:pPr marL="457200" indent="-457200">
+              <a:lnSpc>
+                <a:spcPct val="100000"/>
+              </a:lnSpc>
               <a:buAutoNum type="arabicPeriod"/>
             </a:pPr>
             <a:endParaRPr lang="pt-BR" sz="2400" dirty="0">
@@ -11821,6 +11854,9 @@
           </a:p>
           <a:p>
             <a:pPr marL="457200" indent="-457200">
+              <a:lnSpc>
+                <a:spcPct val="100000"/>
+              </a:lnSpc>
               <a:buAutoNum type="arabicPeriod"/>
             </a:pPr>
             <a:r>
@@ -11836,6 +11872,9 @@
           </a:p>
           <a:p>
             <a:pPr marL="457200" indent="-457200">
+              <a:lnSpc>
+                <a:spcPct val="100000"/>
+              </a:lnSpc>
               <a:buAutoNum type="arabicPeriod"/>
             </a:pPr>
             <a:endParaRPr lang="pt-BR" sz="2400" dirty="0">
@@ -11848,6 +11887,9 @@
           </a:p>
           <a:p>
             <a:pPr marL="457200" indent="-457200">
+              <a:lnSpc>
+                <a:spcPct val="100000"/>
+              </a:lnSpc>
               <a:buAutoNum type="arabicPeriod"/>
             </a:pPr>
             <a:endParaRPr lang="pt-BR" sz="2400" dirty="0">
@@ -11860,6 +11902,9 @@
           </a:p>
           <a:p>
             <a:pPr marL="0" indent="0" algn="ctr">
+              <a:lnSpc>
+                <a:spcPct val="100000"/>
+              </a:lnSpc>
               <a:buNone/>
             </a:pPr>
             <a:r>
@@ -18791,6 +18836,9 @@
           </a:p>
           <a:p>
             <a:pPr marL="0" indent="0">
+              <a:lnSpc>
+                <a:spcPct val="100000"/>
+              </a:lnSpc>
               <a:buNone/>
             </a:pPr>
             <a:r>
@@ -19627,6 +19675,9 @@
           </a:lstStyle>
           <a:p>
             <a:pPr marL="0" indent="0">
+              <a:lnSpc>
+                <a:spcPct val="100000"/>
+              </a:lnSpc>
               <a:buNone/>
             </a:pPr>
             <a:r>
@@ -19948,6 +19999,9 @@
           </a:p>
           <a:p>
             <a:pPr marL="0" indent="0">
+              <a:lnSpc>
+                <a:spcPct val="100000"/>
+              </a:lnSpc>
               <a:buNone/>
             </a:pPr>
             <a:r>
@@ -20519,6 +20573,9 @@
           </a:lstStyle>
           <a:p>
             <a:pPr marL="0" indent="0" algn="ctr">
+              <a:lnSpc>
+                <a:spcPct val="100000"/>
+              </a:lnSpc>
               <a:buNone/>
             </a:pPr>
             <a:r>
@@ -20574,6 +20631,9 @@
           </a:p>
           <a:p>
             <a:pPr marL="457200" indent="-457200">
+              <a:lnSpc>
+                <a:spcPct val="100000"/>
+              </a:lnSpc>
               <a:buAutoNum type="arabicPeriod"/>
             </a:pPr>
             <a:endParaRPr lang="pt-BR" sz="2400" dirty="0">
@@ -20586,6 +20646,9 @@
           </a:p>
           <a:p>
             <a:pPr marL="0" indent="0">
+              <a:lnSpc>
+                <a:spcPct val="100000"/>
+              </a:lnSpc>
               <a:buNone/>
             </a:pPr>
             <a:r>
@@ -21580,6 +21643,9 @@
           </a:p>
           <a:p>
             <a:pPr marL="0" indent="0">
+              <a:lnSpc>
+                <a:spcPct val="100000"/>
+              </a:lnSpc>
               <a:buNone/>
             </a:pPr>
             <a:endParaRPr lang="en-US" sz="2400" b="1" dirty="0">
@@ -21592,6 +21658,9 @@
           </a:p>
           <a:p>
             <a:pPr marL="0" indent="0">
+              <a:lnSpc>
+                <a:spcPct val="100000"/>
+              </a:lnSpc>
               <a:buNone/>
             </a:pPr>
             <a:r>
@@ -22736,15 +22805,6 @@
 </file>
 
 <file path=customXml/item2.xml><?xml version="1.0" encoding="utf-8"?>
-<?mso-contentType ?>
-<FormTemplates xmlns="http://schemas.microsoft.com/sharepoint/v3/contenttype/forms">
-  <Display>DocumentLibraryForm</Display>
-  <Edit>DocumentLibraryForm</Edit>
-  <New>DocumentLibraryForm</New>
-</FormTemplates>
-</file>
-
-<file path=customXml/item3.xml><?xml version="1.0" encoding="utf-8"?>
 <p:properties xmlns:p="http://schemas.microsoft.com/office/2006/metadata/properties" xmlns:xsi="http://www.w3.org/2001/XMLSchema-instance" xmlns:pc="http://schemas.microsoft.com/office/infopath/2007/PartnerControls">
   <documentManagement>
     <_ip_UnifiedCompliancePolicyUIAction xmlns="http://schemas.microsoft.com/sharepoint/v3" xsi:nil="true"/>
@@ -22761,6 +22821,15 @@
     <MediaServiceKeyPoints xmlns="71af3243-3dd4-4a8d-8c0d-dd76da1f02a5" xsi:nil="true"/>
   </documentManagement>
 </p:properties>
+</file>
+
+<file path=customXml/item3.xml><?xml version="1.0" encoding="utf-8"?>
+<?mso-contentType ?>
+<FormTemplates xmlns="http://schemas.microsoft.com/sharepoint/v3/contenttype/forms">
+  <Display>DocumentLibraryForm</Display>
+  <Edit>DocumentLibraryForm</Edit>
+  <New>DocumentLibraryForm</New>
+</FormTemplates>
 </file>
 
 <file path=customXml/itemProps1.xml><?xml version="1.0" encoding="utf-8"?>
@@ -22785,14 +22854,6 @@
 </file>
 
 <file path=customXml/itemProps2.xml><?xml version="1.0" encoding="utf-8"?>
-<ds:datastoreItem xmlns:ds="http://schemas.openxmlformats.org/officeDocument/2006/customXml" ds:itemID="{E618C13B-9D83-4AF4-B64D-33362D5133F8}">
-  <ds:schemaRefs>
-    <ds:schemaRef ds:uri="http://schemas.microsoft.com/sharepoint/v3/contenttype/forms"/>
-  </ds:schemaRefs>
-</ds:datastoreItem>
-</file>
-
-<file path=customXml/itemProps3.xml><?xml version="1.0" encoding="utf-8"?>
 <ds:datastoreItem xmlns:ds="http://schemas.openxmlformats.org/officeDocument/2006/customXml" ds:itemID="{CA4F7154-AFAC-4BE7-8A74-7F4B6FC2743C}">
   <ds:schemaRefs>
     <ds:schemaRef ds:uri="http://www.w3.org/XML/1998/namespace"/>
@@ -22811,6 +22872,14 @@
 </ds:datastoreItem>
 </file>
 
+<file path=customXml/itemProps3.xml><?xml version="1.0" encoding="utf-8"?>
+<ds:datastoreItem xmlns:ds="http://schemas.openxmlformats.org/officeDocument/2006/customXml" ds:itemID="{E618C13B-9D83-4AF4-B64D-33362D5133F8}">
+  <ds:schemaRefs>
+    <ds:schemaRef ds:uri="http://schemas.microsoft.com/sharepoint/v3/contenttype/forms"/>
+  </ds:schemaRefs>
+</ds:datastoreItem>
+</file>
+
 <file path=docMetadata/LabelInfo.xml><?xml version="1.0" encoding="utf-8"?>
 <clbl:labelList xmlns:clbl="http://schemas.microsoft.com/office/2020/mipLabelMetadata">
   <clbl:label id="{f42aa342-8706-4288-bd11-ebb85995028c}" enabled="1" method="Standard" siteId="{72f988bf-86f1-41af-91ab-2d7cd011db47}" removed="0"/>

</xml_diff>

<commit_message>
Gerando mais alguns resultados para splade
</commit_message>
<xml_diff>
--- a/7 - splade/notebook/apresentacao_splade.pptx
+++ b/7 - splade/notebook/apresentacao_splade.pptx
@@ -5,10 +5,10 @@
     <p:sldMasterId id="2147483648" r:id="rId4"/>
   </p:sldMasterIdLst>
   <p:notesMasterIdLst>
-    <p:notesMasterId r:id="rId18"/>
+    <p:notesMasterId r:id="rId19"/>
   </p:notesMasterIdLst>
   <p:handoutMasterIdLst>
-    <p:handoutMasterId r:id="rId19"/>
+    <p:handoutMasterId r:id="rId20"/>
   </p:handoutMasterIdLst>
   <p:sldIdLst>
     <p:sldId id="256" r:id="rId5"/>
@@ -22,8 +22,9 @@
     <p:sldId id="313" r:id="rId13"/>
     <p:sldId id="315" r:id="rId14"/>
     <p:sldId id="307" r:id="rId15"/>
-    <p:sldId id="308" r:id="rId16"/>
-    <p:sldId id="289" r:id="rId17"/>
+    <p:sldId id="316" r:id="rId16"/>
+    <p:sldId id="308" r:id="rId17"/>
+    <p:sldId id="289" r:id="rId18"/>
   </p:sldIdLst>
   <p:sldSz cx="12192000" cy="6858000"/>
   <p:notesSz cx="6858000" cy="9144000"/>
@@ -241,7 +242,7 @@
             <a:pPr rtl="0"/>
             <a:fld id="{1CFE3099-591D-45A7-A51D-7A26F574396C}" type="datetime1">
               <a:rPr lang="pt-BR" smtClean="0"/>
-              <a:t>25/04/2023</a:t>
+              <a:t>26/04/2023</a:t>
             </a:fld>
             <a:endParaRPr lang="pt-BR" dirty="0"/>
           </a:p>
@@ -422,7 +423,7 @@
             <a:fld id="{04512B0B-086E-405E-B6A3-A336C302B6B7}" type="datetime1">
               <a:rPr lang="pt-BR" smtClean="0"/>
               <a:pPr/>
-              <a:t>25/04/2023</a:t>
+              <a:t>26/04/2023</a:t>
             </a:fld>
             <a:endParaRPr lang="pt-BR" dirty="0"/>
           </a:p>
@@ -1023,7 +1024,7 @@
     </p:spTree>
     <p:extLst>
       <p:ext uri="{BB962C8B-B14F-4D97-AF65-F5344CB8AC3E}">
-        <p14:creationId xmlns:p14="http://schemas.microsoft.com/office/powerpoint/2010/main" val="2301835449"/>
+        <p14:creationId xmlns:p14="http://schemas.microsoft.com/office/powerpoint/2010/main" val="1535346633"/>
       </p:ext>
     </p:extLst>
   </p:cSld>
@@ -1100,6 +1101,91 @@
             <a:fld id="{35BAF473-2665-42A7-89E3-C7BA7EB58D12}" type="slidenum">
               <a:rPr lang="pt-BR" smtClean="0"/>
               <a:t>13</a:t>
+            </a:fld>
+            <a:endParaRPr lang="pt-BR"/>
+          </a:p>
+        </p:txBody>
+      </p:sp>
+    </p:spTree>
+    <p:extLst>
+      <p:ext uri="{BB962C8B-B14F-4D97-AF65-F5344CB8AC3E}">
+        <p14:creationId xmlns:p14="http://schemas.microsoft.com/office/powerpoint/2010/main" val="2301835449"/>
+      </p:ext>
+    </p:extLst>
+  </p:cSld>
+  <p:clrMapOvr>
+    <a:masterClrMapping/>
+  </p:clrMapOvr>
+</p:notes>
+</file>
+
+<file path=ppt/notesSlides/notesSlide14.xml><?xml version="1.0" encoding="utf-8"?>
+<p:notes xmlns:a="http://schemas.openxmlformats.org/drawingml/2006/main" xmlns:r="http://schemas.openxmlformats.org/officeDocument/2006/relationships" xmlns:p="http://schemas.openxmlformats.org/presentationml/2006/main">
+  <p:cSld>
+    <p:spTree>
+      <p:nvGrpSpPr>
+        <p:cNvPr id="1" name=""/>
+        <p:cNvGrpSpPr/>
+        <p:nvPr/>
+      </p:nvGrpSpPr>
+      <p:grpSpPr>
+        <a:xfrm>
+          <a:off x="0" y="0"/>
+          <a:ext cx="0" cy="0"/>
+          <a:chOff x="0" y="0"/>
+          <a:chExt cx="0" cy="0"/>
+        </a:xfrm>
+      </p:grpSpPr>
+      <p:sp>
+        <p:nvSpPr>
+          <p:cNvPr id="2" name="Espaço Reservado para Imagem de Slide 1"/>
+          <p:cNvSpPr>
+            <a:spLocks noGrp="1" noRot="1" noChangeAspect="1"/>
+          </p:cNvSpPr>
+          <p:nvPr>
+            <p:ph type="sldImg"/>
+          </p:nvPr>
+        </p:nvSpPr>
+        <p:spPr/>
+      </p:sp>
+      <p:sp>
+        <p:nvSpPr>
+          <p:cNvPr id="3" name="Espaço Reservado para Anotações 2"/>
+          <p:cNvSpPr>
+            <a:spLocks noGrp="1"/>
+          </p:cNvSpPr>
+          <p:nvPr>
+            <p:ph type="body" idx="1"/>
+          </p:nvPr>
+        </p:nvSpPr>
+        <p:spPr/>
+        <p:txBody>
+          <a:bodyPr/>
+          <a:lstStyle/>
+          <a:p>
+            <a:endParaRPr lang="pt-BR" noProof="0" dirty="0"/>
+          </a:p>
+        </p:txBody>
+      </p:sp>
+      <p:sp>
+        <p:nvSpPr>
+          <p:cNvPr id="4" name="Espaço Reservado para Número de Slide 3"/>
+          <p:cNvSpPr>
+            <a:spLocks noGrp="1"/>
+          </p:cNvSpPr>
+          <p:nvPr>
+            <p:ph type="sldNum" sz="quarter" idx="5"/>
+          </p:nvPr>
+        </p:nvSpPr>
+        <p:spPr/>
+        <p:txBody>
+          <a:bodyPr/>
+          <a:lstStyle/>
+          <a:p>
+            <a:pPr rtl="0"/>
+            <a:fld id="{35BAF473-2665-42A7-89E3-C7BA7EB58D12}" type="slidenum">
+              <a:rPr lang="pt-BR" smtClean="0"/>
+              <a:t>14</a:t>
             </a:fld>
             <a:endParaRPr lang="pt-BR"/>
           </a:p>
@@ -11554,7 +11640,7 @@
             <a:pPr algn="l" rtl="0"/>
             <a:r>
               <a:rPr lang="pt-BR" dirty="0"/>
-              <a:t>Tópico para discussão</a:t>
+              <a:t>Resultados</a:t>
             </a:r>
           </a:p>
         </p:txBody>
@@ -11595,335 +11681,508 @@
           </a:p>
         </p:txBody>
       </p:sp>
-      <p:sp>
-        <p:nvSpPr>
-          <p:cNvPr id="20" name="Espaço Reservado para Conteúdo 3">
-            <a:extLst>
-              <a:ext uri="{FF2B5EF4-FFF2-40B4-BE49-F238E27FC236}">
-                <a16:creationId xmlns:a16="http://schemas.microsoft.com/office/drawing/2014/main" id="{A26C9687-67C8-0FE8-0794-47272524905A}"/>
-              </a:ext>
-            </a:extLst>
-          </p:cNvPr>
-          <p:cNvSpPr txBox="1">
-            <a:spLocks/>
-          </p:cNvSpPr>
-          <p:nvPr/>
-        </p:nvSpPr>
-        <p:spPr>
-          <a:xfrm>
-            <a:off x="176168" y="1643152"/>
-            <a:ext cx="11694252" cy="4812176"/>
-          </a:xfrm>
-          <a:prstGeom prst="rect">
-            <a:avLst/>
-          </a:prstGeom>
-        </p:spPr>
-        <p:txBody>
-          <a:bodyPr rtlCol="0">
-            <a:normAutofit/>
-          </a:bodyPr>
-          <a:lstStyle>
-            <a:lvl1pPr marL="228600" indent="-228600" algn="l" defTabSz="914400" rtl="0" eaLnBrk="1" latinLnBrk="0" hangingPunct="1">
-              <a:lnSpc>
-                <a:spcPct val="90000"/>
-              </a:lnSpc>
-              <a:spcBef>
-                <a:spcPts val="1000"/>
-              </a:spcBef>
-              <a:buFont typeface="Arial" panose="020B0604020202020204" pitchFamily="34" charset="0"/>
-              <a:buChar char="•"/>
-              <a:defRPr sz="2800" kern="1200">
-                <a:solidFill>
-                  <a:schemeClr val="tx1"/>
-                </a:solidFill>
-                <a:latin typeface="+mn-lt"/>
-                <a:ea typeface="+mn-ea"/>
-                <a:cs typeface="+mn-cs"/>
-              </a:defRPr>
-            </a:lvl1pPr>
-            <a:lvl2pPr marL="685800" indent="-228600" algn="l" defTabSz="914400" rtl="0" eaLnBrk="1" latinLnBrk="0" hangingPunct="1">
-              <a:lnSpc>
-                <a:spcPct val="90000"/>
-              </a:lnSpc>
-              <a:spcBef>
-                <a:spcPts val="500"/>
-              </a:spcBef>
-              <a:buFont typeface="Arial" panose="020B0604020202020204" pitchFamily="34" charset="0"/>
-              <a:buChar char="•"/>
-              <a:defRPr sz="2400" kern="1200">
-                <a:solidFill>
-                  <a:schemeClr val="tx1"/>
-                </a:solidFill>
-                <a:latin typeface="+mn-lt"/>
-                <a:ea typeface="+mn-ea"/>
-                <a:cs typeface="+mn-cs"/>
-              </a:defRPr>
-            </a:lvl2pPr>
-            <a:lvl3pPr marL="1143000" indent="-228600" algn="l" defTabSz="914400" rtl="0" eaLnBrk="1" latinLnBrk="0" hangingPunct="1">
-              <a:lnSpc>
-                <a:spcPct val="90000"/>
-              </a:lnSpc>
-              <a:spcBef>
-                <a:spcPts val="500"/>
-              </a:spcBef>
-              <a:buFont typeface="Arial" panose="020B0604020202020204" pitchFamily="34" charset="0"/>
-              <a:buChar char="•"/>
-              <a:defRPr sz="2000" kern="1200">
-                <a:solidFill>
-                  <a:schemeClr val="tx1"/>
-                </a:solidFill>
-                <a:latin typeface="+mn-lt"/>
-                <a:ea typeface="+mn-ea"/>
-                <a:cs typeface="+mn-cs"/>
-              </a:defRPr>
-            </a:lvl3pPr>
-            <a:lvl4pPr marL="1600200" indent="-228600" algn="l" defTabSz="914400" rtl="0" eaLnBrk="1" latinLnBrk="0" hangingPunct="1">
-              <a:lnSpc>
-                <a:spcPct val="90000"/>
-              </a:lnSpc>
-              <a:spcBef>
-                <a:spcPts val="500"/>
-              </a:spcBef>
-              <a:buFont typeface="Arial" panose="020B0604020202020204" pitchFamily="34" charset="0"/>
-              <a:buChar char="•"/>
-              <a:defRPr sz="1800" kern="1200">
-                <a:solidFill>
-                  <a:schemeClr val="tx1"/>
-                </a:solidFill>
-                <a:latin typeface="+mn-lt"/>
-                <a:ea typeface="+mn-ea"/>
-                <a:cs typeface="+mn-cs"/>
-              </a:defRPr>
-            </a:lvl4pPr>
-            <a:lvl5pPr marL="2057400" indent="-228600" algn="l" defTabSz="914400" rtl="0" eaLnBrk="1" latinLnBrk="0" hangingPunct="1">
-              <a:lnSpc>
-                <a:spcPct val="90000"/>
-              </a:lnSpc>
-              <a:spcBef>
-                <a:spcPts val="500"/>
-              </a:spcBef>
-              <a:buFont typeface="Arial" panose="020B0604020202020204" pitchFamily="34" charset="0"/>
-              <a:buChar char="•"/>
-              <a:defRPr sz="1800" kern="1200">
-                <a:solidFill>
-                  <a:schemeClr val="tx1"/>
-                </a:solidFill>
-                <a:latin typeface="+mn-lt"/>
-                <a:ea typeface="+mn-ea"/>
-                <a:cs typeface="+mn-cs"/>
-              </a:defRPr>
-            </a:lvl5pPr>
-            <a:lvl6pPr marL="2514600" indent="-228600" algn="l" defTabSz="914400" rtl="0" eaLnBrk="1" latinLnBrk="0" hangingPunct="1">
-              <a:lnSpc>
-                <a:spcPct val="90000"/>
-              </a:lnSpc>
-              <a:spcBef>
-                <a:spcPts val="500"/>
-              </a:spcBef>
-              <a:buFont typeface="Arial" panose="020B0604020202020204" pitchFamily="34" charset="0"/>
-              <a:buChar char="•"/>
-              <a:defRPr sz="1800" kern="1200">
-                <a:solidFill>
-                  <a:schemeClr val="tx1"/>
-                </a:solidFill>
-                <a:latin typeface="+mn-lt"/>
-                <a:ea typeface="+mn-ea"/>
-                <a:cs typeface="+mn-cs"/>
-              </a:defRPr>
-            </a:lvl6pPr>
-            <a:lvl7pPr marL="2971800" indent="-228600" algn="l" defTabSz="914400" rtl="0" eaLnBrk="1" latinLnBrk="0" hangingPunct="1">
-              <a:lnSpc>
-                <a:spcPct val="90000"/>
-              </a:lnSpc>
-              <a:spcBef>
-                <a:spcPts val="500"/>
-              </a:spcBef>
-              <a:buFont typeface="Arial" panose="020B0604020202020204" pitchFamily="34" charset="0"/>
-              <a:buChar char="•"/>
-              <a:defRPr sz="1800" kern="1200">
-                <a:solidFill>
-                  <a:schemeClr val="tx1"/>
-                </a:solidFill>
-                <a:latin typeface="+mn-lt"/>
-                <a:ea typeface="+mn-ea"/>
-                <a:cs typeface="+mn-cs"/>
-              </a:defRPr>
-            </a:lvl7pPr>
-            <a:lvl8pPr marL="3429000" indent="-228600" algn="l" defTabSz="914400" rtl="0" eaLnBrk="1" latinLnBrk="0" hangingPunct="1">
-              <a:lnSpc>
-                <a:spcPct val="90000"/>
-              </a:lnSpc>
-              <a:spcBef>
-                <a:spcPts val="500"/>
-              </a:spcBef>
-              <a:buFont typeface="Arial" panose="020B0604020202020204" pitchFamily="34" charset="0"/>
-              <a:buChar char="•"/>
-              <a:defRPr sz="1800" kern="1200">
-                <a:solidFill>
-                  <a:schemeClr val="tx1"/>
-                </a:solidFill>
-                <a:latin typeface="+mn-lt"/>
-                <a:ea typeface="+mn-ea"/>
-                <a:cs typeface="+mn-cs"/>
-              </a:defRPr>
-            </a:lvl8pPr>
-            <a:lvl9pPr marL="3886200" indent="-228600" algn="l" defTabSz="914400" rtl="0" eaLnBrk="1" latinLnBrk="0" hangingPunct="1">
-              <a:lnSpc>
-                <a:spcPct val="90000"/>
-              </a:lnSpc>
-              <a:spcBef>
-                <a:spcPts val="500"/>
-              </a:spcBef>
-              <a:buFont typeface="Arial" panose="020B0604020202020204" pitchFamily="34" charset="0"/>
-              <a:buChar char="•"/>
-              <a:defRPr sz="1800" kern="1200">
-                <a:solidFill>
-                  <a:schemeClr val="tx1"/>
-                </a:solidFill>
-                <a:latin typeface="+mn-lt"/>
-                <a:ea typeface="+mn-ea"/>
-                <a:cs typeface="+mn-cs"/>
-              </a:defRPr>
-            </a:lvl9pPr>
-          </a:lstStyle>
-          <a:p>
-            <a:pPr marL="457200" indent="-457200">
-              <a:lnSpc>
-                <a:spcPct val="100000"/>
-              </a:lnSpc>
-              <a:buAutoNum type="arabicPeriod"/>
-            </a:pPr>
-            <a:r>
-              <a:rPr lang="pt-BR" sz="2400" dirty="0">
-                <a:solidFill>
-                  <a:schemeClr val="accent1"/>
-                </a:solidFill>
-                <a:latin typeface="Arial" panose="020B0604020202020204" pitchFamily="34" charset="0"/>
-                <a:cs typeface="Arial" panose="020B0604020202020204" pitchFamily="34" charset="0"/>
-              </a:rPr>
-              <a:t>A implementação usando a função SUM como agregação deu um resultado muito ruim.</a:t>
-            </a:r>
-          </a:p>
-          <a:p>
-            <a:pPr marL="457200" indent="-457200">
-              <a:lnSpc>
-                <a:spcPct val="100000"/>
-              </a:lnSpc>
-              <a:buAutoNum type="arabicPeriod"/>
-            </a:pPr>
-            <a:endParaRPr lang="pt-BR" sz="2400" dirty="0">
-              <a:solidFill>
-                <a:schemeClr val="accent1"/>
-              </a:solidFill>
-              <a:latin typeface="Arial" panose="020B0604020202020204" pitchFamily="34" charset="0"/>
-              <a:cs typeface="Arial" panose="020B0604020202020204" pitchFamily="34" charset="0"/>
-            </a:endParaRPr>
-          </a:p>
-          <a:p>
-            <a:pPr marL="457200" indent="-457200">
-              <a:lnSpc>
-                <a:spcPct val="100000"/>
-              </a:lnSpc>
-              <a:buAutoNum type="arabicPeriod"/>
-            </a:pPr>
-            <a:r>
-              <a:rPr lang="pt-BR" sz="2400" dirty="0">
-                <a:solidFill>
-                  <a:schemeClr val="accent1"/>
-                </a:solidFill>
-                <a:latin typeface="Arial" panose="020B0604020202020204" pitchFamily="34" charset="0"/>
-                <a:cs typeface="Arial" panose="020B0604020202020204" pitchFamily="34" charset="0"/>
-              </a:rPr>
-              <a:t>Calcular o score conforme proposto no SPLADEv2 piorou os resultados.</a:t>
-            </a:r>
-          </a:p>
-          <a:p>
-            <a:pPr marL="457200" indent="-457200">
-              <a:lnSpc>
-                <a:spcPct val="100000"/>
-              </a:lnSpc>
-              <a:buAutoNum type="arabicPeriod"/>
-            </a:pPr>
-            <a:endParaRPr lang="pt-BR" sz="2400" dirty="0">
-              <a:solidFill>
-                <a:schemeClr val="accent1"/>
-              </a:solidFill>
-              <a:latin typeface="Arial" panose="020B0604020202020204" pitchFamily="34" charset="0"/>
-              <a:cs typeface="Arial" panose="020B0604020202020204" pitchFamily="34" charset="0"/>
-            </a:endParaRPr>
-          </a:p>
-          <a:p>
-            <a:pPr marL="457200" indent="-457200">
-              <a:lnSpc>
-                <a:spcPct val="100000"/>
-              </a:lnSpc>
-              <a:buAutoNum type="arabicPeriod"/>
-            </a:pPr>
-            <a:r>
-              <a:rPr lang="pt-BR" sz="2400" dirty="0">
-                <a:solidFill>
-                  <a:schemeClr val="accent1"/>
-                </a:solidFill>
-                <a:latin typeface="Arial" panose="020B0604020202020204" pitchFamily="34" charset="0"/>
-                <a:cs typeface="Arial" panose="020B0604020202020204" pitchFamily="34" charset="0"/>
-              </a:rPr>
-              <a:t>Parece que a melhor combinação foi a função agregação MAX (SPLADEv2) com o score calculado conforme SPLADEv1.</a:t>
-            </a:r>
-          </a:p>
-          <a:p>
-            <a:pPr marL="457200" indent="-457200">
-              <a:lnSpc>
-                <a:spcPct val="100000"/>
-              </a:lnSpc>
-              <a:buAutoNum type="arabicPeriod"/>
-            </a:pPr>
-            <a:endParaRPr lang="pt-BR" sz="2400" dirty="0">
-              <a:solidFill>
-                <a:schemeClr val="accent1"/>
-              </a:solidFill>
-              <a:latin typeface="Arial" panose="020B0604020202020204" pitchFamily="34" charset="0"/>
-              <a:cs typeface="Arial" panose="020B0604020202020204" pitchFamily="34" charset="0"/>
-            </a:endParaRPr>
-          </a:p>
-          <a:p>
-            <a:pPr marL="457200" indent="-457200">
-              <a:lnSpc>
-                <a:spcPct val="100000"/>
-              </a:lnSpc>
-              <a:buAutoNum type="arabicPeriod"/>
-            </a:pPr>
-            <a:endParaRPr lang="pt-BR" sz="2400" dirty="0">
-              <a:solidFill>
-                <a:schemeClr val="accent1"/>
-              </a:solidFill>
-              <a:latin typeface="Arial" panose="020B0604020202020204" pitchFamily="34" charset="0"/>
-              <a:cs typeface="Arial" panose="020B0604020202020204" pitchFamily="34" charset="0"/>
-            </a:endParaRPr>
-          </a:p>
-          <a:p>
-            <a:pPr marL="0" indent="0" algn="ctr">
-              <a:lnSpc>
-                <a:spcPct val="100000"/>
-              </a:lnSpc>
-              <a:buNone/>
-            </a:pPr>
-            <a:r>
-              <a:rPr lang="pt-BR" sz="2400" dirty="0">
-                <a:solidFill>
-                  <a:schemeClr val="accent1"/>
-                </a:solidFill>
-                <a:latin typeface="Arial" panose="020B0604020202020204" pitchFamily="34" charset="0"/>
-                <a:cs typeface="Arial" panose="020B0604020202020204" pitchFamily="34" charset="0"/>
-              </a:rPr>
-              <a:t>Faz sentido isso? Ou foi algum bug no desenvolvimento?</a:t>
-            </a:r>
-          </a:p>
-        </p:txBody>
-      </p:sp>
+      <p:graphicFrame>
+        <p:nvGraphicFramePr>
+          <p:cNvPr id="6" name="Tabela 6">
+            <a:extLst>
+              <a:ext uri="{FF2B5EF4-FFF2-40B4-BE49-F238E27FC236}">
+                <a16:creationId xmlns:a16="http://schemas.microsoft.com/office/drawing/2014/main" id="{CCE9D3B5-9815-E6A1-D9F0-D9190EFC0813}"/>
+              </a:ext>
+            </a:extLst>
+          </p:cNvPr>
+          <p:cNvGraphicFramePr>
+            <a:graphicFrameLocks noGrp="1"/>
+          </p:cNvGraphicFramePr>
+          <p:nvPr>
+            <p:extLst>
+              <p:ext uri="{D42A27DB-BD31-4B8C-83A1-F6EECF244321}">
+                <p14:modId xmlns:p14="http://schemas.microsoft.com/office/powerpoint/2010/main" val="3325508714"/>
+              </p:ext>
+            </p:extLst>
+          </p:nvPr>
+        </p:nvGraphicFramePr>
+        <p:xfrm>
+          <a:off x="450430" y="1890205"/>
+          <a:ext cx="10903370" cy="1854200"/>
+        </p:xfrm>
+        <a:graphic>
+          <a:graphicData uri="http://schemas.openxmlformats.org/drawingml/2006/table">
+            <a:tbl>
+              <a:tblPr firstRow="1" bandRow="1">
+                <a:tableStyleId>{5C22544A-7EE6-4342-B048-85BDC9FD1C3A}</a:tableStyleId>
+              </a:tblPr>
+              <a:tblGrid>
+                <a:gridCol w="9024538">
+                  <a:extLst>
+                    <a:ext uri="{9D8B030D-6E8A-4147-A177-3AD203B41FA5}">
+                      <a16:colId xmlns:a16="http://schemas.microsoft.com/office/drawing/2014/main" val="2911717806"/>
+                    </a:ext>
+                  </a:extLst>
+                </a:gridCol>
+                <a:gridCol w="1878832">
+                  <a:extLst>
+                    <a:ext uri="{9D8B030D-6E8A-4147-A177-3AD203B41FA5}">
+                      <a16:colId xmlns:a16="http://schemas.microsoft.com/office/drawing/2014/main" val="2148391779"/>
+                    </a:ext>
+                  </a:extLst>
+                </a:gridCol>
+              </a:tblGrid>
+              <a:tr h="370840">
+                <a:tc>
+                  <a:txBody>
+                    <a:bodyPr/>
+                    <a:lstStyle/>
+                    <a:p>
+                      <a:r>
+                        <a:rPr lang="pt-BR" dirty="0"/>
+                        <a:t>Modelo (</a:t>
+                      </a:r>
+                      <a:r>
+                        <a:rPr lang="pt-BR" dirty="0" err="1"/>
+                        <a:t>max</a:t>
+                      </a:r>
+                      <a:r>
+                        <a:rPr lang="pt-BR" dirty="0"/>
+                        <a:t>, f16, índice, com </a:t>
+                      </a:r>
+                      <a:r>
+                        <a:rPr lang="pt-BR" dirty="0" err="1"/>
+                        <a:t>contrib</a:t>
+                      </a:r>
+                      <a:r>
+                        <a:rPr lang="pt-BR" dirty="0"/>
+                        <a:t>. SEP e CLS)</a:t>
+                      </a:r>
+                    </a:p>
+                  </a:txBody>
+                  <a:tcPr/>
+                </a:tc>
+                <a:tc>
+                  <a:txBody>
+                    <a:bodyPr/>
+                    <a:lstStyle/>
+                    <a:p>
+                      <a:r>
+                        <a:rPr lang="pt-BR"/>
+                        <a:t>nDCG@10</a:t>
+                      </a:r>
+                      <a:endParaRPr lang="pt-BR" dirty="0"/>
+                    </a:p>
+                  </a:txBody>
+                  <a:tcPr/>
+                </a:tc>
+                <a:extLst>
+                  <a:ext uri="{0D108BD9-81ED-4DB2-BD59-A6C34878D82A}">
+                    <a16:rowId xmlns:a16="http://schemas.microsoft.com/office/drawing/2014/main" val="3941183346"/>
+                  </a:ext>
+                </a:extLst>
+              </a:tr>
+              <a:tr h="370840">
+                <a:tc>
+                  <a:txBody>
+                    <a:bodyPr/>
+                    <a:lstStyle/>
+                    <a:p>
+                      <a:pPr marL="0" marR="0" lvl="0" indent="0" algn="l" defTabSz="914400" rtl="0" eaLnBrk="1" fontAlgn="auto" latinLnBrk="0" hangingPunct="1">
+                        <a:lnSpc>
+                          <a:spcPct val="100000"/>
+                        </a:lnSpc>
+                        <a:spcBef>
+                          <a:spcPts val="0"/>
+                        </a:spcBef>
+                        <a:spcAft>
+                          <a:spcPts val="0"/>
+                        </a:spcAft>
+                        <a:buClrTx/>
+                        <a:buSzTx/>
+                        <a:buFontTx/>
+                        <a:buNone/>
+                        <a:tabLst/>
+                        <a:defRPr/>
+                      </a:pPr>
+                      <a:r>
+                        <a:rPr lang="pt-BR" sz="1800" b="0" kern="1200" dirty="0" err="1">
+                          <a:solidFill>
+                            <a:schemeClr val="dk1"/>
+                          </a:solidFill>
+                          <a:effectLst/>
+                          <a:latin typeface="+mn-lt"/>
+                          <a:ea typeface="+mn-ea"/>
+                          <a:cs typeface="+mn-cs"/>
+                        </a:rPr>
+                        <a:t>baseplate</a:t>
+                      </a:r>
+                      <a:r>
+                        <a:rPr lang="pt-BR" sz="1800" b="0" kern="1200" dirty="0">
+                          <a:solidFill>
+                            <a:schemeClr val="dk1"/>
+                          </a:solidFill>
+                          <a:effectLst/>
+                          <a:latin typeface="+mn-lt"/>
+                          <a:ea typeface="+mn-ea"/>
+                          <a:cs typeface="+mn-cs"/>
+                        </a:rPr>
+                        <a:t>/</a:t>
+                      </a:r>
+                      <a:r>
+                        <a:rPr lang="pt-BR" sz="1800" b="0" kern="1200" dirty="0" err="1">
+                          <a:solidFill>
+                            <a:schemeClr val="dk1"/>
+                          </a:solidFill>
+                          <a:effectLst/>
+                          <a:latin typeface="+mn-lt"/>
+                          <a:ea typeface="+mn-ea"/>
+                          <a:cs typeface="+mn-cs"/>
+                        </a:rPr>
+                        <a:t>splade-cocondenser-selfdistil</a:t>
+                      </a:r>
+                      <a:endParaRPr lang="pt-BR" sz="1800" b="0" kern="1200" dirty="0">
+                        <a:solidFill>
+                          <a:schemeClr val="dk1"/>
+                        </a:solidFill>
+                        <a:effectLst/>
+                        <a:latin typeface="+mn-lt"/>
+                        <a:ea typeface="+mn-ea"/>
+                        <a:cs typeface="+mn-cs"/>
+                      </a:endParaRPr>
+                    </a:p>
+                  </a:txBody>
+                  <a:tcPr/>
+                </a:tc>
+                <a:tc>
+                  <a:txBody>
+                    <a:bodyPr/>
+                    <a:lstStyle/>
+                    <a:p>
+                      <a:pPr marL="0" marR="0" lvl="0" indent="0" algn="l" defTabSz="914400" rtl="0" eaLnBrk="1" fontAlgn="auto" latinLnBrk="0" hangingPunct="1">
+                        <a:lnSpc>
+                          <a:spcPct val="100000"/>
+                        </a:lnSpc>
+                        <a:spcBef>
+                          <a:spcPts val="0"/>
+                        </a:spcBef>
+                        <a:spcAft>
+                          <a:spcPts val="0"/>
+                        </a:spcAft>
+                        <a:buClrTx/>
+                        <a:buSzTx/>
+                        <a:buFontTx/>
+                        <a:buNone/>
+                        <a:tabLst/>
+                        <a:defRPr/>
+                      </a:pPr>
+                      <a:r>
+                        <a:rPr lang="pt-BR" dirty="0"/>
+                        <a:t>0,7348</a:t>
+                      </a:r>
+                    </a:p>
+                  </a:txBody>
+                  <a:tcPr/>
+                </a:tc>
+                <a:extLst>
+                  <a:ext uri="{0D108BD9-81ED-4DB2-BD59-A6C34878D82A}">
+                    <a16:rowId xmlns:a16="http://schemas.microsoft.com/office/drawing/2014/main" val="1112334602"/>
+                  </a:ext>
+                </a:extLst>
+              </a:tr>
+              <a:tr h="370840">
+                <a:tc>
+                  <a:txBody>
+                    <a:bodyPr/>
+                    <a:lstStyle/>
+                    <a:p>
+                      <a:pPr marL="0" marR="0" lvl="0" indent="0" algn="l" defTabSz="914400" rtl="0" eaLnBrk="1" fontAlgn="auto" latinLnBrk="0" hangingPunct="1">
+                        <a:lnSpc>
+                          <a:spcPct val="100000"/>
+                        </a:lnSpc>
+                        <a:spcBef>
+                          <a:spcPts val="0"/>
+                        </a:spcBef>
+                        <a:spcAft>
+                          <a:spcPts val="0"/>
+                        </a:spcAft>
+                        <a:buClrTx/>
+                        <a:buSzTx/>
+                        <a:buFontTx/>
+                        <a:buNone/>
+                        <a:tabLst/>
+                        <a:defRPr/>
+                      </a:pPr>
+                      <a:r>
+                        <a:rPr lang="pt-BR" sz="1800" b="0" kern="1200" dirty="0" err="1">
+                          <a:solidFill>
+                            <a:schemeClr val="dk1"/>
+                          </a:solidFill>
+                          <a:effectLst/>
+                          <a:latin typeface="+mn-lt"/>
+                          <a:ea typeface="+mn-ea"/>
+                          <a:cs typeface="+mn-cs"/>
+                        </a:rPr>
+                        <a:t>naver</a:t>
+                      </a:r>
+                      <a:r>
+                        <a:rPr lang="pt-BR" sz="1800" b="0" kern="1200" dirty="0">
+                          <a:solidFill>
+                            <a:schemeClr val="dk1"/>
+                          </a:solidFill>
+                          <a:effectLst/>
+                          <a:latin typeface="+mn-lt"/>
+                          <a:ea typeface="+mn-ea"/>
+                          <a:cs typeface="+mn-cs"/>
+                        </a:rPr>
+                        <a:t>/</a:t>
+                      </a:r>
+                      <a:r>
+                        <a:rPr lang="pt-BR" sz="1800" b="0" kern="1200" dirty="0" err="1">
+                          <a:solidFill>
+                            <a:schemeClr val="dk1"/>
+                          </a:solidFill>
+                          <a:effectLst/>
+                          <a:latin typeface="+mn-lt"/>
+                          <a:ea typeface="+mn-ea"/>
+                          <a:cs typeface="+mn-cs"/>
+                        </a:rPr>
+                        <a:t>splade-cocondenser-selfdistil</a:t>
+                      </a:r>
+                      <a:endParaRPr lang="pt-BR" sz="1800" b="0" kern="1200" dirty="0">
+                        <a:solidFill>
+                          <a:schemeClr val="dk1"/>
+                        </a:solidFill>
+                        <a:effectLst/>
+                        <a:latin typeface="+mn-lt"/>
+                        <a:ea typeface="+mn-ea"/>
+                        <a:cs typeface="+mn-cs"/>
+                      </a:endParaRPr>
+                    </a:p>
+                  </a:txBody>
+                  <a:tcPr/>
+                </a:tc>
+                <a:tc>
+                  <a:txBody>
+                    <a:bodyPr/>
+                    <a:lstStyle/>
+                    <a:p>
+                      <a:pPr marL="0" marR="0" lvl="0" indent="0" algn="l" defTabSz="914400" rtl="0" eaLnBrk="1" fontAlgn="auto" latinLnBrk="0" hangingPunct="1">
+                        <a:lnSpc>
+                          <a:spcPct val="100000"/>
+                        </a:lnSpc>
+                        <a:spcBef>
+                          <a:spcPts val="0"/>
+                        </a:spcBef>
+                        <a:spcAft>
+                          <a:spcPts val="0"/>
+                        </a:spcAft>
+                        <a:buClrTx/>
+                        <a:buSzTx/>
+                        <a:buFontTx/>
+                        <a:buNone/>
+                        <a:tabLst/>
+                        <a:defRPr/>
+                      </a:pPr>
+                      <a:r>
+                        <a:rPr lang="pt-BR" dirty="0"/>
+                        <a:t>0,7348</a:t>
+                      </a:r>
+                    </a:p>
+                  </a:txBody>
+                  <a:tcPr/>
+                </a:tc>
+                <a:extLst>
+                  <a:ext uri="{0D108BD9-81ED-4DB2-BD59-A6C34878D82A}">
+                    <a16:rowId xmlns:a16="http://schemas.microsoft.com/office/drawing/2014/main" val="1081399665"/>
+                  </a:ext>
+                </a:extLst>
+              </a:tr>
+              <a:tr h="370840">
+                <a:tc>
+                  <a:txBody>
+                    <a:bodyPr/>
+                    <a:lstStyle/>
+                    <a:p>
+                      <a:pPr marL="0" marR="0" lvl="0" indent="0" algn="l" defTabSz="914400" rtl="0" eaLnBrk="1" fontAlgn="auto" latinLnBrk="0" hangingPunct="1">
+                        <a:lnSpc>
+                          <a:spcPct val="100000"/>
+                        </a:lnSpc>
+                        <a:spcBef>
+                          <a:spcPts val="0"/>
+                        </a:spcBef>
+                        <a:spcAft>
+                          <a:spcPts val="0"/>
+                        </a:spcAft>
+                        <a:buClrTx/>
+                        <a:buSzTx/>
+                        <a:buFontTx/>
+                        <a:buNone/>
+                        <a:tabLst/>
+                        <a:defRPr/>
+                      </a:pPr>
+                      <a:r>
+                        <a:rPr lang="pt-BR" sz="1800" b="0" kern="1200" dirty="0" err="1">
+                          <a:solidFill>
+                            <a:schemeClr val="dk1"/>
+                          </a:solidFill>
+                          <a:effectLst/>
+                          <a:latin typeface="+mn-lt"/>
+                          <a:ea typeface="+mn-ea"/>
+                          <a:cs typeface="+mn-cs"/>
+                        </a:rPr>
+                        <a:t>naver</a:t>
+                      </a:r>
+                      <a:r>
+                        <a:rPr lang="pt-BR" sz="1800" b="0" kern="1200" dirty="0">
+                          <a:solidFill>
+                            <a:schemeClr val="dk1"/>
+                          </a:solidFill>
+                          <a:effectLst/>
+                          <a:latin typeface="+mn-lt"/>
+                          <a:ea typeface="+mn-ea"/>
+                          <a:cs typeface="+mn-cs"/>
+                        </a:rPr>
+                        <a:t>/</a:t>
+                      </a:r>
+                      <a:r>
+                        <a:rPr lang="pt-BR" sz="1800" b="0" kern="1200" dirty="0" err="1">
+                          <a:solidFill>
+                            <a:schemeClr val="dk1"/>
+                          </a:solidFill>
+                          <a:effectLst/>
+                          <a:latin typeface="+mn-lt"/>
+                          <a:ea typeface="+mn-ea"/>
+                          <a:cs typeface="+mn-cs"/>
+                        </a:rPr>
+                        <a:t>splade-cocondenser-ensembledistil</a:t>
+                      </a:r>
+                      <a:r>
+                        <a:rPr lang="pt-BR" sz="1800" b="0" kern="1200" dirty="0">
+                          <a:solidFill>
+                            <a:schemeClr val="dk1"/>
+                          </a:solidFill>
+                          <a:effectLst/>
+                          <a:latin typeface="+mn-lt"/>
+                          <a:ea typeface="+mn-ea"/>
+                          <a:cs typeface="+mn-cs"/>
+                        </a:rPr>
+                        <a:t> </a:t>
+                      </a:r>
+                      <a:endParaRPr lang="pt-BR" dirty="0"/>
+                    </a:p>
+                  </a:txBody>
+                  <a:tcPr/>
+                </a:tc>
+                <a:tc>
+                  <a:txBody>
+                    <a:bodyPr/>
+                    <a:lstStyle/>
+                    <a:p>
+                      <a:r>
+                        <a:rPr lang="pt-BR" dirty="0"/>
+                        <a:t>0,7269</a:t>
+                      </a:r>
+                    </a:p>
+                  </a:txBody>
+                  <a:tcPr/>
+                </a:tc>
+                <a:extLst>
+                  <a:ext uri="{0D108BD9-81ED-4DB2-BD59-A6C34878D82A}">
+                    <a16:rowId xmlns:a16="http://schemas.microsoft.com/office/drawing/2014/main" val="3840731132"/>
+                  </a:ext>
+                </a:extLst>
+              </a:tr>
+              <a:tr h="370840">
+                <a:tc>
+                  <a:txBody>
+                    <a:bodyPr/>
+                    <a:lstStyle/>
+                    <a:p>
+                      <a:pPr marL="0" marR="0" lvl="0" indent="0" algn="l" defTabSz="914400" rtl="0" eaLnBrk="1" fontAlgn="auto" latinLnBrk="0" hangingPunct="1">
+                        <a:lnSpc>
+                          <a:spcPct val="100000"/>
+                        </a:lnSpc>
+                        <a:spcBef>
+                          <a:spcPts val="0"/>
+                        </a:spcBef>
+                        <a:spcAft>
+                          <a:spcPts val="0"/>
+                        </a:spcAft>
+                        <a:buClrTx/>
+                        <a:buSzTx/>
+                        <a:buFontTx/>
+                        <a:buNone/>
+                        <a:tabLst/>
+                        <a:defRPr/>
+                      </a:pPr>
+                      <a:r>
+                        <a:rPr lang="pt-BR" sz="1800" b="0" kern="1200" dirty="0" err="1">
+                          <a:solidFill>
+                            <a:schemeClr val="dk1"/>
+                          </a:solidFill>
+                          <a:effectLst/>
+                          <a:latin typeface="+mn-lt"/>
+                          <a:ea typeface="+mn-ea"/>
+                          <a:cs typeface="+mn-cs"/>
+                        </a:rPr>
+                        <a:t>naver</a:t>
+                      </a:r>
+                      <a:r>
+                        <a:rPr lang="pt-BR" sz="1800" b="0" kern="1200" dirty="0">
+                          <a:solidFill>
+                            <a:schemeClr val="dk1"/>
+                          </a:solidFill>
+                          <a:effectLst/>
+                          <a:latin typeface="+mn-lt"/>
+                          <a:ea typeface="+mn-ea"/>
+                          <a:cs typeface="+mn-cs"/>
+                        </a:rPr>
+                        <a:t>/splade_v2_distil</a:t>
+                      </a:r>
+                    </a:p>
+                  </a:txBody>
+                  <a:tcPr/>
+                </a:tc>
+                <a:tc>
+                  <a:txBody>
+                    <a:bodyPr/>
+                    <a:lstStyle/>
+                    <a:p>
+                      <a:pPr marL="0" marR="0" lvl="0" indent="0" algn="l" defTabSz="914400" rtl="0" eaLnBrk="1" fontAlgn="auto" latinLnBrk="0" hangingPunct="1">
+                        <a:lnSpc>
+                          <a:spcPct val="100000"/>
+                        </a:lnSpc>
+                        <a:spcBef>
+                          <a:spcPts val="0"/>
+                        </a:spcBef>
+                        <a:spcAft>
+                          <a:spcPts val="0"/>
+                        </a:spcAft>
+                        <a:buClrTx/>
+                        <a:buSzTx/>
+                        <a:buFontTx/>
+                        <a:buNone/>
+                        <a:tabLst/>
+                        <a:defRPr/>
+                      </a:pPr>
+                      <a:r>
+                        <a:rPr lang="pt-BR" dirty="0"/>
+                        <a:t>0,7103</a:t>
+                      </a:r>
+                    </a:p>
+                  </a:txBody>
+                  <a:tcPr/>
+                </a:tc>
+                <a:extLst>
+                  <a:ext uri="{0D108BD9-81ED-4DB2-BD59-A6C34878D82A}">
+                    <a16:rowId xmlns:a16="http://schemas.microsoft.com/office/drawing/2014/main" val="3711301742"/>
+                  </a:ext>
+                </a:extLst>
+              </a:tr>
+            </a:tbl>
+          </a:graphicData>
+        </a:graphic>
+      </p:graphicFrame>
     </p:spTree>
     <p:extLst>
       <p:ext uri="{BB962C8B-B14F-4D97-AF65-F5344CB8AC3E}">
-        <p14:creationId xmlns:p14="http://schemas.microsoft.com/office/powerpoint/2010/main" val="227318804"/>
+        <p14:creationId xmlns:p14="http://schemas.microsoft.com/office/powerpoint/2010/main" val="1500900379"/>
       </p:ext>
     </p:extLst>
   </p:cSld>
@@ -11955,6 +12214,433 @@
           <p:cNvPr id="2" name="Título 1">
             <a:extLst>
               <a:ext uri="{FF2B5EF4-FFF2-40B4-BE49-F238E27FC236}">
+                <a16:creationId xmlns:a16="http://schemas.microsoft.com/office/drawing/2014/main" id="{6719F29B-F233-48AF-8261-F33A4E079E3E}"/>
+              </a:ext>
+            </a:extLst>
+          </p:cNvPr>
+          <p:cNvSpPr>
+            <a:spLocks noGrp="1"/>
+          </p:cNvSpPr>
+          <p:nvPr>
+            <p:ph type="title"/>
+          </p:nvPr>
+        </p:nvSpPr>
+        <p:spPr>
+          <a:xfrm>
+            <a:off x="176168" y="402672"/>
+            <a:ext cx="11325137" cy="729788"/>
+          </a:xfrm>
+        </p:spPr>
+        <p:txBody>
+          <a:bodyPr rtlCol="0">
+            <a:normAutofit/>
+          </a:bodyPr>
+          <a:lstStyle/>
+          <a:p>
+            <a:pPr algn="l" rtl="0"/>
+            <a:r>
+              <a:rPr lang="pt-BR" dirty="0"/>
+              <a:t>Tópico para discussão</a:t>
+            </a:r>
+          </a:p>
+        </p:txBody>
+      </p:sp>
+      <p:sp>
+        <p:nvSpPr>
+          <p:cNvPr id="4" name="Espaço Reservado para o Número do Slide 3">
+            <a:extLst>
+              <a:ext uri="{FF2B5EF4-FFF2-40B4-BE49-F238E27FC236}">
+                <a16:creationId xmlns:a16="http://schemas.microsoft.com/office/drawing/2014/main" id="{328F602C-7F98-4C02-99D4-ED65E00D66A4}"/>
+              </a:ext>
+            </a:extLst>
+          </p:cNvPr>
+          <p:cNvSpPr>
+            <a:spLocks noGrp="1"/>
+          </p:cNvSpPr>
+          <p:nvPr>
+            <p:ph type="sldNum" sz="quarter" idx="12"/>
+          </p:nvPr>
+        </p:nvSpPr>
+        <p:spPr>
+          <a:xfrm>
+            <a:off x="8610600" y="6356350"/>
+            <a:ext cx="2743200" cy="365125"/>
+          </a:xfrm>
+        </p:spPr>
+        <p:txBody>
+          <a:bodyPr rtlCol="0"/>
+          <a:lstStyle/>
+          <a:p>
+            <a:pPr rtl="0"/>
+            <a:fld id="{19B51A1E-902D-48AF-9020-955120F399B6}" type="slidenum">
+              <a:rPr lang="pt-BR" smtClean="0"/>
+              <a:pPr rtl="0"/>
+              <a:t>13</a:t>
+            </a:fld>
+            <a:endParaRPr lang="pt-BR"/>
+          </a:p>
+        </p:txBody>
+      </p:sp>
+      <p:sp>
+        <p:nvSpPr>
+          <p:cNvPr id="20" name="Espaço Reservado para Conteúdo 3">
+            <a:extLst>
+              <a:ext uri="{FF2B5EF4-FFF2-40B4-BE49-F238E27FC236}">
+                <a16:creationId xmlns:a16="http://schemas.microsoft.com/office/drawing/2014/main" id="{A26C9687-67C8-0FE8-0794-47272524905A}"/>
+              </a:ext>
+            </a:extLst>
+          </p:cNvPr>
+          <p:cNvSpPr txBox="1">
+            <a:spLocks/>
+          </p:cNvSpPr>
+          <p:nvPr/>
+        </p:nvSpPr>
+        <p:spPr>
+          <a:xfrm>
+            <a:off x="176168" y="1643152"/>
+            <a:ext cx="11694252" cy="4812176"/>
+          </a:xfrm>
+          <a:prstGeom prst="rect">
+            <a:avLst/>
+          </a:prstGeom>
+        </p:spPr>
+        <p:txBody>
+          <a:bodyPr rtlCol="0">
+            <a:normAutofit/>
+          </a:bodyPr>
+          <a:lstStyle>
+            <a:lvl1pPr marL="228600" indent="-228600" algn="l" defTabSz="914400" rtl="0" eaLnBrk="1" latinLnBrk="0" hangingPunct="1">
+              <a:lnSpc>
+                <a:spcPct val="90000"/>
+              </a:lnSpc>
+              <a:spcBef>
+                <a:spcPts val="1000"/>
+              </a:spcBef>
+              <a:buFont typeface="Arial" panose="020B0604020202020204" pitchFamily="34" charset="0"/>
+              <a:buChar char="•"/>
+              <a:defRPr sz="2800" kern="1200">
+                <a:solidFill>
+                  <a:schemeClr val="tx1"/>
+                </a:solidFill>
+                <a:latin typeface="+mn-lt"/>
+                <a:ea typeface="+mn-ea"/>
+                <a:cs typeface="+mn-cs"/>
+              </a:defRPr>
+            </a:lvl1pPr>
+            <a:lvl2pPr marL="685800" indent="-228600" algn="l" defTabSz="914400" rtl="0" eaLnBrk="1" latinLnBrk="0" hangingPunct="1">
+              <a:lnSpc>
+                <a:spcPct val="90000"/>
+              </a:lnSpc>
+              <a:spcBef>
+                <a:spcPts val="500"/>
+              </a:spcBef>
+              <a:buFont typeface="Arial" panose="020B0604020202020204" pitchFamily="34" charset="0"/>
+              <a:buChar char="•"/>
+              <a:defRPr sz="2400" kern="1200">
+                <a:solidFill>
+                  <a:schemeClr val="tx1"/>
+                </a:solidFill>
+                <a:latin typeface="+mn-lt"/>
+                <a:ea typeface="+mn-ea"/>
+                <a:cs typeface="+mn-cs"/>
+              </a:defRPr>
+            </a:lvl2pPr>
+            <a:lvl3pPr marL="1143000" indent="-228600" algn="l" defTabSz="914400" rtl="0" eaLnBrk="1" latinLnBrk="0" hangingPunct="1">
+              <a:lnSpc>
+                <a:spcPct val="90000"/>
+              </a:lnSpc>
+              <a:spcBef>
+                <a:spcPts val="500"/>
+              </a:spcBef>
+              <a:buFont typeface="Arial" panose="020B0604020202020204" pitchFamily="34" charset="0"/>
+              <a:buChar char="•"/>
+              <a:defRPr sz="2000" kern="1200">
+                <a:solidFill>
+                  <a:schemeClr val="tx1"/>
+                </a:solidFill>
+                <a:latin typeface="+mn-lt"/>
+                <a:ea typeface="+mn-ea"/>
+                <a:cs typeface="+mn-cs"/>
+              </a:defRPr>
+            </a:lvl3pPr>
+            <a:lvl4pPr marL="1600200" indent="-228600" algn="l" defTabSz="914400" rtl="0" eaLnBrk="1" latinLnBrk="0" hangingPunct="1">
+              <a:lnSpc>
+                <a:spcPct val="90000"/>
+              </a:lnSpc>
+              <a:spcBef>
+                <a:spcPts val="500"/>
+              </a:spcBef>
+              <a:buFont typeface="Arial" panose="020B0604020202020204" pitchFamily="34" charset="0"/>
+              <a:buChar char="•"/>
+              <a:defRPr sz="1800" kern="1200">
+                <a:solidFill>
+                  <a:schemeClr val="tx1"/>
+                </a:solidFill>
+                <a:latin typeface="+mn-lt"/>
+                <a:ea typeface="+mn-ea"/>
+                <a:cs typeface="+mn-cs"/>
+              </a:defRPr>
+            </a:lvl4pPr>
+            <a:lvl5pPr marL="2057400" indent="-228600" algn="l" defTabSz="914400" rtl="0" eaLnBrk="1" latinLnBrk="0" hangingPunct="1">
+              <a:lnSpc>
+                <a:spcPct val="90000"/>
+              </a:lnSpc>
+              <a:spcBef>
+                <a:spcPts val="500"/>
+              </a:spcBef>
+              <a:buFont typeface="Arial" panose="020B0604020202020204" pitchFamily="34" charset="0"/>
+              <a:buChar char="•"/>
+              <a:defRPr sz="1800" kern="1200">
+                <a:solidFill>
+                  <a:schemeClr val="tx1"/>
+                </a:solidFill>
+                <a:latin typeface="+mn-lt"/>
+                <a:ea typeface="+mn-ea"/>
+                <a:cs typeface="+mn-cs"/>
+              </a:defRPr>
+            </a:lvl5pPr>
+            <a:lvl6pPr marL="2514600" indent="-228600" algn="l" defTabSz="914400" rtl="0" eaLnBrk="1" latinLnBrk="0" hangingPunct="1">
+              <a:lnSpc>
+                <a:spcPct val="90000"/>
+              </a:lnSpc>
+              <a:spcBef>
+                <a:spcPts val="500"/>
+              </a:spcBef>
+              <a:buFont typeface="Arial" panose="020B0604020202020204" pitchFamily="34" charset="0"/>
+              <a:buChar char="•"/>
+              <a:defRPr sz="1800" kern="1200">
+                <a:solidFill>
+                  <a:schemeClr val="tx1"/>
+                </a:solidFill>
+                <a:latin typeface="+mn-lt"/>
+                <a:ea typeface="+mn-ea"/>
+                <a:cs typeface="+mn-cs"/>
+              </a:defRPr>
+            </a:lvl6pPr>
+            <a:lvl7pPr marL="2971800" indent="-228600" algn="l" defTabSz="914400" rtl="0" eaLnBrk="1" latinLnBrk="0" hangingPunct="1">
+              <a:lnSpc>
+                <a:spcPct val="90000"/>
+              </a:lnSpc>
+              <a:spcBef>
+                <a:spcPts val="500"/>
+              </a:spcBef>
+              <a:buFont typeface="Arial" panose="020B0604020202020204" pitchFamily="34" charset="0"/>
+              <a:buChar char="•"/>
+              <a:defRPr sz="1800" kern="1200">
+                <a:solidFill>
+                  <a:schemeClr val="tx1"/>
+                </a:solidFill>
+                <a:latin typeface="+mn-lt"/>
+                <a:ea typeface="+mn-ea"/>
+                <a:cs typeface="+mn-cs"/>
+              </a:defRPr>
+            </a:lvl7pPr>
+            <a:lvl8pPr marL="3429000" indent="-228600" algn="l" defTabSz="914400" rtl="0" eaLnBrk="1" latinLnBrk="0" hangingPunct="1">
+              <a:lnSpc>
+                <a:spcPct val="90000"/>
+              </a:lnSpc>
+              <a:spcBef>
+                <a:spcPts val="500"/>
+              </a:spcBef>
+              <a:buFont typeface="Arial" panose="020B0604020202020204" pitchFamily="34" charset="0"/>
+              <a:buChar char="•"/>
+              <a:defRPr sz="1800" kern="1200">
+                <a:solidFill>
+                  <a:schemeClr val="tx1"/>
+                </a:solidFill>
+                <a:latin typeface="+mn-lt"/>
+                <a:ea typeface="+mn-ea"/>
+                <a:cs typeface="+mn-cs"/>
+              </a:defRPr>
+            </a:lvl8pPr>
+            <a:lvl9pPr marL="3886200" indent="-228600" algn="l" defTabSz="914400" rtl="0" eaLnBrk="1" latinLnBrk="0" hangingPunct="1">
+              <a:lnSpc>
+                <a:spcPct val="90000"/>
+              </a:lnSpc>
+              <a:spcBef>
+                <a:spcPts val="500"/>
+              </a:spcBef>
+              <a:buFont typeface="Arial" panose="020B0604020202020204" pitchFamily="34" charset="0"/>
+              <a:buChar char="•"/>
+              <a:defRPr sz="1800" kern="1200">
+                <a:solidFill>
+                  <a:schemeClr val="tx1"/>
+                </a:solidFill>
+                <a:latin typeface="+mn-lt"/>
+                <a:ea typeface="+mn-ea"/>
+                <a:cs typeface="+mn-cs"/>
+              </a:defRPr>
+            </a:lvl9pPr>
+          </a:lstStyle>
+          <a:p>
+            <a:pPr marL="457200" indent="-457200">
+              <a:lnSpc>
+                <a:spcPct val="100000"/>
+              </a:lnSpc>
+              <a:buAutoNum type="arabicPeriod"/>
+            </a:pPr>
+            <a:r>
+              <a:rPr lang="pt-BR" sz="2400" dirty="0">
+                <a:solidFill>
+                  <a:schemeClr val="accent1"/>
+                </a:solidFill>
+                <a:latin typeface="Arial" panose="020B0604020202020204" pitchFamily="34" charset="0"/>
+                <a:cs typeface="Arial" panose="020B0604020202020204" pitchFamily="34" charset="0"/>
+              </a:rPr>
+              <a:t>A implementação usando a função SUM como agregação deu um resultado muito ruim.</a:t>
+            </a:r>
+          </a:p>
+          <a:p>
+            <a:pPr marL="457200" indent="-457200">
+              <a:lnSpc>
+                <a:spcPct val="100000"/>
+              </a:lnSpc>
+              <a:buAutoNum type="arabicPeriod"/>
+            </a:pPr>
+            <a:endParaRPr lang="pt-BR" sz="2400" dirty="0">
+              <a:solidFill>
+                <a:schemeClr val="accent1"/>
+              </a:solidFill>
+              <a:latin typeface="Arial" panose="020B0604020202020204" pitchFamily="34" charset="0"/>
+              <a:cs typeface="Arial" panose="020B0604020202020204" pitchFamily="34" charset="0"/>
+            </a:endParaRPr>
+          </a:p>
+          <a:p>
+            <a:pPr marL="457200" indent="-457200">
+              <a:lnSpc>
+                <a:spcPct val="100000"/>
+              </a:lnSpc>
+              <a:buAutoNum type="arabicPeriod"/>
+            </a:pPr>
+            <a:r>
+              <a:rPr lang="pt-BR" sz="2400" dirty="0">
+                <a:solidFill>
+                  <a:schemeClr val="accent1"/>
+                </a:solidFill>
+                <a:latin typeface="Arial" panose="020B0604020202020204" pitchFamily="34" charset="0"/>
+                <a:cs typeface="Arial" panose="020B0604020202020204" pitchFamily="34" charset="0"/>
+              </a:rPr>
+              <a:t>Calcular o score conforme proposto no SPLADEv2 piorou os resultados.</a:t>
+            </a:r>
+          </a:p>
+          <a:p>
+            <a:pPr marL="457200" indent="-457200">
+              <a:lnSpc>
+                <a:spcPct val="100000"/>
+              </a:lnSpc>
+              <a:buAutoNum type="arabicPeriod"/>
+            </a:pPr>
+            <a:endParaRPr lang="pt-BR" sz="2400" dirty="0">
+              <a:solidFill>
+                <a:schemeClr val="accent1"/>
+              </a:solidFill>
+              <a:latin typeface="Arial" panose="020B0604020202020204" pitchFamily="34" charset="0"/>
+              <a:cs typeface="Arial" panose="020B0604020202020204" pitchFamily="34" charset="0"/>
+            </a:endParaRPr>
+          </a:p>
+          <a:p>
+            <a:pPr marL="457200" indent="-457200">
+              <a:lnSpc>
+                <a:spcPct val="100000"/>
+              </a:lnSpc>
+              <a:buAutoNum type="arabicPeriod"/>
+            </a:pPr>
+            <a:r>
+              <a:rPr lang="pt-BR" sz="2400" dirty="0">
+                <a:solidFill>
+                  <a:schemeClr val="accent1"/>
+                </a:solidFill>
+                <a:latin typeface="Arial" panose="020B0604020202020204" pitchFamily="34" charset="0"/>
+                <a:cs typeface="Arial" panose="020B0604020202020204" pitchFamily="34" charset="0"/>
+              </a:rPr>
+              <a:t>Parece que a melhor combinação foi a função agregação MAX (SPLADEv2) com o score calculado conforme SPLADEv1.</a:t>
+            </a:r>
+          </a:p>
+          <a:p>
+            <a:pPr marL="457200" indent="-457200">
+              <a:lnSpc>
+                <a:spcPct val="100000"/>
+              </a:lnSpc>
+              <a:buAutoNum type="arabicPeriod"/>
+            </a:pPr>
+            <a:endParaRPr lang="pt-BR" sz="2400" dirty="0">
+              <a:solidFill>
+                <a:schemeClr val="accent1"/>
+              </a:solidFill>
+              <a:latin typeface="Arial" panose="020B0604020202020204" pitchFamily="34" charset="0"/>
+              <a:cs typeface="Arial" panose="020B0604020202020204" pitchFamily="34" charset="0"/>
+            </a:endParaRPr>
+          </a:p>
+          <a:p>
+            <a:pPr marL="457200" indent="-457200">
+              <a:lnSpc>
+                <a:spcPct val="100000"/>
+              </a:lnSpc>
+              <a:buAutoNum type="arabicPeriod"/>
+            </a:pPr>
+            <a:endParaRPr lang="pt-BR" sz="2400" dirty="0">
+              <a:solidFill>
+                <a:schemeClr val="accent1"/>
+              </a:solidFill>
+              <a:latin typeface="Arial" panose="020B0604020202020204" pitchFamily="34" charset="0"/>
+              <a:cs typeface="Arial" panose="020B0604020202020204" pitchFamily="34" charset="0"/>
+            </a:endParaRPr>
+          </a:p>
+          <a:p>
+            <a:pPr marL="0" indent="0" algn="ctr">
+              <a:lnSpc>
+                <a:spcPct val="100000"/>
+              </a:lnSpc>
+              <a:buNone/>
+            </a:pPr>
+            <a:r>
+              <a:rPr lang="pt-BR" sz="2400" dirty="0">
+                <a:solidFill>
+                  <a:schemeClr val="accent1"/>
+                </a:solidFill>
+                <a:latin typeface="Arial" panose="020B0604020202020204" pitchFamily="34" charset="0"/>
+                <a:cs typeface="Arial" panose="020B0604020202020204" pitchFamily="34" charset="0"/>
+              </a:rPr>
+              <a:t>Faz sentido isso? Ou foi algum bug no desenvolvimento?</a:t>
+            </a:r>
+          </a:p>
+        </p:txBody>
+      </p:sp>
+    </p:spTree>
+    <p:extLst>
+      <p:ext uri="{BB962C8B-B14F-4D97-AF65-F5344CB8AC3E}">
+        <p14:creationId xmlns:p14="http://schemas.microsoft.com/office/powerpoint/2010/main" val="227318804"/>
+      </p:ext>
+    </p:extLst>
+  </p:cSld>
+  <p:clrMapOvr>
+    <a:masterClrMapping/>
+  </p:clrMapOvr>
+</p:sld>
+</file>
+
+<file path=ppt/slides/slide14.xml><?xml version="1.0" encoding="utf-8"?>
+<p:sld xmlns:a="http://schemas.openxmlformats.org/drawingml/2006/main" xmlns:r="http://schemas.openxmlformats.org/officeDocument/2006/relationships" xmlns:p="http://schemas.openxmlformats.org/presentationml/2006/main">
+  <p:cSld>
+    <p:spTree>
+      <p:nvGrpSpPr>
+        <p:cNvPr id="1" name=""/>
+        <p:cNvGrpSpPr/>
+        <p:nvPr/>
+      </p:nvGrpSpPr>
+      <p:grpSpPr>
+        <a:xfrm>
+          <a:off x="0" y="0"/>
+          <a:ext cx="0" cy="0"/>
+          <a:chOff x="0" y="0"/>
+          <a:chExt cx="0" cy="0"/>
+        </a:xfrm>
+      </p:grpSpPr>
+      <p:sp>
+        <p:nvSpPr>
+          <p:cNvPr id="2" name="Título 1">
+            <a:extLst>
+              <a:ext uri="{FF2B5EF4-FFF2-40B4-BE49-F238E27FC236}">
                 <a16:creationId xmlns:a16="http://schemas.microsoft.com/office/drawing/2014/main" id="{BCCAEE93-8585-46D4-A7EC-F184E317CB2E}"/>
               </a:ext>
             </a:extLst>
@@ -12057,7 +12743,7 @@
             <a:fld id="{B5CEABB6-07DC-46E8-9B57-56EC44A396E5}" type="slidenum">
               <a:rPr lang="pt-BR" smtClean="0"/>
               <a:pPr rtl="0"/>
-              <a:t>13</a:t>
+              <a:t>14</a:t>
             </a:fld>
             <a:endParaRPr lang="pt-BR"/>
           </a:p>
@@ -19477,7 +20163,7 @@
             <a:pPr algn="l" rtl="0"/>
             <a:r>
               <a:rPr lang="pt-BR" dirty="0"/>
-              <a:t>Truques de código que funcionaram</a:t>
+              <a:t>Problemas e soluções no desenvolvimento</a:t>
             </a:r>
           </a:p>
         </p:txBody>
@@ -19498,7 +20184,7 @@
         </p:nvSpPr>
         <p:spPr>
           <a:xfrm>
-            <a:off x="176168" y="1643150"/>
+            <a:off x="176168" y="1298093"/>
             <a:ext cx="11694252" cy="4812178"/>
           </a:xfrm>
           <a:prstGeom prst="rect">
@@ -19688,7 +20374,40 @@
                 <a:latin typeface="Arial" panose="020B0604020202020204" pitchFamily="34" charset="0"/>
                 <a:cs typeface="Arial" panose="020B0604020202020204" pitchFamily="34" charset="0"/>
               </a:rPr>
-              <a:t>Ordenar o </a:t>
+              <a:t>3. Lentidão na etapa de inferência</a:t>
+            </a:r>
+          </a:p>
+          <a:p>
+            <a:pPr marL="0" indent="0">
+              <a:lnSpc>
+                <a:spcPct val="100000"/>
+              </a:lnSpc>
+              <a:buNone/>
+            </a:pPr>
+            <a:endParaRPr lang="pt-BR" sz="2400" dirty="0">
+              <a:solidFill>
+                <a:schemeClr val="accent1"/>
+              </a:solidFill>
+              <a:latin typeface="Arial" panose="020B0604020202020204" pitchFamily="34" charset="0"/>
+              <a:cs typeface="Arial" panose="020B0604020202020204" pitchFamily="34" charset="0"/>
+            </a:endParaRPr>
+          </a:p>
+          <a:p>
+            <a:pPr marL="0" indent="0">
+              <a:lnSpc>
+                <a:spcPct val="100000"/>
+              </a:lnSpc>
+              <a:buNone/>
+            </a:pPr>
+            <a:r>
+              <a:rPr lang="pt-BR" sz="2400" dirty="0">
+                <a:solidFill>
+                  <a:schemeClr val="accent1"/>
+                </a:solidFill>
+                <a:latin typeface="Arial" panose="020B0604020202020204" pitchFamily="34" charset="0"/>
+                <a:cs typeface="Arial" panose="020B0604020202020204" pitchFamily="34" charset="0"/>
+              </a:rPr>
+              <a:t>	Solução: Ordenar o </a:t>
             </a:r>
             <a:r>
               <a:rPr lang="pt-BR" sz="2400" dirty="0" err="1">
@@ -19710,6 +20429,225 @@
               </a:rPr>
               <a:t> antes de indexar e usar fp16 (ideia de Marcos Piau) diminui o tempo de processamento</a:t>
             </a:r>
+          </a:p>
+          <a:p>
+            <a:pPr marL="0" indent="0">
+              <a:lnSpc>
+                <a:spcPct val="100000"/>
+              </a:lnSpc>
+              <a:buNone/>
+            </a:pPr>
+            <a:endParaRPr lang="pt-BR" sz="2400" dirty="0">
+              <a:solidFill>
+                <a:schemeClr val="accent1"/>
+              </a:solidFill>
+              <a:latin typeface="Arial" panose="020B0604020202020204" pitchFamily="34" charset="0"/>
+              <a:cs typeface="Arial" panose="020B0604020202020204" pitchFamily="34" charset="0"/>
+            </a:endParaRPr>
+          </a:p>
+          <a:p>
+            <a:pPr marL="0" indent="0">
+              <a:lnSpc>
+                <a:spcPct val="100000"/>
+              </a:lnSpc>
+              <a:buNone/>
+            </a:pPr>
+            <a:r>
+              <a:rPr lang="pt-BR" sz="2400" dirty="0">
+                <a:solidFill>
+                  <a:schemeClr val="accent1"/>
+                </a:solidFill>
+                <a:latin typeface="Arial" panose="020B0604020202020204" pitchFamily="34" charset="0"/>
+                <a:cs typeface="Arial" panose="020B0604020202020204" pitchFamily="34" charset="0"/>
+              </a:rPr>
+              <a:t>	Solução: Máscara estava na </a:t>
+            </a:r>
+            <a:r>
+              <a:rPr lang="pt-BR" sz="2400" dirty="0" err="1">
+                <a:solidFill>
+                  <a:schemeClr val="accent1"/>
+                </a:solidFill>
+                <a:latin typeface="Arial" panose="020B0604020202020204" pitchFamily="34" charset="0"/>
+                <a:cs typeface="Arial" panose="020B0604020202020204" pitchFamily="34" charset="0"/>
+              </a:rPr>
+              <a:t>cpu</a:t>
+            </a:r>
+            <a:r>
+              <a:rPr lang="pt-BR" sz="2400" dirty="0">
+                <a:solidFill>
+                  <a:schemeClr val="accent1"/>
+                </a:solidFill>
+                <a:latin typeface="Arial" panose="020B0604020202020204" pitchFamily="34" charset="0"/>
+                <a:cs typeface="Arial" panose="020B0604020202020204" pitchFamily="34" charset="0"/>
+              </a:rPr>
+              <a:t> (e não na </a:t>
+            </a:r>
+            <a:r>
+              <a:rPr lang="pt-BR" sz="2400" dirty="0" err="1">
+                <a:solidFill>
+                  <a:schemeClr val="accent1"/>
+                </a:solidFill>
+                <a:latin typeface="Arial" panose="020B0604020202020204" pitchFamily="34" charset="0"/>
+                <a:cs typeface="Arial" panose="020B0604020202020204" pitchFamily="34" charset="0"/>
+              </a:rPr>
+              <a:t>gpu</a:t>
+            </a:r>
+            <a:r>
+              <a:rPr lang="pt-BR" sz="2400" dirty="0">
+                <a:solidFill>
+                  <a:schemeClr val="accent1"/>
+                </a:solidFill>
+                <a:latin typeface="Arial" panose="020B0604020202020204" pitchFamily="34" charset="0"/>
+                <a:cs typeface="Arial" panose="020B0604020202020204" pitchFamily="34" charset="0"/>
+              </a:rPr>
+              <a:t>) (</a:t>
+            </a:r>
+            <a:r>
+              <a:rPr lang="pt-BR" sz="2400" dirty="0" err="1">
+                <a:solidFill>
+                  <a:schemeClr val="accent1"/>
+                </a:solidFill>
+                <a:latin typeface="Arial" panose="020B0604020202020204" pitchFamily="34" charset="0"/>
+                <a:cs typeface="Arial" panose="020B0604020202020204" pitchFamily="34" charset="0"/>
+              </a:rPr>
+              <a:t>tks</a:t>
+            </a:r>
+            <a:r>
+              <a:rPr lang="pt-BR" sz="2400" dirty="0">
+                <a:solidFill>
+                  <a:schemeClr val="accent1"/>
+                </a:solidFill>
+                <a:latin typeface="Arial" panose="020B0604020202020204" pitchFamily="34" charset="0"/>
+                <a:cs typeface="Arial" panose="020B0604020202020204" pitchFamily="34" charset="0"/>
+              </a:rPr>
+              <a:t> </a:t>
+            </a:r>
+            <a:r>
+              <a:rPr lang="pt-BR" sz="2400" dirty="0" err="1">
+                <a:solidFill>
+                  <a:schemeClr val="accent1"/>
+                </a:solidFill>
+                <a:latin typeface="Arial" panose="020B0604020202020204" pitchFamily="34" charset="0"/>
+                <a:cs typeface="Arial" panose="020B0604020202020204" pitchFamily="34" charset="0"/>
+              </a:rPr>
+              <a:t>Borela</a:t>
+            </a:r>
+            <a:r>
+              <a:rPr lang="pt-BR" sz="2400" dirty="0">
+                <a:solidFill>
+                  <a:schemeClr val="accent1"/>
+                </a:solidFill>
+                <a:latin typeface="Arial" panose="020B0604020202020204" pitchFamily="34" charset="0"/>
+                <a:cs typeface="Arial" panose="020B0604020202020204" pitchFamily="34" charset="0"/>
+              </a:rPr>
+              <a:t>)</a:t>
+            </a:r>
+          </a:p>
+        </p:txBody>
+      </p:sp>
+      <p:pic>
+        <p:nvPicPr>
+          <p:cNvPr id="4" name="Imagem 3">
+            <a:extLst>
+              <a:ext uri="{FF2B5EF4-FFF2-40B4-BE49-F238E27FC236}">
+                <a16:creationId xmlns:a16="http://schemas.microsoft.com/office/drawing/2014/main" id="{BFC5B76B-0450-6452-2F16-7F1DFFDE5556}"/>
+              </a:ext>
+            </a:extLst>
+          </p:cNvPr>
+          <p:cNvPicPr>
+            <a:picLocks noChangeAspect="1"/>
+          </p:cNvPicPr>
+          <p:nvPr/>
+        </p:nvPicPr>
+        <p:blipFill>
+          <a:blip r:embed="rId3"/>
+          <a:stretch>
+            <a:fillRect/>
+          </a:stretch>
+        </p:blipFill>
+        <p:spPr>
+          <a:xfrm>
+            <a:off x="321580" y="4464532"/>
+            <a:ext cx="9382125" cy="1095375"/>
+          </a:xfrm>
+          <a:prstGeom prst="rect">
+            <a:avLst/>
+          </a:prstGeom>
+        </p:spPr>
+      </p:pic>
+      <p:pic>
+        <p:nvPicPr>
+          <p:cNvPr id="6" name="Imagem 5">
+            <a:extLst>
+              <a:ext uri="{FF2B5EF4-FFF2-40B4-BE49-F238E27FC236}">
+                <a16:creationId xmlns:a16="http://schemas.microsoft.com/office/drawing/2014/main" id="{A1241527-362E-85C5-01D4-F6128EF7E159}"/>
+              </a:ext>
+            </a:extLst>
+          </p:cNvPr>
+          <p:cNvPicPr>
+            <a:picLocks noChangeAspect="1"/>
+          </p:cNvPicPr>
+          <p:nvPr/>
+        </p:nvPicPr>
+        <p:blipFill>
+          <a:blip r:embed="rId4"/>
+          <a:stretch>
+            <a:fillRect/>
+          </a:stretch>
+        </p:blipFill>
+        <p:spPr>
+          <a:xfrm>
+            <a:off x="3747952" y="5758854"/>
+            <a:ext cx="8239125" cy="838200"/>
+          </a:xfrm>
+          <a:prstGeom prst="rect">
+            <a:avLst/>
+          </a:prstGeom>
+        </p:spPr>
+      </p:pic>
+      <p:sp>
+        <p:nvSpPr>
+          <p:cNvPr id="7" name="Seta: Dobrada para Cima 6">
+            <a:extLst>
+              <a:ext uri="{FF2B5EF4-FFF2-40B4-BE49-F238E27FC236}">
+                <a16:creationId xmlns:a16="http://schemas.microsoft.com/office/drawing/2014/main" id="{A37A627F-E6AD-7E89-F20E-4CF53D425D35}"/>
+              </a:ext>
+            </a:extLst>
+          </p:cNvPr>
+          <p:cNvSpPr/>
+          <p:nvPr/>
+        </p:nvSpPr>
+        <p:spPr>
+          <a:xfrm rot="5400000">
+            <a:off x="2863970" y="5721151"/>
+            <a:ext cx="707366" cy="655608"/>
+          </a:xfrm>
+          <a:prstGeom prst="bentUpArrow">
+            <a:avLst/>
+          </a:prstGeom>
+        </p:spPr>
+        <p:style>
+          <a:lnRef idx="2">
+            <a:schemeClr val="accent1">
+              <a:shade val="50000"/>
+            </a:schemeClr>
+          </a:lnRef>
+          <a:fillRef idx="1">
+            <a:schemeClr val="accent1"/>
+          </a:fillRef>
+          <a:effectRef idx="0">
+            <a:schemeClr val="accent1"/>
+          </a:effectRef>
+          <a:fontRef idx="minor">
+            <a:schemeClr val="lt1"/>
+          </a:fontRef>
+        </p:style>
+        <p:txBody>
+          <a:bodyPr rtlCol="0" anchor="ctr"/>
+          <a:lstStyle/>
+          <a:p>
+            <a:pPr algn="ctr"/>
+            <a:endParaRPr lang="pt-BR"/>
           </a:p>
         </p:txBody>
       </p:sp>
@@ -22523,6 +23461,25 @@
 </file>
 
 <file path=customXml/item1.xml><?xml version="1.0" encoding="utf-8"?>
+<p:properties xmlns:p="http://schemas.microsoft.com/office/2006/metadata/properties" xmlns:xsi="http://www.w3.org/2001/XMLSchema-instance" xmlns:pc="http://schemas.microsoft.com/office/infopath/2007/PartnerControls">
+  <documentManagement>
+    <_ip_UnifiedCompliancePolicyUIAction xmlns="http://schemas.microsoft.com/sharepoint/v3" xsi:nil="true"/>
+    <Image xmlns="71af3243-3dd4-4a8d-8c0d-dd76da1f02a5">
+      <Url xsi:nil="true"/>
+      <Description xsi:nil="true"/>
+    </Image>
+    <Status xmlns="71af3243-3dd4-4a8d-8c0d-dd76da1f02a5">Not started</Status>
+    <_ip_UnifiedCompliancePolicyProperties xmlns="http://schemas.microsoft.com/sharepoint/v3" xsi:nil="true"/>
+    <ImageTagsTaxHTField xmlns="71af3243-3dd4-4a8d-8c0d-dd76da1f02a5">
+      <Terms xmlns="http://schemas.microsoft.com/office/infopath/2007/PartnerControls"/>
+    </ImageTagsTaxHTField>
+    <TaxCatchAll xmlns="230e9df3-be65-4c73-a93b-d1236ebd677e"/>
+    <MediaServiceKeyPoints xmlns="71af3243-3dd4-4a8d-8c0d-dd76da1f02a5" xsi:nil="true"/>
+  </documentManagement>
+</p:properties>
+</file>
+
+<file path=customXml/item2.xml><?xml version="1.0" encoding="utf-8"?>
 <ct:contentTypeSchema xmlns:ct="http://schemas.microsoft.com/office/2006/metadata/contentType" xmlns:ma="http://schemas.microsoft.com/office/2006/metadata/properties/metaAttributes" ct:_="" ma:_="" ma:contentTypeName="Document" ma:contentTypeID="0x01010079F111ED35F8CC479449609E8A0923A6" ma:contentTypeVersion="21" ma:contentTypeDescription="Create a new document." ma:contentTypeScope="" ma:versionID="64dfb1555687e0874b4304b796b5b0c7">
   <xsd:schema xmlns:xsd="http://www.w3.org/2001/XMLSchema" xmlns:xs="http://www.w3.org/2001/XMLSchema" xmlns:p="http://schemas.microsoft.com/office/2006/metadata/properties" xmlns:ns1="http://schemas.microsoft.com/sharepoint/v3" xmlns:ns2="71af3243-3dd4-4a8d-8c0d-dd76da1f02a5" xmlns:ns3="16c05727-aa75-4e4a-9b5f-8a80a1165891" xmlns:ns4="230e9df3-be65-4c73-a93b-d1236ebd677e" targetNamespace="http://schemas.microsoft.com/office/2006/metadata/properties" ma:root="true" ma:fieldsID="e6e4c555b5e194d05b7203de9c4567b3" ns1:_="" ns2:_="" ns3:_="" ns4:_="">
     <xsd:import namespace="http://schemas.microsoft.com/sharepoint/v3"/>
@@ -22804,25 +23761,6 @@
 </ct:contentTypeSchema>
 </file>
 
-<file path=customXml/item2.xml><?xml version="1.0" encoding="utf-8"?>
-<p:properties xmlns:p="http://schemas.microsoft.com/office/2006/metadata/properties" xmlns:xsi="http://www.w3.org/2001/XMLSchema-instance" xmlns:pc="http://schemas.microsoft.com/office/infopath/2007/PartnerControls">
-  <documentManagement>
-    <_ip_UnifiedCompliancePolicyUIAction xmlns="http://schemas.microsoft.com/sharepoint/v3" xsi:nil="true"/>
-    <Image xmlns="71af3243-3dd4-4a8d-8c0d-dd76da1f02a5">
-      <Url xsi:nil="true"/>
-      <Description xsi:nil="true"/>
-    </Image>
-    <Status xmlns="71af3243-3dd4-4a8d-8c0d-dd76da1f02a5">Not started</Status>
-    <_ip_UnifiedCompliancePolicyProperties xmlns="http://schemas.microsoft.com/sharepoint/v3" xsi:nil="true"/>
-    <ImageTagsTaxHTField xmlns="71af3243-3dd4-4a8d-8c0d-dd76da1f02a5">
-      <Terms xmlns="http://schemas.microsoft.com/office/infopath/2007/PartnerControls"/>
-    </ImageTagsTaxHTField>
-    <TaxCatchAll xmlns="230e9df3-be65-4c73-a93b-d1236ebd677e"/>
-    <MediaServiceKeyPoints xmlns="71af3243-3dd4-4a8d-8c0d-dd76da1f02a5" xsi:nil="true"/>
-  </documentManagement>
-</p:properties>
-</file>
-
 <file path=customXml/item3.xml><?xml version="1.0" encoding="utf-8"?>
 <?mso-contentType ?>
 <FormTemplates xmlns="http://schemas.microsoft.com/sharepoint/v3/contenttype/forms">
@@ -22833,6 +23771,25 @@
 </file>
 
 <file path=customXml/itemProps1.xml><?xml version="1.0" encoding="utf-8"?>
+<ds:datastoreItem xmlns:ds="http://schemas.openxmlformats.org/officeDocument/2006/customXml" ds:itemID="{CA4F7154-AFAC-4BE7-8A74-7F4B6FC2743C}">
+  <ds:schemaRefs>
+    <ds:schemaRef ds:uri="http://www.w3.org/XML/1998/namespace"/>
+    <ds:schemaRef ds:uri="http://schemas.microsoft.com/office/2006/documentManagement/types"/>
+    <ds:schemaRef ds:uri="http://schemas.microsoft.com/office/infopath/2007/PartnerControls"/>
+    <ds:schemaRef ds:uri="http://purl.org/dc/dcmitype/"/>
+    <ds:schemaRef ds:uri="71af3243-3dd4-4a8d-8c0d-dd76da1f02a5"/>
+    <ds:schemaRef ds:uri="http://schemas.openxmlformats.org/package/2006/metadata/core-properties"/>
+    <ds:schemaRef ds:uri="http://purl.org/dc/terms/"/>
+    <ds:schemaRef ds:uri="230e9df3-be65-4c73-a93b-d1236ebd677e"/>
+    <ds:schemaRef ds:uri="http://schemas.microsoft.com/office/2006/metadata/properties"/>
+    <ds:schemaRef ds:uri="16c05727-aa75-4e4a-9b5f-8a80a1165891"/>
+    <ds:schemaRef ds:uri="http://schemas.microsoft.com/sharepoint/v3"/>
+    <ds:schemaRef ds:uri="http://purl.org/dc/elements/1.1/"/>
+  </ds:schemaRefs>
+</ds:datastoreItem>
+</file>
+
+<file path=customXml/itemProps2.xml><?xml version="1.0" encoding="utf-8"?>
 <ds:datastoreItem xmlns:ds="http://schemas.openxmlformats.org/officeDocument/2006/customXml" ds:itemID="{67ACD96E-49A0-4DA4-A7BB-AC2D8874213F}">
   <ds:schemaRefs>
     <ds:schemaRef ds:uri="http://schemas.microsoft.com/office/2006/metadata/contentType"/>
@@ -22853,25 +23810,6 @@
 </ds:datastoreItem>
 </file>
 
-<file path=customXml/itemProps2.xml><?xml version="1.0" encoding="utf-8"?>
-<ds:datastoreItem xmlns:ds="http://schemas.openxmlformats.org/officeDocument/2006/customXml" ds:itemID="{CA4F7154-AFAC-4BE7-8A74-7F4B6FC2743C}">
-  <ds:schemaRefs>
-    <ds:schemaRef ds:uri="http://www.w3.org/XML/1998/namespace"/>
-    <ds:schemaRef ds:uri="http://schemas.microsoft.com/office/2006/documentManagement/types"/>
-    <ds:schemaRef ds:uri="http://schemas.microsoft.com/office/infopath/2007/PartnerControls"/>
-    <ds:schemaRef ds:uri="http://purl.org/dc/dcmitype/"/>
-    <ds:schemaRef ds:uri="71af3243-3dd4-4a8d-8c0d-dd76da1f02a5"/>
-    <ds:schemaRef ds:uri="http://schemas.openxmlformats.org/package/2006/metadata/core-properties"/>
-    <ds:schemaRef ds:uri="http://purl.org/dc/terms/"/>
-    <ds:schemaRef ds:uri="230e9df3-be65-4c73-a93b-d1236ebd677e"/>
-    <ds:schemaRef ds:uri="http://schemas.microsoft.com/office/2006/metadata/properties"/>
-    <ds:schemaRef ds:uri="16c05727-aa75-4e4a-9b5f-8a80a1165891"/>
-    <ds:schemaRef ds:uri="http://schemas.microsoft.com/sharepoint/v3"/>
-    <ds:schemaRef ds:uri="http://purl.org/dc/elements/1.1/"/>
-  </ds:schemaRefs>
-</ds:datastoreItem>
-</file>
-
 <file path=customXml/itemProps3.xml><?xml version="1.0" encoding="utf-8"?>
 <ds:datastoreItem xmlns:ds="http://schemas.openxmlformats.org/officeDocument/2006/customXml" ds:itemID="{E618C13B-9D83-4AF4-B64D-33362D5133F8}">
   <ds:schemaRefs>

</xml_diff>